<commit_message>
Actualizacion de presentacion PPT JAME
</commit_message>
<xml_diff>
--- a/JAME.pptx
+++ b/JAME.pptx
@@ -5,10 +5,10 @@
     <p:sldMasterId id="2147483648" r:id="rId4"/>
   </p:sldMasterIdLst>
   <p:notesMasterIdLst>
-    <p:notesMasterId r:id="rId22"/>
+    <p:notesMasterId r:id="rId27"/>
   </p:notesMasterIdLst>
   <p:handoutMasterIdLst>
-    <p:handoutMasterId r:id="rId23"/>
+    <p:handoutMasterId r:id="rId28"/>
   </p:handoutMasterIdLst>
   <p:sldIdLst>
     <p:sldId id="538" r:id="rId5"/>
@@ -26,8 +26,13 @@
     <p:sldId id="549" r:id="rId17"/>
     <p:sldId id="550" r:id="rId18"/>
     <p:sldId id="542" r:id="rId19"/>
-    <p:sldId id="548" r:id="rId20"/>
-    <p:sldId id="531" r:id="rId21"/>
+    <p:sldId id="552" r:id="rId20"/>
+    <p:sldId id="553" r:id="rId21"/>
+    <p:sldId id="554" r:id="rId22"/>
+    <p:sldId id="548" r:id="rId23"/>
+    <p:sldId id="556" r:id="rId24"/>
+    <p:sldId id="555" r:id="rId25"/>
+    <p:sldId id="531" r:id="rId26"/>
   </p:sldIdLst>
   <p:sldSz cx="12192000" cy="6858000"/>
   <p:notesSz cx="6858000" cy="9144000"/>
@@ -156,7 +161,10 @@
 <file path=ppt/revisionInfo.xml><?xml version="1.0" encoding="utf-8"?>
 <p1510:revInfo xmlns:a="http://schemas.openxmlformats.org/drawingml/2006/main" xmlns:r="http://schemas.openxmlformats.org/officeDocument/2006/relationships" xmlns:p1510="http://schemas.microsoft.com/office/powerpoint/2015/10/main">
   <p1510:revLst>
-    <p1510:client id="{FB6678FB-743D-6E0B-AC78-16E82DECC673}" v="1195" dt="2024-03-12T22:42:33.206"/>
+    <p1510:client id="{43FFE7DE-3D3F-FC59-6A93-377FAD744D26}" v="29" dt="2024-03-21T20:18:35.409"/>
+    <p1510:client id="{81C81DE2-8526-21ED-8240-D2E60F0CAE07}" v="93" dt="2024-03-21T20:19:51.947"/>
+    <p1510:client id="{900BA688-DD1E-CC4A-400A-0C39674F960F}" v="652" dt="2024-03-21T20:25:39.051"/>
+    <p1510:client id="{9DF85DFA-0358-81CF-A4BB-1B5A340EEFB9}" v="2" dt="2024-03-21T20:20:22.657"/>
   </p1510:revLst>
 </p1510:revInfo>
 </file>
@@ -3045,7 +3053,7 @@
           <a:p>
             <a:fld id="{88369B9F-131C-2846-AB8F-CEE154B4CAEB}" type="datetimeFigureOut">
               <a:rPr lang="es-CO" smtClean="0"/>
-              <a:t>19/03/2024</a:t>
+              <a:t>21/03/2024</a:t>
             </a:fld>
             <a:endParaRPr lang="es-CO"/>
           </a:p>
@@ -3222,7 +3230,7 @@
           <a:p>
             <a:fld id="{9660CB96-A603-FF42-AE46-F5F75F80A67B}" type="datetimeFigureOut">
               <a:rPr lang="es-CO" smtClean="0"/>
-              <a:t>19/03/2024</a:t>
+              <a:t>21/03/2024</a:t>
             </a:fld>
             <a:endParaRPr lang="es-CO"/>
           </a:p>
@@ -3639,7 +3647,7 @@
           <a:p>
             <a:fld id="{BD986248-06F7-A441-A47A-264EBD310E11}" type="datetimeFigureOut">
               <a:rPr lang="es-CO" smtClean="0"/>
-              <a:t>19/03/2024</a:t>
+              <a:t>21/03/2024</a:t>
             </a:fld>
             <a:endParaRPr lang="es-CO"/>
           </a:p>
@@ -3839,7 +3847,7 @@
           <a:p>
             <a:fld id="{BD986248-06F7-A441-A47A-264EBD310E11}" type="datetimeFigureOut">
               <a:rPr lang="es-CO" smtClean="0"/>
-              <a:t>19/03/2024</a:t>
+              <a:t>21/03/2024</a:t>
             </a:fld>
             <a:endParaRPr lang="es-CO"/>
           </a:p>
@@ -4049,7 +4057,7 @@
           <a:p>
             <a:fld id="{BD986248-06F7-A441-A47A-264EBD310E11}" type="datetimeFigureOut">
               <a:rPr lang="es-CO" smtClean="0"/>
-              <a:t>19/03/2024</a:t>
+              <a:t>21/03/2024</a:t>
             </a:fld>
             <a:endParaRPr lang="es-CO"/>
           </a:p>
@@ -4210,7 +4218,7 @@
           <a:p>
             <a:fld id="{BD986248-06F7-A441-A47A-264EBD310E11}" type="datetimeFigureOut">
               <a:rPr lang="es-CO" smtClean="0"/>
-              <a:t>19/03/2024</a:t>
+              <a:t>21/03/2024</a:t>
             </a:fld>
             <a:endParaRPr lang="es-CO"/>
           </a:p>
@@ -4410,7 +4418,7 @@
           <a:p>
             <a:fld id="{BD986248-06F7-A441-A47A-264EBD310E11}" type="datetimeFigureOut">
               <a:rPr lang="es-CO" smtClean="0"/>
-              <a:t>19/03/2024</a:t>
+              <a:t>21/03/2024</a:t>
             </a:fld>
             <a:endParaRPr lang="es-CO"/>
           </a:p>
@@ -4686,7 +4694,7 @@
           <a:p>
             <a:fld id="{BD986248-06F7-A441-A47A-264EBD310E11}" type="datetimeFigureOut">
               <a:rPr lang="es-CO" smtClean="0"/>
-              <a:t>19/03/2024</a:t>
+              <a:t>21/03/2024</a:t>
             </a:fld>
             <a:endParaRPr lang="es-CO"/>
           </a:p>
@@ -4954,7 +4962,7 @@
           <a:p>
             <a:fld id="{BD986248-06F7-A441-A47A-264EBD310E11}" type="datetimeFigureOut">
               <a:rPr lang="es-CO" smtClean="0"/>
-              <a:t>19/03/2024</a:t>
+              <a:t>21/03/2024</a:t>
             </a:fld>
             <a:endParaRPr lang="es-CO"/>
           </a:p>
@@ -5369,7 +5377,7 @@
           <a:p>
             <a:fld id="{BD986248-06F7-A441-A47A-264EBD310E11}" type="datetimeFigureOut">
               <a:rPr lang="es-CO" smtClean="0"/>
-              <a:t>19/03/2024</a:t>
+              <a:t>21/03/2024</a:t>
             </a:fld>
             <a:endParaRPr lang="es-CO"/>
           </a:p>
@@ -5511,7 +5519,7 @@
           <a:p>
             <a:fld id="{BD986248-06F7-A441-A47A-264EBD310E11}" type="datetimeFigureOut">
               <a:rPr lang="es-CO" smtClean="0"/>
-              <a:t>19/03/2024</a:t>
+              <a:t>21/03/2024</a:t>
             </a:fld>
             <a:endParaRPr lang="es-CO"/>
           </a:p>
@@ -5624,7 +5632,7 @@
           <a:p>
             <a:fld id="{BD986248-06F7-A441-A47A-264EBD310E11}" type="datetimeFigureOut">
               <a:rPr lang="es-CO" smtClean="0"/>
-              <a:t>19/03/2024</a:t>
+              <a:t>21/03/2024</a:t>
             </a:fld>
             <a:endParaRPr lang="es-CO"/>
           </a:p>
@@ -5937,7 +5945,7 @@
           <a:p>
             <a:fld id="{BD986248-06F7-A441-A47A-264EBD310E11}" type="datetimeFigureOut">
               <a:rPr lang="es-CO" smtClean="0"/>
-              <a:t>19/03/2024</a:t>
+              <a:t>21/03/2024</a:t>
             </a:fld>
             <a:endParaRPr lang="es-CO"/>
           </a:p>
@@ -6226,7 +6234,7 @@
           <a:p>
             <a:fld id="{BD986248-06F7-A441-A47A-264EBD310E11}" type="datetimeFigureOut">
               <a:rPr lang="es-CO" smtClean="0"/>
-              <a:t>19/03/2024</a:t>
+              <a:t>21/03/2024</a:t>
             </a:fld>
             <a:endParaRPr lang="es-CO"/>
           </a:p>
@@ -6469,7 +6477,7 @@
           <a:p>
             <a:fld id="{BD986248-06F7-A441-A47A-264EBD310E11}" type="datetimeFigureOut">
               <a:rPr lang="es-CO" smtClean="0"/>
-              <a:t>19/03/2024</a:t>
+              <a:t>21/03/2024</a:t>
             </a:fld>
             <a:endParaRPr lang="es-CO"/>
           </a:p>
@@ -7758,10 +7766,10 @@
           <a:lstStyle/>
           <a:p>
             <a:r>
-              <a:rPr lang="es-CO" sz="1600">
+              <a:rPr lang="es-CO" sz="1600" dirty="0">
                 <a:latin typeface="Work Sans Light Roman"/>
               </a:rPr>
-              <a:t>Nosotros tomaremos una técnica de recolección de información la cual nos brinda una respuesta más clara y concisa en la cual obtenemos respuestas abiertas por medio del cliente, en las cuales será una entrevista personal, en la cual se le realizarán preguntas relacionadas al proyecto al dueño de la veterinaria y a la administradora de este, como también se realizarán las respectivas grabaciones para soportar lo dicho.</a:t>
+              <a:t>Nosotros tomaremos una técnica de recolección de información la cual nos brinda una respuesta más clara y concisa donde recibimos respuestas abiertas por medio del cliente,  será una entrevista personal, a partir de esta se realizarán preguntas relacionadas al proyecto , al dueño de la veterinaria y a la administradora de esta, realizando sus  respectivas grabaciones para soportar lo dicho.</a:t>
             </a:r>
           </a:p>
         </p:txBody>
@@ -7984,15 +7992,15 @@
               <a:defRPr/>
             </a:pPr>
             <a:r>
-              <a:rPr lang="es-CO" sz="3600" b="1">
+              <a:rPr lang="es-CO" sz="3600" b="1" dirty="0">
                 <a:solidFill>
                   <a:srgbClr val="4D4D4C"/>
                 </a:solidFill>
-                <a:latin typeface="WORK SANS BOLD ROMAN" pitchFamily="2" charset="77"/>
+                <a:latin typeface="WORK SANS BOLD ROMAN"/>
               </a:rPr>
-              <a:t>Referencias</a:t>
-            </a:r>
-            <a:endParaRPr lang="es-CO" sz="3600" b="1" u="none" strike="noStrike" kern="1200" cap="none" spc="0" normalizeH="0" baseline="0" noProof="0">
+              <a:t>Historias de usuario</a:t>
+            </a:r>
+            <a:endParaRPr lang="es-CO" sz="3600" b="1" u="none" strike="noStrike" kern="1200" cap="none" spc="0" normalizeH="0" baseline="0" noProof="0" dirty="0">
               <a:ln>
                 <a:noFill/>
               </a:ln>
@@ -8007,10 +8015,40 @@
           </a:p>
         </p:txBody>
       </p:sp>
+      <p:pic>
+        <p:nvPicPr>
+          <p:cNvPr id="14" name="Imagen 13" descr="Tabla&#10;&#10;Descripción generada automáticamente">
+            <a:extLst>
+              <a:ext uri="{FF2B5EF4-FFF2-40B4-BE49-F238E27FC236}">
+                <a16:creationId xmlns:a16="http://schemas.microsoft.com/office/drawing/2014/main" id="{71270B46-A1F6-9F44-FE5C-637CEC4D21BF}"/>
+              </a:ext>
+            </a:extLst>
+          </p:cNvPr>
+          <p:cNvPicPr>
+            <a:picLocks noChangeAspect="1"/>
+          </p:cNvPicPr>
+          <p:nvPr/>
+        </p:nvPicPr>
+        <p:blipFill>
+          <a:blip r:embed="rId3"/>
+          <a:stretch>
+            <a:fillRect/>
+          </a:stretch>
+        </p:blipFill>
+        <p:spPr>
+          <a:xfrm>
+            <a:off x="574240" y="1062690"/>
+            <a:ext cx="9582150" cy="5400675"/>
+          </a:xfrm>
+          <a:prstGeom prst="rect">
+            <a:avLst/>
+          </a:prstGeom>
+        </p:spPr>
+      </p:pic>
     </p:spTree>
     <p:extLst>
       <p:ext uri="{BB962C8B-B14F-4D97-AF65-F5344CB8AC3E}">
-        <p14:creationId xmlns:p14="http://schemas.microsoft.com/office/powerpoint/2010/main" val="103788051"/>
+        <p14:creationId xmlns:p14="http://schemas.microsoft.com/office/powerpoint/2010/main" val="1263615332"/>
       </p:ext>
     </p:extLst>
   </p:cSld>
@@ -8051,10 +8089,386 @@
           <a:chExt cx="0" cy="0"/>
         </a:xfrm>
       </p:grpSpPr>
+      <p:sp>
+        <p:nvSpPr>
+          <p:cNvPr id="2" name="CuadroTexto 1">
+            <a:extLst>
+              <a:ext uri="{FF2B5EF4-FFF2-40B4-BE49-F238E27FC236}">
+                <a16:creationId xmlns:a16="http://schemas.microsoft.com/office/drawing/2014/main" id="{534A4208-7DDE-681C-B3CE-D7CE52BA4A83}"/>
+              </a:ext>
+            </a:extLst>
+          </p:cNvPr>
+          <p:cNvSpPr txBox="1"/>
+          <p:nvPr/>
+        </p:nvSpPr>
+        <p:spPr>
+          <a:xfrm>
+            <a:off x="3214747" y="1256437"/>
+            <a:ext cx="5805978" cy="646331"/>
+          </a:xfrm>
+          <a:prstGeom prst="rect">
+            <a:avLst/>
+          </a:prstGeom>
+          <a:noFill/>
+        </p:spPr>
+        <p:txBody>
+          <a:bodyPr wrap="square" lIns="91440" tIns="45720" rIns="91440" bIns="45720" rtlCol="0" anchor="t">
+            <a:spAutoFit/>
+          </a:bodyPr>
+          <a:lstStyle/>
+          <a:p>
+            <a:pPr>
+              <a:defRPr/>
+            </a:pPr>
+            <a:r>
+              <a:rPr lang="es-ES" sz="3600" b="1" dirty="0">
+                <a:solidFill>
+                  <a:prstClr val="black">
+                    <a:lumMod val="75000"/>
+                    <a:lumOff val="25000"/>
+                  </a:prstClr>
+                </a:solidFill>
+                <a:latin typeface="Work Sans Bold Roman"/>
+              </a:rPr>
+              <a:t>RF - RNF</a:t>
+            </a:r>
+            <a:endParaRPr lang="es-ES" dirty="0"/>
+          </a:p>
+        </p:txBody>
+      </p:sp>
+      <p:pic>
+        <p:nvPicPr>
+          <p:cNvPr id="4" name="Imagen 3" descr="Imagen que contiene Tabla&#10;&#10;Descripción generada automáticamente">
+            <a:extLst>
+              <a:ext uri="{FF2B5EF4-FFF2-40B4-BE49-F238E27FC236}">
+                <a16:creationId xmlns:a16="http://schemas.microsoft.com/office/drawing/2014/main" id="{1FB08B96-61D7-42D9-7F9F-BA8E2CD490B0}"/>
+              </a:ext>
+            </a:extLst>
+          </p:cNvPr>
+          <p:cNvPicPr>
+            <a:picLocks noChangeAspect="1"/>
+          </p:cNvPicPr>
+          <p:nvPr/>
+        </p:nvPicPr>
+        <p:blipFill>
+          <a:blip r:embed="rId3"/>
+          <a:stretch>
+            <a:fillRect/>
+          </a:stretch>
+        </p:blipFill>
+        <p:spPr>
+          <a:xfrm>
+            <a:off x="2071361" y="1905327"/>
+            <a:ext cx="7715250" cy="3381375"/>
+          </a:xfrm>
+          <a:prstGeom prst="rect">
+            <a:avLst/>
+          </a:prstGeom>
+        </p:spPr>
+      </p:pic>
     </p:spTree>
     <p:extLst>
       <p:ext uri="{BB962C8B-B14F-4D97-AF65-F5344CB8AC3E}">
-        <p14:creationId xmlns:p14="http://schemas.microsoft.com/office/powerpoint/2010/main" val="2604626685"/>
+        <p14:creationId xmlns:p14="http://schemas.microsoft.com/office/powerpoint/2010/main" val="2023417485"/>
+      </p:ext>
+    </p:extLst>
+  </p:cSld>
+  <p:clrMapOvr>
+    <a:masterClrMapping/>
+  </p:clrMapOvr>
+</p:sld>
+</file>
+
+<file path=ppt/slides/slide18.xml><?xml version="1.0" encoding="utf-8"?>
+<p:sld xmlns:a="http://schemas.openxmlformats.org/drawingml/2006/main" xmlns:r="http://schemas.openxmlformats.org/officeDocument/2006/relationships" xmlns:p="http://schemas.openxmlformats.org/presentationml/2006/main">
+  <p:cSld>
+    <p:bg>
+      <p:bgPr>
+        <a:blipFill dpi="0" rotWithShape="1">
+          <a:blip r:embed="rId2">
+            <a:lum/>
+          </a:blip>
+          <a:srcRect/>
+          <a:stretch>
+            <a:fillRect/>
+          </a:stretch>
+        </a:blipFill>
+        <a:effectLst/>
+      </p:bgPr>
+    </p:bg>
+    <p:spTree>
+      <p:nvGrpSpPr>
+        <p:cNvPr id="1" name=""/>
+        <p:cNvGrpSpPr/>
+        <p:nvPr/>
+      </p:nvGrpSpPr>
+      <p:grpSpPr>
+        <a:xfrm>
+          <a:off x="0" y="0"/>
+          <a:ext cx="0" cy="0"/>
+          <a:chOff x="0" y="0"/>
+          <a:chExt cx="0" cy="0"/>
+        </a:xfrm>
+      </p:grpSpPr>
+      <p:sp>
+        <p:nvSpPr>
+          <p:cNvPr id="2" name="CuadroTexto 1">
+            <a:extLst>
+              <a:ext uri="{FF2B5EF4-FFF2-40B4-BE49-F238E27FC236}">
+                <a16:creationId xmlns:a16="http://schemas.microsoft.com/office/drawing/2014/main" id="{534A4208-7DDE-681C-B3CE-D7CE52BA4A83}"/>
+              </a:ext>
+            </a:extLst>
+          </p:cNvPr>
+          <p:cNvSpPr txBox="1"/>
+          <p:nvPr/>
+        </p:nvSpPr>
+        <p:spPr>
+          <a:xfrm>
+            <a:off x="3214747" y="1256437"/>
+            <a:ext cx="5805978" cy="646331"/>
+          </a:xfrm>
+          <a:prstGeom prst="rect">
+            <a:avLst/>
+          </a:prstGeom>
+          <a:noFill/>
+        </p:spPr>
+        <p:txBody>
+          <a:bodyPr wrap="square" lIns="91440" tIns="45720" rIns="91440" bIns="45720" rtlCol="0" anchor="t">
+            <a:spAutoFit/>
+          </a:bodyPr>
+          <a:lstStyle/>
+          <a:p>
+            <a:pPr>
+              <a:defRPr/>
+            </a:pPr>
+            <a:r>
+              <a:rPr lang="es-ES" sz="3600" b="1" dirty="0">
+                <a:solidFill>
+                  <a:prstClr val="black">
+                    <a:lumMod val="75000"/>
+                    <a:lumOff val="25000"/>
+                  </a:prstClr>
+                </a:solidFill>
+                <a:latin typeface="Work Sans Bold Roman"/>
+              </a:rPr>
+              <a:t>RF - RNF</a:t>
+            </a:r>
+            <a:endParaRPr lang="es-ES" dirty="0"/>
+          </a:p>
+        </p:txBody>
+      </p:sp>
+      <p:pic>
+        <p:nvPicPr>
+          <p:cNvPr id="3" name="Imagen 2" descr="Tabla&#10;&#10;Descripción generada automáticamente">
+            <a:extLst>
+              <a:ext uri="{FF2B5EF4-FFF2-40B4-BE49-F238E27FC236}">
+                <a16:creationId xmlns:a16="http://schemas.microsoft.com/office/drawing/2014/main" id="{2B330A9E-CD27-70FD-D0D3-6276645D9BA4}"/>
+              </a:ext>
+            </a:extLst>
+          </p:cNvPr>
+          <p:cNvPicPr>
+            <a:picLocks noChangeAspect="1"/>
+          </p:cNvPicPr>
+          <p:nvPr/>
+        </p:nvPicPr>
+        <p:blipFill rotWithShape="1">
+          <a:blip r:embed="rId3"/>
+          <a:srcRect r="304" b="39474"/>
+          <a:stretch/>
+        </p:blipFill>
+        <p:spPr>
+          <a:xfrm>
+            <a:off x="979639" y="2260100"/>
+            <a:ext cx="10278250" cy="2163245"/>
+          </a:xfrm>
+          <a:prstGeom prst="rect">
+            <a:avLst/>
+          </a:prstGeom>
+        </p:spPr>
+      </p:pic>
+    </p:spTree>
+    <p:extLst>
+      <p:ext uri="{BB962C8B-B14F-4D97-AF65-F5344CB8AC3E}">
+        <p14:creationId xmlns:p14="http://schemas.microsoft.com/office/powerpoint/2010/main" val="2039648488"/>
+      </p:ext>
+    </p:extLst>
+  </p:cSld>
+  <p:clrMapOvr>
+    <a:masterClrMapping/>
+  </p:clrMapOvr>
+</p:sld>
+</file>
+
+<file path=ppt/slides/slide19.xml><?xml version="1.0" encoding="utf-8"?>
+<p:sld xmlns:a="http://schemas.openxmlformats.org/drawingml/2006/main" xmlns:r="http://schemas.openxmlformats.org/officeDocument/2006/relationships" xmlns:p="http://schemas.openxmlformats.org/presentationml/2006/main">
+  <p:cSld>
+    <p:bg>
+      <p:bgPr>
+        <a:blipFill dpi="0" rotWithShape="1">
+          <a:blip r:embed="rId2">
+            <a:lum/>
+          </a:blip>
+          <a:srcRect/>
+          <a:stretch>
+            <a:fillRect/>
+          </a:stretch>
+        </a:blipFill>
+        <a:effectLst/>
+      </p:bgPr>
+    </p:bg>
+    <p:spTree>
+      <p:nvGrpSpPr>
+        <p:cNvPr id="1" name=""/>
+        <p:cNvGrpSpPr/>
+        <p:nvPr/>
+      </p:nvGrpSpPr>
+      <p:grpSpPr>
+        <a:xfrm>
+          <a:off x="0" y="0"/>
+          <a:ext cx="0" cy="0"/>
+          <a:chOff x="0" y="0"/>
+          <a:chExt cx="0" cy="0"/>
+        </a:xfrm>
+      </p:grpSpPr>
+      <p:sp>
+        <p:nvSpPr>
+          <p:cNvPr id="2" name="Título 1">
+            <a:extLst>
+              <a:ext uri="{FF2B5EF4-FFF2-40B4-BE49-F238E27FC236}">
+                <a16:creationId xmlns:a16="http://schemas.microsoft.com/office/drawing/2014/main" id="{2ACE75F1-F343-8856-BC69-4BB6B82BF3E4}"/>
+              </a:ext>
+            </a:extLst>
+          </p:cNvPr>
+          <p:cNvSpPr txBox="1">
+            <a:spLocks/>
+          </p:cNvSpPr>
+          <p:nvPr/>
+        </p:nvSpPr>
+        <p:spPr>
+          <a:xfrm>
+            <a:off x="4767277" y="239237"/>
+            <a:ext cx="2101864" cy="741563"/>
+          </a:xfrm>
+          <a:prstGeom prst="rect">
+            <a:avLst/>
+          </a:prstGeom>
+          <a:ln>
+            <a:noFill/>
+          </a:ln>
+        </p:spPr>
+        <p:txBody>
+          <a:bodyPr lIns="91440" tIns="45720" rIns="91440" bIns="45720" anchor="t"/>
+          <a:lstStyle>
+            <a:lvl1pPr algn="l" defTabSz="914400" rtl="0" eaLnBrk="1" latinLnBrk="0" hangingPunct="1">
+              <a:lnSpc>
+                <a:spcPct val="90000"/>
+              </a:lnSpc>
+              <a:spcBef>
+                <a:spcPct val="0"/>
+              </a:spcBef>
+              <a:buNone/>
+              <a:defRPr sz="4400" kern="1200">
+                <a:solidFill>
+                  <a:schemeClr val="tx1"/>
+                </a:solidFill>
+                <a:latin typeface="+mj-lt"/>
+                <a:ea typeface="+mj-ea"/>
+                <a:cs typeface="+mj-cs"/>
+              </a:defRPr>
+            </a:lvl1pPr>
+          </a:lstStyle>
+          <a:p>
+            <a:pPr>
+              <a:defRPr/>
+            </a:pPr>
+            <a:r>
+              <a:rPr lang="es-CO" sz="3600" b="1">
+                <a:solidFill>
+                  <a:srgbClr val="4D4D4C"/>
+                </a:solidFill>
+                <a:latin typeface="WORK SANS BOLD ROMAN"/>
+              </a:rPr>
+              <a:t>Mockups</a:t>
+            </a:r>
+            <a:endParaRPr lang="es-CO" sz="3600" b="1" u="none" strike="noStrike" kern="1200" cap="none" spc="0" normalizeH="0" baseline="0" noProof="0">
+              <a:ln>
+                <a:noFill/>
+              </a:ln>
+              <a:solidFill>
+                <a:srgbClr val="4D4D4C"/>
+              </a:solidFill>
+              <a:effectLst/>
+              <a:uLnTx/>
+              <a:uFillTx/>
+              <a:latin typeface="WORK SANS BOLD ROMAN" pitchFamily="2" charset="77"/>
+            </a:endParaRPr>
+          </a:p>
+        </p:txBody>
+      </p:sp>
+      <p:pic>
+        <p:nvPicPr>
+          <p:cNvPr id="3" name="Imagen 2">
+            <a:extLst>
+              <a:ext uri="{FF2B5EF4-FFF2-40B4-BE49-F238E27FC236}">
+                <a16:creationId xmlns:a16="http://schemas.microsoft.com/office/drawing/2014/main" id="{D54544D6-2C1A-122C-782B-8D95D21BA110}"/>
+              </a:ext>
+            </a:extLst>
+          </p:cNvPr>
+          <p:cNvPicPr>
+            <a:picLocks noChangeAspect="1"/>
+          </p:cNvPicPr>
+          <p:nvPr/>
+        </p:nvPicPr>
+        <p:blipFill>
+          <a:blip r:embed="rId3"/>
+          <a:stretch>
+            <a:fillRect/>
+          </a:stretch>
+        </p:blipFill>
+        <p:spPr>
+          <a:xfrm>
+            <a:off x="4175" y="1134585"/>
+            <a:ext cx="5607485" cy="4254803"/>
+          </a:xfrm>
+          <a:prstGeom prst="rect">
+            <a:avLst/>
+          </a:prstGeom>
+        </p:spPr>
+      </p:pic>
+      <p:pic>
+        <p:nvPicPr>
+          <p:cNvPr id="4" name="Imagen 3" descr="Interfaz de usuario gráfica, Aplicación&#10;&#10;Descripción generada automáticamente">
+            <a:extLst>
+              <a:ext uri="{FF2B5EF4-FFF2-40B4-BE49-F238E27FC236}">
+                <a16:creationId xmlns:a16="http://schemas.microsoft.com/office/drawing/2014/main" id="{D0633AF3-9F83-9005-CEB2-DCB308EA40E2}"/>
+              </a:ext>
+            </a:extLst>
+          </p:cNvPr>
+          <p:cNvPicPr>
+            <a:picLocks noChangeAspect="1"/>
+          </p:cNvPicPr>
+          <p:nvPr/>
+        </p:nvPicPr>
+        <p:blipFill>
+          <a:blip r:embed="rId4"/>
+          <a:stretch>
+            <a:fillRect/>
+          </a:stretch>
+        </p:blipFill>
+        <p:spPr>
+          <a:xfrm>
+            <a:off x="6033109" y="1196758"/>
+            <a:ext cx="5971262" cy="4140896"/>
+          </a:xfrm>
+          <a:prstGeom prst="rect">
+            <a:avLst/>
+          </a:prstGeom>
+        </p:spPr>
+      </p:pic>
+    </p:spTree>
+    <p:extLst>
+      <p:ext uri="{BB962C8B-B14F-4D97-AF65-F5344CB8AC3E}">
+        <p14:creationId xmlns:p14="http://schemas.microsoft.com/office/powerpoint/2010/main" val="103788051"/>
       </p:ext>
     </p:extLst>
   </p:cSld>
@@ -8197,6 +8611,307 @@
     <p:extLst>
       <p:ext uri="{BB962C8B-B14F-4D97-AF65-F5344CB8AC3E}">
         <p14:creationId xmlns:p14="http://schemas.microsoft.com/office/powerpoint/2010/main" val="1971142826"/>
+      </p:ext>
+    </p:extLst>
+  </p:cSld>
+  <p:clrMapOvr>
+    <a:masterClrMapping/>
+  </p:clrMapOvr>
+</p:sld>
+</file>
+
+<file path=ppt/slides/slide20.xml><?xml version="1.0" encoding="utf-8"?>
+<p:sld xmlns:a="http://schemas.openxmlformats.org/drawingml/2006/main" xmlns:r="http://schemas.openxmlformats.org/officeDocument/2006/relationships" xmlns:p="http://schemas.openxmlformats.org/presentationml/2006/main">
+  <p:cSld>
+    <p:bg>
+      <p:bgPr>
+        <a:blipFill dpi="0" rotWithShape="1">
+          <a:blip r:embed="rId2">
+            <a:lum/>
+          </a:blip>
+          <a:srcRect/>
+          <a:stretch>
+            <a:fillRect/>
+          </a:stretch>
+        </a:blipFill>
+        <a:effectLst/>
+      </p:bgPr>
+    </p:bg>
+    <p:spTree>
+      <p:nvGrpSpPr>
+        <p:cNvPr id="1" name=""/>
+        <p:cNvGrpSpPr/>
+        <p:nvPr/>
+      </p:nvGrpSpPr>
+      <p:grpSpPr>
+        <a:xfrm>
+          <a:off x="0" y="0"/>
+          <a:ext cx="0" cy="0"/>
+          <a:chOff x="0" y="0"/>
+          <a:chExt cx="0" cy="0"/>
+        </a:xfrm>
+      </p:grpSpPr>
+      <p:sp>
+        <p:nvSpPr>
+          <p:cNvPr id="2" name="Título 1">
+            <a:extLst>
+              <a:ext uri="{FF2B5EF4-FFF2-40B4-BE49-F238E27FC236}">
+                <a16:creationId xmlns:a16="http://schemas.microsoft.com/office/drawing/2014/main" id="{2ACE75F1-F343-8856-BC69-4BB6B82BF3E4}"/>
+              </a:ext>
+            </a:extLst>
+          </p:cNvPr>
+          <p:cNvSpPr txBox="1">
+            <a:spLocks/>
+          </p:cNvSpPr>
+          <p:nvPr/>
+        </p:nvSpPr>
+        <p:spPr>
+          <a:xfrm>
+            <a:off x="3504236" y="166169"/>
+            <a:ext cx="4701014" cy="741563"/>
+          </a:xfrm>
+          <a:prstGeom prst="rect">
+            <a:avLst/>
+          </a:prstGeom>
+          <a:ln>
+            <a:noFill/>
+          </a:ln>
+        </p:spPr>
+        <p:txBody>
+          <a:bodyPr lIns="91440" tIns="45720" rIns="91440" bIns="45720" anchor="t"/>
+          <a:lstStyle>
+            <a:lvl1pPr algn="l" defTabSz="914400" rtl="0" eaLnBrk="1" latinLnBrk="0" hangingPunct="1">
+              <a:lnSpc>
+                <a:spcPct val="90000"/>
+              </a:lnSpc>
+              <a:spcBef>
+                <a:spcPct val="0"/>
+              </a:spcBef>
+              <a:buNone/>
+              <a:defRPr sz="4400" kern="1200">
+                <a:solidFill>
+                  <a:schemeClr val="tx1"/>
+                </a:solidFill>
+                <a:latin typeface="+mj-lt"/>
+                <a:ea typeface="+mj-ea"/>
+                <a:cs typeface="+mj-cs"/>
+              </a:defRPr>
+            </a:lvl1pPr>
+          </a:lstStyle>
+          <a:p>
+            <a:pPr>
+              <a:defRPr/>
+            </a:pPr>
+            <a:r>
+              <a:rPr lang="es-CO" sz="3600" b="1" dirty="0">
+                <a:solidFill>
+                  <a:srgbClr val="4D4D4C"/>
+                </a:solidFill>
+                <a:latin typeface="WORK SANS BOLD ROMAN"/>
+              </a:rPr>
+              <a:t>Control de versiones </a:t>
+            </a:r>
+            <a:endParaRPr lang="es-ES" dirty="0"/>
+          </a:p>
+        </p:txBody>
+      </p:sp>
+      <p:pic>
+        <p:nvPicPr>
+          <p:cNvPr id="4" name="Imagen 3" descr="Captura de pantalla de un celular&#10;&#10;Descripción generada automáticamente">
+            <a:extLst>
+              <a:ext uri="{FF2B5EF4-FFF2-40B4-BE49-F238E27FC236}">
+                <a16:creationId xmlns:a16="http://schemas.microsoft.com/office/drawing/2014/main" id="{9AB7EBC9-3E2C-00E1-32C0-DB661D985854}"/>
+              </a:ext>
+            </a:extLst>
+          </p:cNvPr>
+          <p:cNvPicPr>
+            <a:picLocks noChangeAspect="1"/>
+          </p:cNvPicPr>
+          <p:nvPr/>
+        </p:nvPicPr>
+        <p:blipFill>
+          <a:blip r:embed="rId3"/>
+          <a:stretch>
+            <a:fillRect/>
+          </a:stretch>
+        </p:blipFill>
+        <p:spPr>
+          <a:xfrm>
+            <a:off x="323589" y="1245339"/>
+            <a:ext cx="11555261" cy="4930995"/>
+          </a:xfrm>
+          <a:prstGeom prst="rect">
+            <a:avLst/>
+          </a:prstGeom>
+        </p:spPr>
+      </p:pic>
+    </p:spTree>
+    <p:extLst>
+      <p:ext uri="{BB962C8B-B14F-4D97-AF65-F5344CB8AC3E}">
+        <p14:creationId xmlns:p14="http://schemas.microsoft.com/office/powerpoint/2010/main" val="2533307674"/>
+      </p:ext>
+    </p:extLst>
+  </p:cSld>
+  <p:clrMapOvr>
+    <a:masterClrMapping/>
+  </p:clrMapOvr>
+</p:sld>
+</file>
+
+<file path=ppt/slides/slide21.xml><?xml version="1.0" encoding="utf-8"?>
+<p:sld xmlns:a="http://schemas.openxmlformats.org/drawingml/2006/main" xmlns:r="http://schemas.openxmlformats.org/officeDocument/2006/relationships" xmlns:p="http://schemas.openxmlformats.org/presentationml/2006/main">
+  <p:cSld>
+    <p:bg>
+      <p:bgPr>
+        <a:blipFill dpi="0" rotWithShape="1">
+          <a:blip r:embed="rId2">
+            <a:lum/>
+          </a:blip>
+          <a:srcRect/>
+          <a:stretch>
+            <a:fillRect/>
+          </a:stretch>
+        </a:blipFill>
+        <a:effectLst/>
+      </p:bgPr>
+    </p:bg>
+    <p:spTree>
+      <p:nvGrpSpPr>
+        <p:cNvPr id="1" name=""/>
+        <p:cNvGrpSpPr/>
+        <p:nvPr/>
+      </p:nvGrpSpPr>
+      <p:grpSpPr>
+        <a:xfrm>
+          <a:off x="0" y="0"/>
+          <a:ext cx="0" cy="0"/>
+          <a:chOff x="0" y="0"/>
+          <a:chExt cx="0" cy="0"/>
+        </a:xfrm>
+      </p:grpSpPr>
+      <p:sp>
+        <p:nvSpPr>
+          <p:cNvPr id="2" name="Título 1">
+            <a:extLst>
+              <a:ext uri="{FF2B5EF4-FFF2-40B4-BE49-F238E27FC236}">
+                <a16:creationId xmlns:a16="http://schemas.microsoft.com/office/drawing/2014/main" id="{2ACE75F1-F343-8856-BC69-4BB6B82BF3E4}"/>
+              </a:ext>
+            </a:extLst>
+          </p:cNvPr>
+          <p:cNvSpPr txBox="1">
+            <a:spLocks/>
+          </p:cNvSpPr>
+          <p:nvPr/>
+        </p:nvSpPr>
+        <p:spPr>
+          <a:xfrm>
+            <a:off x="456236" y="416689"/>
+            <a:ext cx="9815809" cy="741563"/>
+          </a:xfrm>
+          <a:prstGeom prst="rect">
+            <a:avLst/>
+          </a:prstGeom>
+          <a:ln>
+            <a:noFill/>
+          </a:ln>
+        </p:spPr>
+        <p:txBody>
+          <a:bodyPr lIns="91440" tIns="45720" rIns="91440" bIns="45720" anchor="t"/>
+          <a:lstStyle>
+            <a:lvl1pPr algn="l" defTabSz="914400" rtl="0" eaLnBrk="1" latinLnBrk="0" hangingPunct="1">
+              <a:lnSpc>
+                <a:spcPct val="90000"/>
+              </a:lnSpc>
+              <a:spcBef>
+                <a:spcPct val="0"/>
+              </a:spcBef>
+              <a:buNone/>
+              <a:defRPr sz="4400" kern="1200">
+                <a:solidFill>
+                  <a:schemeClr val="tx1"/>
+                </a:solidFill>
+                <a:latin typeface="+mj-lt"/>
+                <a:ea typeface="+mj-ea"/>
+                <a:cs typeface="+mj-cs"/>
+              </a:defRPr>
+            </a:lvl1pPr>
+          </a:lstStyle>
+          <a:p>
+            <a:pPr>
+              <a:defRPr/>
+            </a:pPr>
+            <a:r>
+              <a:rPr lang="es-CO" sz="3600" b="1">
+                <a:solidFill>
+                  <a:srgbClr val="4D4D4C"/>
+                </a:solidFill>
+                <a:latin typeface="WORK SANS BOLD ROMAN" pitchFamily="2" charset="77"/>
+              </a:rPr>
+              <a:t>Referencias</a:t>
+            </a:r>
+            <a:endParaRPr lang="es-CO" sz="3600" b="1" u="none" strike="noStrike" kern="1200" cap="none" spc="0" normalizeH="0" baseline="0" noProof="0">
+              <a:ln>
+                <a:noFill/>
+              </a:ln>
+              <a:solidFill>
+                <a:srgbClr val="4D4D4C"/>
+              </a:solidFill>
+              <a:effectLst/>
+              <a:uLnTx/>
+              <a:uFillTx/>
+              <a:latin typeface="WORK SANS BOLD ROMAN" pitchFamily="2" charset="77"/>
+            </a:endParaRPr>
+          </a:p>
+        </p:txBody>
+      </p:sp>
+    </p:spTree>
+    <p:extLst>
+      <p:ext uri="{BB962C8B-B14F-4D97-AF65-F5344CB8AC3E}">
+        <p14:creationId xmlns:p14="http://schemas.microsoft.com/office/powerpoint/2010/main" val="2483138976"/>
+      </p:ext>
+    </p:extLst>
+  </p:cSld>
+  <p:clrMapOvr>
+    <a:masterClrMapping/>
+  </p:clrMapOvr>
+</p:sld>
+</file>
+
+<file path=ppt/slides/slide22.xml><?xml version="1.0" encoding="utf-8"?>
+<p:sld xmlns:a="http://schemas.openxmlformats.org/drawingml/2006/main" xmlns:r="http://schemas.openxmlformats.org/officeDocument/2006/relationships" xmlns:p="http://schemas.openxmlformats.org/presentationml/2006/main">
+  <p:cSld>
+    <p:bg>
+      <p:bgPr>
+        <a:blipFill dpi="0" rotWithShape="1">
+          <a:blip r:embed="rId2">
+            <a:lum/>
+          </a:blip>
+          <a:srcRect/>
+          <a:stretch>
+            <a:fillRect/>
+          </a:stretch>
+        </a:blipFill>
+        <a:effectLst/>
+      </p:bgPr>
+    </p:bg>
+    <p:spTree>
+      <p:nvGrpSpPr>
+        <p:cNvPr id="1" name=""/>
+        <p:cNvGrpSpPr/>
+        <p:nvPr/>
+      </p:nvGrpSpPr>
+      <p:grpSpPr>
+        <a:xfrm>
+          <a:off x="0" y="0"/>
+          <a:ext cx="0" cy="0"/>
+          <a:chOff x="0" y="0"/>
+          <a:chExt cx="0" cy="0"/>
+        </a:xfrm>
+      </p:grpSpPr>
+    </p:spTree>
+    <p:extLst>
+      <p:ext uri="{BB962C8B-B14F-4D97-AF65-F5344CB8AC3E}">
+        <p14:creationId xmlns:p14="http://schemas.microsoft.com/office/powerpoint/2010/main" val="2604626685"/>
       </p:ext>
     </p:extLst>
   </p:cSld>
@@ -8768,7 +9483,7 @@
         <p:spPr>
           <a:xfrm>
             <a:off x="878470" y="1713494"/>
-            <a:ext cx="4491107" cy="4524315"/>
+            <a:ext cx="4491107" cy="4278094"/>
           </a:xfrm>
           <a:prstGeom prst="rect">
             <a:avLst/>
@@ -8783,34 +9498,58 @@
           <a:p>
             <a:pPr algn="just"/>
             <a:r>
+              <a:rPr lang="es-CO" sz="1600" dirty="0">
+                <a:latin typeface="Work Sans Light Roman"/>
+              </a:rPr>
+              <a:t>El sistema de información manejara procesos </a:t>
+            </a:r>
+            <a:r>
               <a:rPr lang="es-CO" sz="1600">
                 <a:latin typeface="Work Sans Light Roman"/>
               </a:rPr>
-              <a:t>El sistema de información manejara procesos del agendamiento de citas consultas, groming o de tratamiento médico de la mascota, manejara procesos de  inventario, como  el ingreso y egreso de la empresa, también la compra y venta de productos. También se realizará un apartado para tratamiento o recomendaciones por parte del profesional médico. No se recibirán ni se realizarán pagos por internet, </a:t>
-            </a:r>
-            <a:r>
-              <a:rPr lang="es-CO" sz="1600" err="1">
+              <a:t>de</a:t>
+            </a:r>
+            <a:r>
+              <a:rPr lang="es-CO" sz="1600" dirty="0">
                 <a:latin typeface="Work Sans Light Roman"/>
               </a:rPr>
-              <a:t>tendra</a:t>
+              <a:t> agendamiento de citas y consultas, </a:t>
+            </a:r>
+            <a:r>
+              <a:rPr lang="es-CO" sz="1600" dirty="0" err="1">
+                <a:latin typeface="Work Sans Light Roman"/>
+              </a:rPr>
+              <a:t>groming</a:t>
+            </a:r>
+            <a:r>
+              <a:rPr lang="es-CO" sz="1600" dirty="0">
+                <a:latin typeface="Work Sans Light Roman"/>
+              </a:rPr>
+              <a:t> o de tratamiento médico de la mascota, manejara procesos de  inventario, como  el ingreso y egreso de la empresa, también la compra y venta de productos. </a:t>
             </a:r>
             <a:r>
               <a:rPr lang="es-CO" sz="1600">
                 <a:latin typeface="Work Sans Light Roman"/>
               </a:rPr>
-              <a:t> la posibilidad de un apartado para la solicitud de pedidos por medio de carrito de compras.  Los pagos se realizan en la veterinaria de manera presencial.</a:t>
-            </a:r>
-            <a:endParaRPr lang="es-CO"/>
-          </a:p>
-          <a:p>
-            <a:pPr algn="just"/>
-            <a:r>
-              <a:rPr lang="es-CO" sz="1600">
+              <a:t> </a:t>
+            </a:r>
+            <a:r>
+              <a:rPr lang="es-CO" sz="1600" dirty="0">
                 <a:latin typeface="Work Sans Light Roman"/>
               </a:rPr>
-              <a:t>Todo el tema de compra de productos se realizará por parte de La Clínica Veterinaria, no se realizarán pedidos en la página ni servicios a domicilio. Este proyecto durara 6 trimestres lo que durara aproximadamente el tecnólogo en Análisis y Desarrollo de software</a:t>
-            </a:r>
-            <a:endParaRPr lang="es-CO" sz="1600">
+              <a:t>se realizará un apartado para tratamiento o recomendaciones por parte del profesional médico. No se recibirán ni se realizarán pagos por internet, tendrá un apartado para la solicitud de pedidos por medio de carrito de compras.  Los pagos se realizan en la tienda física, y también el pedido realizado.</a:t>
+            </a:r>
+            <a:endParaRPr lang="es-CO" dirty="0"/>
+          </a:p>
+          <a:p>
+            <a:pPr algn="just"/>
+            <a:r>
+              <a:rPr lang="es-CO" sz="1600" dirty="0">
+                <a:latin typeface="Work Sans Light Roman"/>
+              </a:rPr>
+              <a:t>Todo el tema de compra de productos se realizará por parte de La Clínica Veterinaria, no se realizarán pedidos de servicios a domicilio. Este proyecto durara 6 trimestres lo que durara aproximadamente el tecnólogo en Análisis y Desarrollo de software</a:t>
+            </a:r>
+            <a:endParaRPr lang="es-CO" sz="1600" dirty="0">
               <a:latin typeface="Work Sans Light Roman" pitchFamily="2" charset="77"/>
             </a:endParaRPr>
           </a:p>
@@ -9647,225 +10386,260 @@
               <a:buChar char="•"/>
             </a:pPr>
             <a:r>
-              <a:rPr lang="en-US" sz="2000"/>
+              <a:rPr lang="en-US" sz="2000" dirty="0"/>
               <a:t>A </a:t>
             </a:r>
             <a:r>
-              <a:rPr lang="en-US" sz="2000" err="1"/>
+              <a:rPr lang="en-US" sz="2000" dirty="0" err="1"/>
               <a:t>raíz</a:t>
             </a:r>
             <a:r>
-              <a:rPr lang="en-US" sz="2000"/>
+              <a:rPr lang="en-US" sz="2000" dirty="0"/>
               <a:t> de la </a:t>
             </a:r>
             <a:r>
-              <a:rPr lang="en-US" sz="2000" err="1"/>
+              <a:rPr lang="en-US" sz="2000" dirty="0" err="1"/>
               <a:t>problemática</a:t>
             </a:r>
             <a:r>
-              <a:rPr lang="en-US" sz="2000"/>
+              <a:rPr lang="en-US" sz="2000" dirty="0"/>
               <a:t>  </a:t>
             </a:r>
             <a:r>
-              <a:rPr lang="en-US" sz="2000" err="1"/>
+              <a:rPr lang="en-US" sz="2000" dirty="0" err="1"/>
               <a:t>en</a:t>
             </a:r>
             <a:r>
-              <a:rPr lang="en-US" sz="2000"/>
+              <a:rPr lang="en-US" sz="2000" dirty="0"/>
               <a:t> la </a:t>
             </a:r>
             <a:r>
-              <a:rPr lang="en-US" sz="2000" err="1"/>
+              <a:rPr lang="en-US" sz="2000" dirty="0" err="1"/>
               <a:t>clínica</a:t>
             </a:r>
             <a:r>
-              <a:rPr lang="en-US" sz="2000"/>
+              <a:rPr lang="en-US" sz="2000" dirty="0"/>
               <a:t> </a:t>
             </a:r>
             <a:r>
-              <a:rPr lang="en-US" sz="2000" err="1"/>
+              <a:rPr lang="en-US" sz="2000" dirty="0" err="1"/>
               <a:t>veterinaria</a:t>
             </a:r>
             <a:r>
-              <a:rPr lang="en-US" sz="2000"/>
+              <a:rPr lang="en-US" sz="2000" dirty="0"/>
               <a:t>  con </a:t>
             </a:r>
             <a:r>
-              <a:rPr lang="en-US" sz="2000" err="1"/>
+              <a:rPr lang="en-US" sz="2000" dirty="0" err="1"/>
               <a:t>relación</a:t>
             </a:r>
             <a:r>
-              <a:rPr lang="en-US" sz="2000"/>
+              <a:rPr lang="en-US" sz="2000" dirty="0"/>
               <a:t> a </a:t>
             </a:r>
             <a:r>
-              <a:rPr lang="en-US" sz="2000" err="1"/>
+              <a:rPr lang="en-US" sz="2000" dirty="0" err="1"/>
               <a:t>los</a:t>
             </a:r>
             <a:r>
-              <a:rPr lang="en-US" sz="2000"/>
+              <a:rPr lang="en-US" sz="2000" dirty="0"/>
               <a:t> </a:t>
             </a:r>
             <a:r>
-              <a:rPr lang="en-US" sz="2000" err="1"/>
+              <a:rPr lang="en-US" sz="2000" dirty="0" err="1"/>
               <a:t>procesos</a:t>
             </a:r>
             <a:r>
-              <a:rPr lang="en-US" sz="2000"/>
+              <a:rPr lang="en-US" sz="2000" dirty="0"/>
               <a:t> </a:t>
             </a:r>
             <a:r>
-              <a:rPr lang="en-US" sz="2000" err="1"/>
+              <a:rPr lang="en-US" sz="2000" dirty="0" err="1"/>
               <a:t>sobre</a:t>
             </a:r>
             <a:r>
-              <a:rPr lang="en-US" sz="2000"/>
+              <a:rPr lang="en-US" sz="2000" dirty="0"/>
               <a:t> </a:t>
             </a:r>
             <a:r>
-              <a:rPr lang="en-US" sz="2000" err="1"/>
+              <a:rPr lang="en-US" sz="2000" dirty="0" err="1"/>
               <a:t>agendamiento</a:t>
             </a:r>
             <a:r>
-              <a:rPr lang="en-US" sz="2000"/>
+              <a:rPr lang="en-US" sz="2000" dirty="0"/>
               <a:t> de </a:t>
             </a:r>
             <a:r>
-              <a:rPr lang="en-US" sz="2000" err="1"/>
+              <a:rPr lang="en-US" sz="2000" dirty="0" err="1"/>
               <a:t>citas</a:t>
             </a:r>
             <a:r>
-              <a:rPr lang="en-US" sz="2000"/>
+              <a:rPr lang="en-US" sz="2000" dirty="0"/>
               <a:t>, </a:t>
             </a:r>
             <a:r>
-              <a:rPr lang="en-US" sz="2000" err="1"/>
+              <a:rPr lang="en-US" sz="2000" dirty="0" err="1"/>
               <a:t>consultas</a:t>
             </a:r>
             <a:r>
-              <a:rPr lang="en-US" sz="2000"/>
+              <a:rPr lang="en-US" sz="2000" dirty="0"/>
               <a:t> y grooming, </a:t>
             </a:r>
             <a:r>
-              <a:rPr lang="en-US" sz="2000" err="1"/>
+              <a:rPr lang="en-US" sz="2000" dirty="0" err="1"/>
               <a:t>el</a:t>
             </a:r>
             <a:r>
-              <a:rPr lang="en-US" sz="2000"/>
+              <a:rPr lang="en-US" sz="2000" dirty="0"/>
               <a:t> </a:t>
             </a:r>
             <a:r>
-              <a:rPr lang="en-US" sz="2000" err="1"/>
+              <a:rPr lang="en-US" sz="2000" dirty="0" err="1"/>
               <a:t>inventario</a:t>
             </a:r>
             <a:r>
-              <a:rPr lang="en-US" sz="2000"/>
+              <a:rPr lang="en-US" sz="2000" dirty="0"/>
               <a:t>, la </a:t>
             </a:r>
             <a:r>
-              <a:rPr lang="en-US" sz="2000" err="1"/>
+              <a:rPr lang="en-US" sz="2000" dirty="0" err="1"/>
               <a:t>compra</a:t>
             </a:r>
             <a:r>
-              <a:rPr lang="en-US" sz="2000"/>
+              <a:rPr lang="en-US" sz="2000" dirty="0"/>
               <a:t> y </a:t>
             </a:r>
             <a:r>
-              <a:rPr lang="en-US" sz="2000" err="1"/>
+              <a:rPr lang="en-US" sz="2000" dirty="0" err="1"/>
               <a:t>venta</a:t>
             </a:r>
             <a:r>
-              <a:rPr lang="en-US" sz="2000"/>
+              <a:rPr lang="en-US" sz="2000" dirty="0"/>
               <a:t> de </a:t>
             </a:r>
             <a:r>
-              <a:rPr lang="en-US" sz="2000" err="1"/>
+              <a:rPr lang="en-US" sz="2000" dirty="0" err="1"/>
               <a:t>productos</a:t>
             </a:r>
             <a:r>
-              <a:rPr lang="en-US" sz="2000"/>
+              <a:rPr lang="en-US" sz="2000" dirty="0"/>
               <a:t> para </a:t>
             </a:r>
             <a:r>
-              <a:rPr lang="en-US" sz="2000" err="1"/>
+              <a:rPr lang="en-US" sz="2000" dirty="0" err="1"/>
               <a:t>mascotas</a:t>
             </a:r>
             <a:r>
-              <a:rPr lang="en-US" sz="2000"/>
+              <a:rPr lang="en-US" sz="2000" dirty="0"/>
+              <a:t>, Con </a:t>
+            </a:r>
+            <a:r>
+              <a:rPr lang="en-US" sz="2000" dirty="0" err="1"/>
+              <a:t>este</a:t>
+            </a:r>
+            <a:r>
+              <a:rPr lang="en-US" sz="2000" dirty="0"/>
+              <a:t> </a:t>
+            </a:r>
+            <a:r>
+              <a:rPr lang="en-US" sz="2000" dirty="0" err="1"/>
+              <a:t>sistema</a:t>
+            </a:r>
+            <a:r>
+              <a:rPr lang="en-US" sz="2000" dirty="0"/>
+              <a:t> se </a:t>
+            </a:r>
+            <a:r>
+              <a:rPr lang="en-US" sz="2000" dirty="0" err="1"/>
+              <a:t>pretende</a:t>
+            </a:r>
+            <a:r>
+              <a:rPr lang="en-US" sz="2000" dirty="0"/>
+              <a:t> </a:t>
+            </a:r>
+            <a:r>
+              <a:rPr lang="en-US" sz="2000" dirty="0" err="1"/>
+              <a:t>garantizar</a:t>
+            </a:r>
+            <a:r>
+              <a:rPr lang="en-US" sz="2000" dirty="0"/>
+              <a:t> que la </a:t>
+            </a:r>
+            <a:r>
+              <a:rPr lang="en-US" sz="2000" dirty="0" err="1"/>
+              <a:t>empresa</a:t>
+            </a:r>
+            <a:r>
+              <a:rPr lang="en-US" sz="2000" dirty="0"/>
+              <a:t> </a:t>
+            </a:r>
+            <a:r>
+              <a:rPr lang="en-US" sz="2000" dirty="0" err="1"/>
+              <a:t>tenga</a:t>
+            </a:r>
+            <a:r>
+              <a:rPr lang="en-US" sz="2000" dirty="0"/>
+              <a:t> un </a:t>
+            </a:r>
+            <a:r>
+              <a:rPr lang="en-US" sz="2000" dirty="0" err="1"/>
+              <a:t>beneficio</a:t>
+            </a:r>
+            <a:r>
+              <a:rPr lang="en-US" sz="2000" dirty="0"/>
+              <a:t> </a:t>
+            </a:r>
+            <a:r>
+              <a:rPr lang="en-US" sz="2000" dirty="0" err="1"/>
+              <a:t>en</a:t>
+            </a:r>
+            <a:r>
+              <a:rPr lang="en-US" sz="2000" dirty="0"/>
+              <a:t> </a:t>
+            </a:r>
+            <a:r>
+              <a:rPr lang="en-US" sz="2000" dirty="0" err="1"/>
+              <a:t>cuanto</a:t>
+            </a:r>
+            <a:r>
+              <a:rPr lang="en-US" sz="2000" dirty="0"/>
+              <a:t> a </a:t>
+            </a:r>
+            <a:r>
+              <a:rPr lang="en-US" sz="2000" dirty="0" err="1"/>
+              <a:t>su</a:t>
+            </a:r>
+            <a:r>
+              <a:rPr lang="en-US" sz="2000" dirty="0"/>
               <a:t> </a:t>
             </a:r>
             <a:r>
-              <a:rPr lang="en-US" sz="2000" err="1"/>
-              <a:t>donde</a:t>
-            </a:r>
-            <a:r>
-              <a:rPr lang="en-US" sz="2000"/>
-              <a:t> se </a:t>
-            </a:r>
-            <a:r>
-              <a:rPr lang="en-US" sz="2000" err="1"/>
-              <a:t>garantize</a:t>
-            </a:r>
-            <a:r>
-              <a:rPr lang="en-US" sz="2000"/>
-              <a:t> que la </a:t>
-            </a:r>
-            <a:r>
-              <a:rPr lang="en-US" sz="2000" err="1"/>
-              <a:t>empresa</a:t>
-            </a:r>
-            <a:r>
-              <a:rPr lang="en-US" sz="2000"/>
-              <a:t> </a:t>
-            </a:r>
-            <a:r>
-              <a:rPr lang="en-US" sz="2000" err="1"/>
-              <a:t>tenga</a:t>
-            </a:r>
-            <a:r>
-              <a:rPr lang="en-US" sz="2000"/>
-              <a:t> un </a:t>
-            </a:r>
-            <a:r>
-              <a:rPr lang="en-US" sz="2000" err="1"/>
-              <a:t>beneficio</a:t>
-            </a:r>
-            <a:r>
-              <a:rPr lang="en-US" sz="2000"/>
-              <a:t> </a:t>
-            </a:r>
-            <a:r>
-              <a:rPr lang="en-US" sz="2000" err="1"/>
-              <a:t>en</a:t>
-            </a:r>
-            <a:r>
-              <a:rPr lang="en-US" sz="2000"/>
-              <a:t> </a:t>
-            </a:r>
-            <a:r>
-              <a:rPr lang="en-US" sz="2000" err="1"/>
-              <a:t>cuanto</a:t>
-            </a:r>
-            <a:r>
-              <a:rPr lang="en-US" sz="2000"/>
-              <a:t> a </a:t>
-            </a:r>
-            <a:r>
-              <a:rPr lang="en-US" sz="2000" err="1"/>
-              <a:t>su</a:t>
-            </a:r>
-            <a:r>
-              <a:rPr lang="en-US" sz="2000"/>
-              <a:t> </a:t>
-            </a:r>
-            <a:r>
-              <a:rPr lang="en-US" sz="2000" err="1"/>
+              <a:rPr lang="en-US" sz="2000" dirty="0" err="1"/>
               <a:t>organización</a:t>
             </a:r>
             <a:r>
-              <a:rPr lang="en-US" sz="2000"/>
+              <a:rPr lang="en-US" sz="2000" dirty="0"/>
+              <a:t> y </a:t>
+            </a:r>
+            <a:r>
+              <a:rPr lang="en-US" sz="2000" dirty="0" err="1"/>
+              <a:t>administracion</a:t>
+            </a:r>
+            <a:r>
+              <a:rPr lang="en-US" sz="2000" dirty="0"/>
+              <a:t> de </a:t>
+            </a:r>
+            <a:r>
+              <a:rPr lang="en-US" sz="2000" dirty="0" err="1"/>
+              <a:t>procesos</a:t>
+            </a:r>
+            <a:r>
+              <a:rPr lang="en-US" sz="2000" dirty="0"/>
               <a:t>.</a:t>
             </a:r>
+            <a:endParaRPr lang="en-US" sz="2000" dirty="0">
+              <a:cs typeface="Calibri"/>
+            </a:endParaRPr>
           </a:p>
           <a:p>
             <a:pPr indent="-228600">
@@ -9892,394 +10666,386 @@
               <a:buChar char="•"/>
             </a:pPr>
             <a:r>
-              <a:rPr lang="en-US" sz="2000"/>
+              <a:rPr lang="en-US" sz="2000" dirty="0"/>
               <a:t>Para </a:t>
             </a:r>
             <a:r>
-              <a:rPr lang="en-US" sz="2000" err="1"/>
+              <a:rPr lang="en-US" sz="2000" dirty="0" err="1"/>
               <a:t>lograr</a:t>
             </a:r>
             <a:r>
-              <a:rPr lang="en-US" sz="2000"/>
+              <a:rPr lang="en-US" sz="2000" dirty="0"/>
               <a:t> que </a:t>
             </a:r>
             <a:r>
-              <a:rPr lang="en-US" sz="2000" err="1"/>
+              <a:rPr lang="en-US" sz="2000" dirty="0" err="1"/>
               <a:t>los</a:t>
             </a:r>
             <a:r>
-              <a:rPr lang="en-US" sz="2000"/>
+              <a:rPr lang="en-US" sz="2000" dirty="0"/>
               <a:t> </a:t>
             </a:r>
             <a:r>
-              <a:rPr lang="en-US" sz="2000" err="1"/>
+              <a:rPr lang="en-US" sz="2000" dirty="0" err="1"/>
               <a:t>procesos</a:t>
             </a:r>
             <a:r>
-              <a:rPr lang="en-US" sz="2000"/>
+              <a:rPr lang="en-US" sz="2000" dirty="0"/>
               <a:t> y </a:t>
             </a:r>
             <a:r>
-              <a:rPr lang="en-US" sz="2000" err="1"/>
+              <a:rPr lang="en-US" sz="2000" dirty="0" err="1"/>
               <a:t>los</a:t>
             </a:r>
             <a:r>
-              <a:rPr lang="en-US" sz="2000"/>
+              <a:rPr lang="en-US" sz="2000" dirty="0"/>
               <a:t> </a:t>
             </a:r>
             <a:r>
-              <a:rPr lang="en-US" sz="2000" err="1"/>
+              <a:rPr lang="en-US" sz="2000" dirty="0" err="1"/>
               <a:t>objetivos</a:t>
             </a:r>
             <a:r>
-              <a:rPr lang="en-US" sz="2000"/>
+              <a:rPr lang="en-US" sz="2000" dirty="0"/>
               <a:t> </a:t>
             </a:r>
             <a:r>
-              <a:rPr lang="en-US" sz="2000" err="1"/>
+              <a:rPr lang="en-US" sz="2000" dirty="0" err="1"/>
               <a:t>esperados</a:t>
             </a:r>
             <a:r>
-              <a:rPr lang="en-US" sz="2000"/>
+              <a:rPr lang="en-US" sz="2000" dirty="0"/>
               <a:t> se </a:t>
             </a:r>
             <a:r>
-              <a:rPr lang="en-US" sz="2000" err="1"/>
+              <a:rPr lang="en-US" sz="2000" dirty="0" err="1"/>
               <a:t>realizen</a:t>
             </a:r>
             <a:r>
-              <a:rPr lang="en-US" sz="2000"/>
+              <a:rPr lang="en-US" sz="2000" dirty="0"/>
               <a:t> , se </a:t>
             </a:r>
             <a:r>
-              <a:rPr lang="en-US" sz="2000" err="1"/>
+              <a:rPr lang="en-US" sz="2000" dirty="0" err="1"/>
               <a:t>puedan</a:t>
             </a:r>
             <a:r>
-              <a:rPr lang="en-US" sz="2000"/>
+              <a:rPr lang="en-US" sz="2000" dirty="0"/>
               <a:t> </a:t>
             </a:r>
             <a:r>
-              <a:rPr lang="en-US" sz="2000" err="1"/>
+              <a:rPr lang="en-US" sz="2000" dirty="0" err="1"/>
               <a:t>reducir</a:t>
             </a:r>
             <a:r>
-              <a:rPr lang="en-US" sz="2000"/>
+              <a:rPr lang="en-US" sz="2000" dirty="0"/>
               <a:t> </a:t>
             </a:r>
             <a:r>
-              <a:rPr lang="en-US" sz="2000" err="1"/>
+              <a:rPr lang="en-US" sz="2000" dirty="0" err="1"/>
               <a:t>los</a:t>
             </a:r>
             <a:r>
-              <a:rPr lang="en-US" sz="2000"/>
+              <a:rPr lang="en-US" sz="2000" dirty="0"/>
               <a:t> </a:t>
             </a:r>
             <a:r>
-              <a:rPr lang="en-US" sz="2000" err="1"/>
+              <a:rPr lang="en-US" sz="2000" dirty="0" err="1"/>
               <a:t>problemas</a:t>
             </a:r>
             <a:r>
-              <a:rPr lang="en-US" sz="2000"/>
+              <a:rPr lang="en-US" sz="2000" dirty="0"/>
               <a:t> </a:t>
             </a:r>
             <a:r>
-              <a:rPr lang="en-US" sz="2000" err="1"/>
+              <a:rPr lang="en-US" sz="2000" dirty="0" err="1"/>
               <a:t>presentados</a:t>
             </a:r>
             <a:r>
-              <a:rPr lang="en-US" sz="2000"/>
+              <a:rPr lang="en-US" sz="2000" dirty="0"/>
               <a:t>, </a:t>
             </a:r>
             <a:r>
-              <a:rPr lang="en-US" sz="2000" err="1"/>
+              <a:rPr lang="en-US" sz="2000" dirty="0" err="1"/>
               <a:t>como</a:t>
             </a:r>
             <a:r>
-              <a:rPr lang="en-US" sz="2000"/>
+              <a:rPr lang="en-US" sz="2000" dirty="0"/>
+              <a:t> la </a:t>
+            </a:r>
+            <a:r>
+              <a:rPr lang="en-US" sz="2000" dirty="0" err="1"/>
+              <a:t>calidad</a:t>
+            </a:r>
+            <a:r>
+              <a:rPr lang="en-US" sz="2000" dirty="0"/>
+              <a:t> de </a:t>
+            </a:r>
+            <a:r>
+              <a:rPr lang="en-US" sz="2000" dirty="0" err="1"/>
+              <a:t>los</a:t>
+            </a:r>
+            <a:r>
+              <a:rPr lang="en-US" sz="2000" dirty="0"/>
               <a:t> </a:t>
             </a:r>
             <a:r>
-              <a:rPr lang="en-US" sz="2000" err="1"/>
-              <a:t>también</a:t>
-            </a:r>
-            <a:r>
-              <a:rPr lang="en-US" sz="2000"/>
+              <a:rPr lang="en-US" sz="2000" dirty="0" err="1"/>
+              <a:t>servicios</a:t>
+            </a:r>
+            <a:r>
+              <a:rPr lang="en-US" sz="2000" dirty="0"/>
+              <a:t> a </a:t>
+            </a:r>
+            <a:r>
+              <a:rPr lang="en-US" sz="2000" dirty="0" err="1"/>
+              <a:t>prestar</a:t>
+            </a:r>
+            <a:r>
+              <a:rPr lang="en-US" sz="2000" dirty="0"/>
+              <a:t> </a:t>
+            </a:r>
+            <a:r>
+              <a:rPr lang="en-US" sz="2000" dirty="0" err="1"/>
+              <a:t>por</a:t>
+            </a:r>
+            <a:r>
+              <a:rPr lang="en-US" sz="2000" dirty="0"/>
+              <a:t> </a:t>
+            </a:r>
+            <a:r>
+              <a:rPr lang="en-US" sz="2000" dirty="0" err="1"/>
+              <a:t>parte</a:t>
+            </a:r>
+            <a:r>
+              <a:rPr lang="en-US" sz="2000" dirty="0"/>
+              <a:t> de la </a:t>
+            </a:r>
+            <a:r>
+              <a:rPr lang="en-US" sz="2000" dirty="0" err="1"/>
+              <a:t>veterinaria</a:t>
+            </a:r>
+            <a:r>
+              <a:rPr lang="en-US" sz="2000" dirty="0"/>
+              <a:t> </a:t>
+            </a:r>
+            <a:r>
+              <a:rPr lang="en-US" sz="2000" dirty="0" err="1"/>
+              <a:t>mejoren</a:t>
+            </a:r>
+            <a:r>
+              <a:rPr lang="en-US" sz="2000" dirty="0"/>
+              <a:t>, es </a:t>
+            </a:r>
+            <a:r>
+              <a:rPr lang="en-US" sz="2000" dirty="0" err="1"/>
+              <a:t>necesario</a:t>
+            </a:r>
+            <a:r>
+              <a:rPr lang="en-US" sz="2000" dirty="0"/>
+              <a:t> </a:t>
+            </a:r>
+            <a:r>
+              <a:rPr lang="en-US" sz="2000" dirty="0" err="1"/>
+              <a:t>construir</a:t>
+            </a:r>
+            <a:r>
+              <a:rPr lang="en-US" sz="2000" dirty="0"/>
+              <a:t>  un </a:t>
+            </a:r>
+            <a:r>
+              <a:rPr lang="en-US" sz="2000" dirty="0" err="1"/>
+              <a:t>sistema</a:t>
+            </a:r>
+            <a:r>
+              <a:rPr lang="en-US" sz="2000" dirty="0"/>
+              <a:t> de </a:t>
+            </a:r>
+            <a:r>
+              <a:rPr lang="en-US" sz="2000" dirty="0" err="1"/>
+              <a:t>información</a:t>
+            </a:r>
+            <a:r>
+              <a:rPr lang="en-US" sz="2000" dirty="0"/>
+              <a:t>  que </a:t>
+            </a:r>
+            <a:r>
+              <a:rPr lang="en-US" sz="2000" dirty="0" err="1"/>
+              <a:t>permita</a:t>
+            </a:r>
+            <a:r>
+              <a:rPr lang="en-US" sz="2000" dirty="0"/>
+              <a:t> </a:t>
+            </a:r>
+            <a:r>
+              <a:rPr lang="en-US" sz="2000" dirty="0" err="1"/>
+              <a:t>apoyar</a:t>
+            </a:r>
+            <a:r>
+              <a:rPr lang="en-US" sz="2000" dirty="0"/>
+              <a:t> </a:t>
+            </a:r>
+            <a:r>
+              <a:rPr lang="en-US" sz="2000" dirty="0" err="1"/>
+              <a:t>los</a:t>
+            </a:r>
+            <a:r>
+              <a:rPr lang="en-US" sz="2000" dirty="0"/>
+              <a:t> </a:t>
+            </a:r>
+            <a:r>
+              <a:rPr lang="en-US" sz="2000" dirty="0" err="1"/>
+              <a:t>procesos</a:t>
+            </a:r>
+            <a:r>
+              <a:rPr lang="en-US" sz="2000" dirty="0"/>
+              <a:t> de </a:t>
+            </a:r>
+            <a:r>
+              <a:rPr lang="en-US" sz="2000" dirty="0" err="1"/>
+              <a:t>una</a:t>
+            </a:r>
+            <a:r>
+              <a:rPr lang="en-US" sz="2000" dirty="0"/>
+              <a:t> </a:t>
+            </a:r>
+            <a:r>
+              <a:rPr lang="en-US" sz="2000" dirty="0" err="1"/>
+              <a:t>manera</a:t>
+            </a:r>
+            <a:r>
+              <a:rPr lang="en-US" sz="2000" dirty="0"/>
+              <a:t> </a:t>
+            </a:r>
+            <a:r>
+              <a:rPr lang="en-US" sz="2000" dirty="0" err="1"/>
+              <a:t>más</a:t>
+            </a:r>
+            <a:r>
+              <a:rPr lang="en-US" sz="2000" dirty="0"/>
+              <a:t> </a:t>
+            </a:r>
+            <a:r>
+              <a:rPr lang="en-US" sz="2000" dirty="0" err="1"/>
+              <a:t>ágil</a:t>
+            </a:r>
+            <a:r>
+              <a:rPr lang="en-US" sz="2000" dirty="0"/>
+              <a:t> y </a:t>
+            </a:r>
+            <a:r>
+              <a:rPr lang="en-US" sz="2000" dirty="0" err="1"/>
+              <a:t>eficaz</a:t>
+            </a:r>
+            <a:r>
+              <a:rPr lang="en-US" sz="2000" dirty="0"/>
+              <a:t>, </a:t>
+            </a:r>
+            <a:r>
+              <a:rPr lang="en-US" sz="2000" dirty="0" err="1"/>
+              <a:t>donde</a:t>
+            </a:r>
+            <a:r>
+              <a:rPr lang="en-US" sz="2000" dirty="0"/>
               <a:t> la </a:t>
             </a:r>
             <a:r>
-              <a:rPr lang="en-US" sz="2000" err="1"/>
-              <a:t>calidad</a:t>
-            </a:r>
-            <a:r>
-              <a:rPr lang="en-US" sz="2000"/>
+              <a:rPr lang="en-US" sz="2000" dirty="0" err="1"/>
+              <a:t>empresa</a:t>
+            </a:r>
+            <a:r>
+              <a:rPr lang="en-US" sz="2000" dirty="0"/>
+              <a:t>, </a:t>
+            </a:r>
+            <a:r>
+              <a:rPr lang="en-US" sz="2000" dirty="0" err="1"/>
+              <a:t>los</a:t>
+            </a:r>
+            <a:r>
+              <a:rPr lang="en-US" sz="2000" dirty="0"/>
+              <a:t> </a:t>
+            </a:r>
+            <a:r>
+              <a:rPr lang="en-US" sz="2000" dirty="0" err="1"/>
+              <a:t>clientes</a:t>
+            </a:r>
+            <a:r>
+              <a:rPr lang="en-US" sz="2000" dirty="0"/>
+              <a:t> y </a:t>
+            </a:r>
+            <a:r>
+              <a:rPr lang="en-US" sz="2000" dirty="0" err="1"/>
+              <a:t>los</a:t>
+            </a:r>
+            <a:r>
+              <a:rPr lang="en-US" sz="2000" dirty="0"/>
+              <a:t> </a:t>
+            </a:r>
+            <a:r>
+              <a:rPr lang="en-US" sz="2000" dirty="0" err="1"/>
+              <a:t>trabajadores</a:t>
+            </a:r>
+            <a:r>
+              <a:rPr lang="en-US" sz="2000" dirty="0"/>
               <a:t> de </a:t>
             </a:r>
             <a:r>
-              <a:rPr lang="en-US" sz="2000" err="1"/>
+              <a:rPr lang="en-US" sz="2000" dirty="0" err="1"/>
+              <a:t>esta</a:t>
+            </a:r>
+            <a:r>
+              <a:rPr lang="en-US" sz="2000" dirty="0"/>
+              <a:t> </a:t>
+            </a:r>
+            <a:r>
+              <a:rPr lang="en-US" sz="2000" dirty="0" err="1"/>
+              <a:t>tendrán</a:t>
+            </a:r>
+            <a:r>
+              <a:rPr lang="en-US" sz="2000" dirty="0"/>
+              <a:t> un </a:t>
+            </a:r>
+            <a:r>
+              <a:rPr lang="en-US" sz="2000" dirty="0" err="1"/>
+              <a:t>mejor</a:t>
+            </a:r>
+            <a:r>
+              <a:rPr lang="en-US" sz="2000" dirty="0"/>
+              <a:t> </a:t>
+            </a:r>
+            <a:r>
+              <a:rPr lang="en-US" sz="2000" dirty="0" err="1"/>
+              <a:t>manejo</a:t>
+            </a:r>
+            <a:r>
+              <a:rPr lang="en-US" sz="2000" dirty="0"/>
+              <a:t> </a:t>
+            </a:r>
+            <a:r>
+              <a:rPr lang="en-US" sz="2000" dirty="0" err="1"/>
+              <a:t>sobre</a:t>
+            </a:r>
+            <a:r>
+              <a:rPr lang="en-US" sz="2000" dirty="0"/>
+              <a:t> </a:t>
+            </a:r>
+            <a:r>
+              <a:rPr lang="en-US" sz="2000" dirty="0" err="1"/>
               <a:t>los</a:t>
             </a:r>
             <a:r>
-              <a:rPr lang="en-US" sz="2000"/>
+              <a:rPr lang="en-US" sz="2000" dirty="0"/>
               <a:t> </a:t>
             </a:r>
             <a:r>
-              <a:rPr lang="en-US" sz="2000" err="1"/>
-              <a:t>servicios</a:t>
-            </a:r>
-            <a:r>
-              <a:rPr lang="en-US" sz="2000"/>
-              <a:t> a </a:t>
-            </a:r>
-            <a:r>
-              <a:rPr lang="en-US" sz="2000" err="1"/>
-              <a:t>prestar</a:t>
-            </a:r>
-            <a:r>
-              <a:rPr lang="en-US" sz="2000"/>
-              <a:t> </a:t>
-            </a:r>
-            <a:r>
-              <a:rPr lang="en-US" sz="2000" err="1"/>
-              <a:t>por</a:t>
-            </a:r>
-            <a:r>
-              <a:rPr lang="en-US" sz="2000"/>
-              <a:t> </a:t>
-            </a:r>
-            <a:r>
-              <a:rPr lang="en-US" sz="2000" err="1"/>
-              <a:t>parte</a:t>
-            </a:r>
-            <a:r>
-              <a:rPr lang="en-US" sz="2000"/>
-              <a:t> de la </a:t>
-            </a:r>
-            <a:r>
-              <a:rPr lang="en-US" sz="2000" err="1"/>
-              <a:t>veterinaria</a:t>
-            </a:r>
-            <a:r>
-              <a:rPr lang="en-US" sz="2000"/>
-              <a:t> </a:t>
-            </a:r>
-            <a:r>
-              <a:rPr lang="en-US" sz="2000" err="1"/>
-              <a:t>mejoren</a:t>
-            </a:r>
-            <a:r>
-              <a:rPr lang="en-US" sz="2000"/>
-              <a:t>, es </a:t>
-            </a:r>
-            <a:r>
-              <a:rPr lang="en-US" sz="2000" err="1"/>
-              <a:t>necesario</a:t>
-            </a:r>
-            <a:r>
-              <a:rPr lang="en-US" sz="2000"/>
-              <a:t> </a:t>
-            </a:r>
-            <a:r>
-              <a:rPr lang="en-US" sz="2000" err="1"/>
-              <a:t>construir</a:t>
-            </a:r>
-            <a:r>
-              <a:rPr lang="en-US" sz="2000"/>
-              <a:t>  un </a:t>
-            </a:r>
-            <a:r>
-              <a:rPr lang="en-US" sz="2000" err="1"/>
-              <a:t>sistema</a:t>
-            </a:r>
-            <a:r>
-              <a:rPr lang="en-US" sz="2000"/>
-              <a:t> de </a:t>
-            </a:r>
-            <a:r>
-              <a:rPr lang="en-US" sz="2000" err="1"/>
-              <a:t>información</a:t>
-            </a:r>
-            <a:r>
-              <a:rPr lang="en-US" sz="2000"/>
-              <a:t>  que </a:t>
-            </a:r>
-            <a:r>
-              <a:rPr lang="en-US" sz="2000" err="1"/>
-              <a:t>permita</a:t>
-            </a:r>
-            <a:r>
-              <a:rPr lang="en-US" sz="2000"/>
-              <a:t> </a:t>
-            </a:r>
-            <a:r>
-              <a:rPr lang="en-US" sz="2000" err="1"/>
-              <a:t>apoyar</a:t>
-            </a:r>
-            <a:r>
-              <a:rPr lang="en-US" sz="2000"/>
-              <a:t> </a:t>
-            </a:r>
-            <a:r>
-              <a:rPr lang="en-US" sz="2000" err="1"/>
-              <a:t>los</a:t>
-            </a:r>
-            <a:r>
-              <a:rPr lang="en-US" sz="2000"/>
-              <a:t> </a:t>
-            </a:r>
-            <a:r>
-              <a:rPr lang="en-US" sz="2000" err="1"/>
+              <a:rPr lang="en-US" sz="2000" dirty="0" err="1"/>
               <a:t>procesos</a:t>
             </a:r>
             <a:r>
-              <a:rPr lang="en-US" sz="2000"/>
-              <a:t> de </a:t>
-            </a:r>
-            <a:r>
-              <a:rPr lang="en-US" sz="2000" err="1"/>
-              <a:t>una</a:t>
-            </a:r>
-            <a:r>
-              <a:rPr lang="en-US" sz="2000"/>
-              <a:t> </a:t>
-            </a:r>
-            <a:r>
-              <a:rPr lang="en-US" sz="2000" err="1"/>
-              <a:t>manera</a:t>
-            </a:r>
-            <a:r>
-              <a:rPr lang="en-US" sz="2000"/>
-              <a:t> </a:t>
-            </a:r>
-            <a:r>
-              <a:rPr lang="en-US" sz="2000" err="1"/>
-              <a:t>más</a:t>
-            </a:r>
-            <a:r>
-              <a:rPr lang="en-US" sz="2000"/>
-              <a:t> </a:t>
-            </a:r>
-            <a:r>
-              <a:rPr lang="en-US" sz="2000" err="1"/>
-              <a:t>ágil</a:t>
-            </a:r>
-            <a:r>
-              <a:rPr lang="en-US" sz="2000"/>
-              <a:t> y </a:t>
-            </a:r>
-            <a:r>
-              <a:rPr lang="en-US" sz="2000" err="1"/>
-              <a:t>eficaz</a:t>
-            </a:r>
-            <a:r>
-              <a:rPr lang="en-US" sz="2000"/>
-              <a:t>, </a:t>
-            </a:r>
-            <a:r>
-              <a:rPr lang="en-US" sz="2000" err="1"/>
-              <a:t>donde</a:t>
-            </a:r>
-            <a:r>
-              <a:rPr lang="en-US" sz="2000"/>
-              <a:t> la </a:t>
-            </a:r>
-            <a:r>
-              <a:rPr lang="en-US" sz="2000" err="1"/>
-              <a:t>empresa</a:t>
-            </a:r>
-            <a:r>
-              <a:rPr lang="en-US" sz="2000"/>
-              <a:t>, </a:t>
-            </a:r>
-            <a:r>
-              <a:rPr lang="en-US" sz="2000" err="1"/>
-              <a:t>los</a:t>
-            </a:r>
-            <a:r>
-              <a:rPr lang="en-US" sz="2000"/>
-              <a:t> </a:t>
-            </a:r>
-            <a:r>
-              <a:rPr lang="en-US" sz="2000" err="1"/>
-              <a:t>clientes</a:t>
-            </a:r>
-            <a:r>
-              <a:rPr lang="en-US" sz="2000"/>
-              <a:t> y </a:t>
-            </a:r>
-            <a:r>
-              <a:rPr lang="en-US" sz="2000" err="1"/>
-              <a:t>los</a:t>
-            </a:r>
-            <a:r>
-              <a:rPr lang="en-US" sz="2000"/>
-              <a:t> </a:t>
-            </a:r>
-            <a:r>
-              <a:rPr lang="en-US" sz="2000" err="1"/>
-              <a:t>trabajadores</a:t>
-            </a:r>
-            <a:r>
-              <a:rPr lang="en-US" sz="2000"/>
-              <a:t> de </a:t>
-            </a:r>
-            <a:r>
-              <a:rPr lang="en-US" sz="2000" err="1"/>
-              <a:t>esta</a:t>
-            </a:r>
-            <a:r>
-              <a:rPr lang="en-US" sz="2000"/>
-              <a:t> </a:t>
-            </a:r>
-            <a:r>
-              <a:rPr lang="en-US" sz="2000" err="1"/>
-              <a:t>tendrán</a:t>
-            </a:r>
-            <a:r>
-              <a:rPr lang="en-US" sz="2000"/>
-              <a:t> un </a:t>
-            </a:r>
-            <a:r>
-              <a:rPr lang="en-US" sz="2000" err="1"/>
-              <a:t>mejor</a:t>
-            </a:r>
-            <a:r>
-              <a:rPr lang="en-US" sz="2000"/>
-              <a:t> </a:t>
-            </a:r>
-            <a:r>
-              <a:rPr lang="en-US" sz="2000" err="1"/>
-              <a:t>manejo</a:t>
-            </a:r>
-            <a:r>
-              <a:rPr lang="en-US" sz="2000"/>
-              <a:t> </a:t>
-            </a:r>
-            <a:r>
-              <a:rPr lang="en-US" sz="2000" err="1"/>
-              <a:t>sobre</a:t>
-            </a:r>
-            <a:r>
-              <a:rPr lang="en-US" sz="2000"/>
-              <a:t> </a:t>
-            </a:r>
-            <a:r>
-              <a:rPr lang="en-US" sz="2000" err="1"/>
-              <a:t>los</a:t>
-            </a:r>
-            <a:r>
-              <a:rPr lang="en-US" sz="2000"/>
-              <a:t> </a:t>
-            </a:r>
-            <a:r>
-              <a:rPr lang="en-US" sz="2000" err="1"/>
-              <a:t>procesos</a:t>
-            </a:r>
-            <a:r>
-              <a:rPr lang="en-US" sz="2000"/>
+              <a:rPr lang="en-US" sz="2000" dirty="0"/>
               <a:t>.</a:t>
             </a:r>
-            <a:endParaRPr lang="en-US" sz="2000">
+            <a:endParaRPr lang="en-US" sz="2000" dirty="0">
               <a:ea typeface="Calibri"/>
               <a:cs typeface="Calibri"/>
             </a:endParaRPr>
@@ -10631,7 +11397,7 @@
               <a:rPr lang="es-CO" sz="1600" dirty="0">
                 <a:latin typeface="Work Sans Light Roman"/>
               </a:rPr>
-              <a:t>Desarrollar un sistema de información orientado a la gestión de procesos sobre las citas virtuales, inventarios a los ingresos y egresos del negocio, lo que son compras y ventas de este, perfil de la mascota, para una mejor administración de la CLINICA VETERINARIA CIUDAD CANINA, ubicada en el norte de la ciudad de Bogotá</a:t>
+              <a:t>Desarrollar un sistema de información orientado a la gestión de procesos sobre las citas virtuales, inventarios a los ingresos y egresos del negocio, las compras y ventas de este, perfil de la mascota, para una mejor administración de la CLINICA VETERINARIA CIUDAD CANINA, ubicada en el norte de la ciudad de Bogotá</a:t>
             </a:r>
             <a:endParaRPr lang="es-CO" sz="1600" dirty="0">
               <a:latin typeface="Work Sans Light Roman" pitchFamily="2" charset="77"/>
@@ -10923,7 +11689,7 @@
               <a:rPr lang="es-CO" sz="1600" dirty="0">
                 <a:latin typeface="Work Sans Light Roman"/>
               </a:rPr>
-              <a:t>Gestionar el sistema de inventarios como lo son los ingresos y egresos de este</a:t>
+              <a:t>Gestionar el sistema de inventarios de los ingresos y egresos de la veterinaria</a:t>
             </a:r>
             <a:endParaRPr lang="es-CO" sz="1600" dirty="0">
               <a:latin typeface="Work Sans Light Roman" pitchFamily="2" charset="77"/>

</xml_diff>

<commit_message>
Actualizacion y reemplazo presentacion JAME
</commit_message>
<xml_diff>
--- a/JAME.pptx
+++ b/JAME.pptx
@@ -5,10 +5,10 @@
     <p:sldMasterId id="2147483648" r:id="rId4"/>
   </p:sldMasterIdLst>
   <p:notesMasterIdLst>
-    <p:notesMasterId r:id="rId27"/>
+    <p:notesMasterId r:id="rId28"/>
   </p:notesMasterIdLst>
   <p:handoutMasterIdLst>
-    <p:handoutMasterId r:id="rId28"/>
+    <p:handoutMasterId r:id="rId29"/>
   </p:handoutMasterIdLst>
   <p:sldIdLst>
     <p:sldId id="538" r:id="rId5"/>
@@ -16,7 +16,7 @@
     <p:sldId id="539" r:id="rId7"/>
     <p:sldId id="537" r:id="rId8"/>
     <p:sldId id="545" r:id="rId9"/>
-    <p:sldId id="544" r:id="rId10"/>
+    <p:sldId id="557" r:id="rId10"/>
     <p:sldId id="541" r:id="rId11"/>
     <p:sldId id="543" r:id="rId12"/>
     <p:sldId id="536" r:id="rId13"/>
@@ -26,13 +26,14 @@
     <p:sldId id="549" r:id="rId17"/>
     <p:sldId id="550" r:id="rId18"/>
     <p:sldId id="542" r:id="rId19"/>
-    <p:sldId id="552" r:id="rId20"/>
-    <p:sldId id="553" r:id="rId21"/>
-    <p:sldId id="554" r:id="rId22"/>
-    <p:sldId id="548" r:id="rId23"/>
-    <p:sldId id="556" r:id="rId24"/>
-    <p:sldId id="555" r:id="rId25"/>
-    <p:sldId id="531" r:id="rId26"/>
+    <p:sldId id="558" r:id="rId20"/>
+    <p:sldId id="552" r:id="rId21"/>
+    <p:sldId id="553" r:id="rId22"/>
+    <p:sldId id="554" r:id="rId23"/>
+    <p:sldId id="548" r:id="rId24"/>
+    <p:sldId id="556" r:id="rId25"/>
+    <p:sldId id="555" r:id="rId26"/>
+    <p:sldId id="531" r:id="rId27"/>
   </p:sldIdLst>
   <p:sldSz cx="12192000" cy="6858000"/>
   <p:notesSz cx="6858000" cy="9144000"/>
@@ -161,10 +162,9 @@
 <file path=ppt/revisionInfo.xml><?xml version="1.0" encoding="utf-8"?>
 <p1510:revInfo xmlns:a="http://schemas.openxmlformats.org/drawingml/2006/main" xmlns:r="http://schemas.openxmlformats.org/officeDocument/2006/relationships" xmlns:p1510="http://schemas.microsoft.com/office/powerpoint/2015/10/main">
   <p1510:revLst>
-    <p1510:client id="{43FFE7DE-3D3F-FC59-6A93-377FAD744D26}" v="29" dt="2024-03-21T20:18:35.409"/>
-    <p1510:client id="{81C81DE2-8526-21ED-8240-D2E60F0CAE07}" v="93" dt="2024-03-21T20:19:51.947"/>
-    <p1510:client id="{900BA688-DD1E-CC4A-400A-0C39674F960F}" v="652" dt="2024-03-21T20:25:39.051"/>
-    <p1510:client id="{9DF85DFA-0358-81CF-A4BB-1B5A340EEFB9}" v="2" dt="2024-03-21T20:20:22.657"/>
+    <p1510:client id="{37288E51-3623-B743-9669-F5F30E47C02F}" v="1008" dt="2024-04-03T14:34:05.322"/>
+    <p1510:client id="{A86F5075-847C-82AC-9799-66523CFAC897}" v="1328" dt="2024-04-03T20:53:02.445"/>
+    <p1510:client id="{C6EFD1A5-7B4F-CF54-588B-612A84EF6432}" v="167" dt="2024-04-02T02:30:03.340"/>
   </p1510:revLst>
 </p1510:revInfo>
 </file>
@@ -937,11 +937,42 @@
         <a:bodyPr/>
         <a:lstStyle/>
         <a:p>
+          <a:pPr rtl="0"/>
           <a:r>
-            <a:rPr lang="es-CO"/>
-            <a:t>¿Podrías contarme que problemas posees frente a los procesos que se llevan a cabo?</a:t>
+            <a:rPr lang="es-CO" dirty="0"/>
+            <a:t>¿</a:t>
           </a:r>
-          <a:endParaRPr lang="en-US"/>
+          <a:r>
+            <a:rPr lang="es-CO" dirty="0">
+              <a:latin typeface="Calibri Light" panose="020F0302020204030204"/>
+            </a:rPr>
+            <a:t>Podría</a:t>
+          </a:r>
+          <a:r>
+            <a:rPr lang="es-CO" dirty="0"/>
+            <a:t> contarme que problemas </a:t>
+          </a:r>
+          <a:r>
+            <a:rPr lang="es-CO" dirty="0">
+              <a:latin typeface="Calibri Light" panose="020F0302020204030204"/>
+            </a:rPr>
+            <a:t>posee frente</a:t>
+          </a:r>
+          <a:r>
+            <a:rPr lang="es-CO" dirty="0"/>
+            <a:t> a los procesos que se llevan a cabo</a:t>
+          </a:r>
+          <a:r>
+            <a:rPr lang="es-CO" dirty="0">
+              <a:latin typeface="Calibri Light" panose="020F0302020204030204"/>
+            </a:rPr>
+            <a:t> en la veterinaria</a:t>
+          </a:r>
+          <a:r>
+            <a:rPr lang="es-CO" dirty="0"/>
+            <a:t>?</a:t>
+          </a:r>
+          <a:endParaRPr lang="en-US" dirty="0"/>
         </a:p>
       </dgm:t>
     </dgm:pt>
@@ -974,11 +1005,18 @@
         <a:bodyPr/>
         <a:lstStyle/>
         <a:p>
+          <a:pPr rtl="0"/>
           <a:r>
-            <a:rPr lang="es-CO"/>
-            <a:t>¿Qué objetivos tiene la veterinaria en un lapso de 4 años?</a:t>
+            <a:rPr lang="es-CO" dirty="0"/>
+            <a:t>¿Que espectativas tiene frente al sistema a realizar para la veternaria ciudad canina</a:t>
           </a:r>
-          <a:endParaRPr lang="en-US"/>
+          <a:r>
+            <a:rPr lang="es-CO" dirty="0">
+              <a:latin typeface="Calibri Light" panose="020F0302020204030204"/>
+            </a:rPr>
+            <a:t>?</a:t>
+          </a:r>
+          <a:endParaRPr lang="en-US" dirty="0"/>
         </a:p>
       </dgm:t>
     </dgm:pt>
@@ -1011,11 +1049,38 @@
         <a:bodyPr/>
         <a:lstStyle/>
         <a:p>
+          <a:pPr rtl="0"/>
           <a:r>
-            <a:rPr lang="es-CO"/>
-            <a:t>¿Cómo gestionas los procesos de citas frente a las consultas y las citas de grooming de las mascotas?</a:t>
+            <a:rPr lang="es-CO" dirty="0"/>
+            <a:t>¿Cómo </a:t>
           </a:r>
-          <a:endParaRPr lang="en-US"/>
+          <a:r>
+            <a:rPr lang="es-CO" dirty="0">
+              <a:latin typeface="Calibri Light" panose="020F0302020204030204"/>
+            </a:rPr>
+            <a:t>gestiona</a:t>
+          </a:r>
+          <a:r>
+            <a:rPr lang="es-CO" dirty="0"/>
+            <a:t> los procesos de citas</a:t>
+          </a:r>
+          <a:r>
+            <a:rPr lang="es-CO" dirty="0">
+              <a:latin typeface="Calibri Light" panose="020F0302020204030204"/>
+            </a:rPr>
+            <a:t> de las</a:t>
+          </a:r>
+          <a:r>
+            <a:rPr lang="es-CO" dirty="0"/>
+            <a:t> consultas y las citas de grooming de las mascotas</a:t>
+          </a:r>
+          <a:r>
+            <a:rPr lang="es-CO" dirty="0">
+              <a:latin typeface="Calibri Light" panose="020F0302020204030204"/>
+            </a:rPr>
+            <a:t>?¿Que problemas tiene esto?</a:t>
+          </a:r>
+          <a:endParaRPr lang="en-US" dirty="0"/>
         </a:p>
       </dgm:t>
     </dgm:pt>
@@ -1049,10 +1114,10 @@
         <a:lstStyle/>
         <a:p>
           <a:r>
-            <a:rPr lang="es-CO"/>
+            <a:rPr lang="es-CO" dirty="0"/>
             <a:t>¿Cómo se maneja el proceso de inventario y la gestión de proveedores en la veterinaria?</a:t>
           </a:r>
-          <a:endParaRPr lang="en-US"/>
+          <a:endParaRPr lang="en-US" dirty="0"/>
         </a:p>
       </dgm:t>
     </dgm:pt>
@@ -1085,11 +1150,22 @@
         <a:bodyPr/>
         <a:lstStyle/>
         <a:p>
+          <a:pPr rtl="0"/>
           <a:r>
-            <a:rPr lang="es-CO"/>
-            <a:t>¿Hay algún plan de cómo mejorar o tecnificar la veterinaria a un largo plazo?</a:t>
+            <a:rPr lang="es-CO" dirty="0"/>
+            <a:t>¿Hay algún plan de cómo mejorar o tecnificar la veterinaria a un </a:t>
           </a:r>
-          <a:endParaRPr lang="en-US"/>
+          <a:r>
+            <a:rPr lang="es-CO" dirty="0">
+              <a:latin typeface="Calibri Light" panose="020F0302020204030204"/>
+            </a:rPr>
+            <a:t>mediano plazo</a:t>
+          </a:r>
+          <a:r>
+            <a:rPr lang="es-CO" dirty="0"/>
+            <a:t>?</a:t>
+          </a:r>
+          <a:endParaRPr lang="en-US" dirty="0"/>
         </a:p>
       </dgm:t>
     </dgm:pt>
@@ -1122,11 +1198,42 @@
         <a:bodyPr/>
         <a:lstStyle/>
         <a:p>
+          <a:pPr rtl="0"/>
           <a:r>
-            <a:rPr lang="es-CO"/>
-            <a:t>¿Cómo has manejado los últimos 5 años el manejo del ingreso de las mascotas? </a:t>
+            <a:rPr lang="es-CO" dirty="0"/>
+            <a:t>¿Cómo </a:t>
           </a:r>
-          <a:endParaRPr lang="en-US"/>
+          <a:r>
+            <a:rPr lang="es-CO" dirty="0">
+              <a:latin typeface="Calibri Light" panose="020F0302020204030204"/>
+            </a:rPr>
+            <a:t>ha sido el manejo en últimos</a:t>
+          </a:r>
+          <a:r>
+            <a:rPr lang="es-CO" dirty="0"/>
+            <a:t> 5 años </a:t>
+          </a:r>
+          <a:r>
+            <a:rPr lang="es-CO" dirty="0">
+              <a:latin typeface="Calibri Light" panose="020F0302020204030204"/>
+            </a:rPr>
+            <a:t>del</a:t>
+          </a:r>
+          <a:r>
+            <a:rPr lang="es-CO" dirty="0"/>
+            <a:t> ingreso de las mascotas</a:t>
+          </a:r>
+          <a:r>
+            <a:rPr lang="es-CO" dirty="0">
+              <a:latin typeface="Calibri Light" panose="020F0302020204030204"/>
+            </a:rPr>
+            <a:t>, cuando son nuevas, en especial en la informacion del cliente y la mascota?</a:t>
+          </a:r>
+          <a:r>
+            <a:rPr lang="es-CO" dirty="0"/>
+            <a:t> </a:t>
+          </a:r>
+          <a:endParaRPr lang="en-US" dirty="0"/>
         </a:p>
       </dgm:t>
     </dgm:pt>
@@ -1266,7 +1373,7 @@
   <dgm:whole/>
   <dgm:extLst>
     <a:ext uri="http://schemas.microsoft.com/office/drawing/2008/diagram">
-      <dsp:dataModelExt xmlns:dsp="http://schemas.microsoft.com/office/drawing/2008/diagram" relId="rId8" minVer="http://schemas.openxmlformats.org/drawingml/2006/diagram"/>
+      <dsp:dataModelExt xmlns:dsp="http://schemas.microsoft.com/office/drawing/2008/diagram" relId="rId7" minVer="http://schemas.openxmlformats.org/drawingml/2006/diagram"/>
     </a:ext>
   </dgm:extLst>
 </dgm:dataModel>
@@ -1335,7 +1442,7 @@
         </a:bodyPr>
         <a:lstStyle/>
         <a:p>
-          <a:pPr marL="0" lvl="0" indent="0" algn="l" defTabSz="577850">
+          <a:pPr marL="0" lvl="0" indent="0" algn="l" defTabSz="577850" rtl="0">
             <a:lnSpc>
               <a:spcPct val="90000"/>
             </a:lnSpc>
@@ -1348,10 +1455,40 @@
             <a:buNone/>
           </a:pPr>
           <a:r>
-            <a:rPr lang="es-CO" sz="1300" kern="1200"/>
-            <a:t>¿Podrías contarme que problemas posees frente a los procesos que se llevan a cabo?</a:t>
+            <a:rPr lang="es-CO" sz="1300" kern="1200" dirty="0"/>
+            <a:t>¿</a:t>
           </a:r>
-          <a:endParaRPr lang="en-US" sz="1300" kern="1200"/>
+          <a:r>
+            <a:rPr lang="es-CO" sz="1300" kern="1200" dirty="0">
+              <a:latin typeface="Calibri Light" panose="020F0302020204030204"/>
+            </a:rPr>
+            <a:t>Podría</a:t>
+          </a:r>
+          <a:r>
+            <a:rPr lang="es-CO" sz="1300" kern="1200" dirty="0"/>
+            <a:t> contarme que problemas </a:t>
+          </a:r>
+          <a:r>
+            <a:rPr lang="es-CO" sz="1300" kern="1200" dirty="0">
+              <a:latin typeface="Calibri Light" panose="020F0302020204030204"/>
+            </a:rPr>
+            <a:t>posee frente</a:t>
+          </a:r>
+          <a:r>
+            <a:rPr lang="es-CO" sz="1300" kern="1200" dirty="0"/>
+            <a:t> a los procesos que se llevan a cabo</a:t>
+          </a:r>
+          <a:r>
+            <a:rPr lang="es-CO" sz="1300" kern="1200" dirty="0">
+              <a:latin typeface="Calibri Light" panose="020F0302020204030204"/>
+            </a:rPr>
+            <a:t> en la veterinaria</a:t>
+          </a:r>
+          <a:r>
+            <a:rPr lang="es-CO" sz="1300" kern="1200" dirty="0"/>
+            <a:t>?</a:t>
+          </a:r>
+          <a:endParaRPr lang="en-US" sz="1300" kern="1200" dirty="0"/>
         </a:p>
       </dsp:txBody>
       <dsp:txXfrm>
@@ -1414,7 +1551,7 @@
         </a:bodyPr>
         <a:lstStyle/>
         <a:p>
-          <a:pPr marL="0" lvl="0" indent="0" algn="l" defTabSz="577850">
+          <a:pPr marL="0" lvl="0" indent="0" algn="l" defTabSz="577850" rtl="0">
             <a:lnSpc>
               <a:spcPct val="90000"/>
             </a:lnSpc>
@@ -1427,10 +1564,16 @@
             <a:buNone/>
           </a:pPr>
           <a:r>
-            <a:rPr lang="es-CO" sz="1300" kern="1200"/>
-            <a:t>¿Qué objetivos tiene la veterinaria en un lapso de 4 años?</a:t>
+            <a:rPr lang="es-CO" sz="1300" kern="1200" dirty="0"/>
+            <a:t>¿Que espectativas tiene frente al sistema a realizar para la veternaria ciudad canina</a:t>
           </a:r>
-          <a:endParaRPr lang="en-US" sz="1300" kern="1200"/>
+          <a:r>
+            <a:rPr lang="es-CO" sz="1300" kern="1200" dirty="0">
+              <a:latin typeface="Calibri Light" panose="020F0302020204030204"/>
+            </a:rPr>
+            <a:t>?</a:t>
+          </a:r>
+          <a:endParaRPr lang="en-US" sz="1300" kern="1200" dirty="0"/>
         </a:p>
       </dsp:txBody>
       <dsp:txXfrm>
@@ -1493,7 +1636,7 @@
         </a:bodyPr>
         <a:lstStyle/>
         <a:p>
-          <a:pPr marL="0" lvl="0" indent="0" algn="l" defTabSz="577850">
+          <a:pPr marL="0" lvl="0" indent="0" algn="l" defTabSz="577850" rtl="0">
             <a:lnSpc>
               <a:spcPct val="90000"/>
             </a:lnSpc>
@@ -1506,10 +1649,36 @@
             <a:buNone/>
           </a:pPr>
           <a:r>
-            <a:rPr lang="es-CO" sz="1300" kern="1200"/>
-            <a:t>¿Cómo gestionas los procesos de citas frente a las consultas y las citas de grooming de las mascotas?</a:t>
+            <a:rPr lang="es-CO" sz="1300" kern="1200" dirty="0"/>
+            <a:t>¿Cómo </a:t>
           </a:r>
-          <a:endParaRPr lang="en-US" sz="1300" kern="1200"/>
+          <a:r>
+            <a:rPr lang="es-CO" sz="1300" kern="1200" dirty="0">
+              <a:latin typeface="Calibri Light" panose="020F0302020204030204"/>
+            </a:rPr>
+            <a:t>gestiona</a:t>
+          </a:r>
+          <a:r>
+            <a:rPr lang="es-CO" sz="1300" kern="1200" dirty="0"/>
+            <a:t> los procesos de citas</a:t>
+          </a:r>
+          <a:r>
+            <a:rPr lang="es-CO" sz="1300" kern="1200" dirty="0">
+              <a:latin typeface="Calibri Light" panose="020F0302020204030204"/>
+            </a:rPr>
+            <a:t> de las</a:t>
+          </a:r>
+          <a:r>
+            <a:rPr lang="es-CO" sz="1300" kern="1200" dirty="0"/>
+            <a:t> consultas y las citas de grooming de las mascotas</a:t>
+          </a:r>
+          <a:r>
+            <a:rPr lang="es-CO" sz="1300" kern="1200" dirty="0">
+              <a:latin typeface="Calibri Light" panose="020F0302020204030204"/>
+            </a:rPr>
+            <a:t>?¿Que problemas tiene esto?</a:t>
+          </a:r>
+          <a:endParaRPr lang="en-US" sz="1300" kern="1200" dirty="0"/>
         </a:p>
       </dsp:txBody>
       <dsp:txXfrm>
@@ -1585,10 +1754,10 @@
             <a:buNone/>
           </a:pPr>
           <a:r>
-            <a:rPr lang="es-CO" sz="1300" kern="1200"/>
+            <a:rPr lang="es-CO" sz="1300" kern="1200" dirty="0"/>
             <a:t>¿Cómo se maneja el proceso de inventario y la gestión de proveedores en la veterinaria?</a:t>
           </a:r>
-          <a:endParaRPr lang="en-US" sz="1300" kern="1200"/>
+          <a:endParaRPr lang="en-US" sz="1300" kern="1200" dirty="0"/>
         </a:p>
       </dsp:txBody>
       <dsp:txXfrm>
@@ -1651,7 +1820,7 @@
         </a:bodyPr>
         <a:lstStyle/>
         <a:p>
-          <a:pPr marL="0" lvl="0" indent="0" algn="l" defTabSz="577850">
+          <a:pPr marL="0" lvl="0" indent="0" algn="l" defTabSz="577850" rtl="0">
             <a:lnSpc>
               <a:spcPct val="90000"/>
             </a:lnSpc>
@@ -1664,10 +1833,20 @@
             <a:buNone/>
           </a:pPr>
           <a:r>
-            <a:rPr lang="es-CO" sz="1300" kern="1200"/>
-            <a:t>¿Hay algún plan de cómo mejorar o tecnificar la veterinaria a un largo plazo?</a:t>
+            <a:rPr lang="es-CO" sz="1300" kern="1200" dirty="0"/>
+            <a:t>¿Hay algún plan de cómo mejorar o tecnificar la veterinaria a un </a:t>
           </a:r>
-          <a:endParaRPr lang="en-US" sz="1300" kern="1200"/>
+          <a:r>
+            <a:rPr lang="es-CO" sz="1300" kern="1200" dirty="0">
+              <a:latin typeface="Calibri Light" panose="020F0302020204030204"/>
+            </a:rPr>
+            <a:t>mediano plazo</a:t>
+          </a:r>
+          <a:r>
+            <a:rPr lang="es-CO" sz="1300" kern="1200" dirty="0"/>
+            <a:t>?</a:t>
+          </a:r>
+          <a:endParaRPr lang="en-US" sz="1300" kern="1200" dirty="0"/>
         </a:p>
       </dsp:txBody>
       <dsp:txXfrm>
@@ -1730,7 +1909,7 @@
         </a:bodyPr>
         <a:lstStyle/>
         <a:p>
-          <a:pPr marL="0" lvl="0" indent="0" algn="l" defTabSz="577850">
+          <a:pPr marL="0" lvl="0" indent="0" algn="l" defTabSz="577850" rtl="0">
             <a:lnSpc>
               <a:spcPct val="90000"/>
             </a:lnSpc>
@@ -1743,10 +1922,40 @@
             <a:buNone/>
           </a:pPr>
           <a:r>
-            <a:rPr lang="es-CO" sz="1300" kern="1200"/>
-            <a:t>¿Cómo has manejado los últimos 5 años el manejo del ingreso de las mascotas? </a:t>
+            <a:rPr lang="es-CO" sz="1300" kern="1200" dirty="0"/>
+            <a:t>¿Cómo </a:t>
           </a:r>
-          <a:endParaRPr lang="en-US" sz="1300" kern="1200"/>
+          <a:r>
+            <a:rPr lang="es-CO" sz="1300" kern="1200" dirty="0">
+              <a:latin typeface="Calibri Light" panose="020F0302020204030204"/>
+            </a:rPr>
+            <a:t>ha sido el manejo en últimos</a:t>
+          </a:r>
+          <a:r>
+            <a:rPr lang="es-CO" sz="1300" kern="1200" dirty="0"/>
+            <a:t> 5 años </a:t>
+          </a:r>
+          <a:r>
+            <a:rPr lang="es-CO" sz="1300" kern="1200" dirty="0">
+              <a:latin typeface="Calibri Light" panose="020F0302020204030204"/>
+            </a:rPr>
+            <a:t>del</a:t>
+          </a:r>
+          <a:r>
+            <a:rPr lang="es-CO" sz="1300" kern="1200" dirty="0"/>
+            <a:t> ingreso de las mascotas</a:t>
+          </a:r>
+          <a:r>
+            <a:rPr lang="es-CO" sz="1300" kern="1200" dirty="0">
+              <a:latin typeface="Calibri Light" panose="020F0302020204030204"/>
+            </a:rPr>
+            <a:t>, cuando son nuevas, en especial en la informacion del cliente y la mascota?</a:t>
+          </a:r>
+          <a:r>
+            <a:rPr lang="es-CO" sz="1300" kern="1200" dirty="0"/>
+            <a:t> </a:t>
+          </a:r>
+          <a:endParaRPr lang="en-US" sz="1300" kern="1200" dirty="0"/>
         </a:p>
       </dsp:txBody>
       <dsp:txXfrm>
@@ -3053,7 +3262,7 @@
           <a:p>
             <a:fld id="{88369B9F-131C-2846-AB8F-CEE154B4CAEB}" type="datetimeFigureOut">
               <a:rPr lang="es-CO" smtClean="0"/>
-              <a:t>21/03/2024</a:t>
+              <a:t>3/04/2024</a:t>
             </a:fld>
             <a:endParaRPr lang="es-CO"/>
           </a:p>
@@ -3230,7 +3439,7 @@
           <a:p>
             <a:fld id="{9660CB96-A603-FF42-AE46-F5F75F80A67B}" type="datetimeFigureOut">
               <a:rPr lang="es-CO" smtClean="0"/>
-              <a:t>21/03/2024</a:t>
+              <a:t>3/04/2024</a:t>
             </a:fld>
             <a:endParaRPr lang="es-CO"/>
           </a:p>
@@ -3647,7 +3856,7 @@
           <a:p>
             <a:fld id="{BD986248-06F7-A441-A47A-264EBD310E11}" type="datetimeFigureOut">
               <a:rPr lang="es-CO" smtClean="0"/>
-              <a:t>21/03/2024</a:t>
+              <a:t>3/04/2024</a:t>
             </a:fld>
             <a:endParaRPr lang="es-CO"/>
           </a:p>
@@ -3847,7 +4056,7 @@
           <a:p>
             <a:fld id="{BD986248-06F7-A441-A47A-264EBD310E11}" type="datetimeFigureOut">
               <a:rPr lang="es-CO" smtClean="0"/>
-              <a:t>21/03/2024</a:t>
+              <a:t>3/04/2024</a:t>
             </a:fld>
             <a:endParaRPr lang="es-CO"/>
           </a:p>
@@ -4057,7 +4266,7 @@
           <a:p>
             <a:fld id="{BD986248-06F7-A441-A47A-264EBD310E11}" type="datetimeFigureOut">
               <a:rPr lang="es-CO" smtClean="0"/>
-              <a:t>21/03/2024</a:t>
+              <a:t>3/04/2024</a:t>
             </a:fld>
             <a:endParaRPr lang="es-CO"/>
           </a:p>
@@ -4218,7 +4427,7 @@
           <a:p>
             <a:fld id="{BD986248-06F7-A441-A47A-264EBD310E11}" type="datetimeFigureOut">
               <a:rPr lang="es-CO" smtClean="0"/>
-              <a:t>21/03/2024</a:t>
+              <a:t>3/04/2024</a:t>
             </a:fld>
             <a:endParaRPr lang="es-CO"/>
           </a:p>
@@ -4418,7 +4627,7 @@
           <a:p>
             <a:fld id="{BD986248-06F7-A441-A47A-264EBD310E11}" type="datetimeFigureOut">
               <a:rPr lang="es-CO" smtClean="0"/>
-              <a:t>21/03/2024</a:t>
+              <a:t>3/04/2024</a:t>
             </a:fld>
             <a:endParaRPr lang="es-CO"/>
           </a:p>
@@ -4694,7 +4903,7 @@
           <a:p>
             <a:fld id="{BD986248-06F7-A441-A47A-264EBD310E11}" type="datetimeFigureOut">
               <a:rPr lang="es-CO" smtClean="0"/>
-              <a:t>21/03/2024</a:t>
+              <a:t>3/04/2024</a:t>
             </a:fld>
             <a:endParaRPr lang="es-CO"/>
           </a:p>
@@ -4962,7 +5171,7 @@
           <a:p>
             <a:fld id="{BD986248-06F7-A441-A47A-264EBD310E11}" type="datetimeFigureOut">
               <a:rPr lang="es-CO" smtClean="0"/>
-              <a:t>21/03/2024</a:t>
+              <a:t>3/04/2024</a:t>
             </a:fld>
             <a:endParaRPr lang="es-CO"/>
           </a:p>
@@ -5377,7 +5586,7 @@
           <a:p>
             <a:fld id="{BD986248-06F7-A441-A47A-264EBD310E11}" type="datetimeFigureOut">
               <a:rPr lang="es-CO" smtClean="0"/>
-              <a:t>21/03/2024</a:t>
+              <a:t>3/04/2024</a:t>
             </a:fld>
             <a:endParaRPr lang="es-CO"/>
           </a:p>
@@ -5519,7 +5728,7 @@
           <a:p>
             <a:fld id="{BD986248-06F7-A441-A47A-264EBD310E11}" type="datetimeFigureOut">
               <a:rPr lang="es-CO" smtClean="0"/>
-              <a:t>21/03/2024</a:t>
+              <a:t>3/04/2024</a:t>
             </a:fld>
             <a:endParaRPr lang="es-CO"/>
           </a:p>
@@ -5632,7 +5841,7 @@
           <a:p>
             <a:fld id="{BD986248-06F7-A441-A47A-264EBD310E11}" type="datetimeFigureOut">
               <a:rPr lang="es-CO" smtClean="0"/>
-              <a:t>21/03/2024</a:t>
+              <a:t>3/04/2024</a:t>
             </a:fld>
             <a:endParaRPr lang="es-CO"/>
           </a:p>
@@ -5945,7 +6154,7 @@
           <a:p>
             <a:fld id="{BD986248-06F7-A441-A47A-264EBD310E11}" type="datetimeFigureOut">
               <a:rPr lang="es-CO" smtClean="0"/>
-              <a:t>21/03/2024</a:t>
+              <a:t>3/04/2024</a:t>
             </a:fld>
             <a:endParaRPr lang="es-CO"/>
           </a:p>
@@ -6234,7 +6443,7 @@
           <a:p>
             <a:fld id="{BD986248-06F7-A441-A47A-264EBD310E11}" type="datetimeFigureOut">
               <a:rPr lang="es-CO" smtClean="0"/>
-              <a:t>21/03/2024</a:t>
+              <a:t>3/04/2024</a:t>
             </a:fld>
             <a:endParaRPr lang="es-CO"/>
           </a:p>
@@ -6477,7 +6686,7 @@
           <a:p>
             <a:fld id="{BD986248-06F7-A441-A47A-264EBD310E11}" type="datetimeFigureOut">
               <a:rPr lang="es-CO" smtClean="0"/>
-              <a:t>21/03/2024</a:t>
+              <a:t>3/04/2024</a:t>
             </a:fld>
             <a:endParaRPr lang="es-CO"/>
           </a:p>
@@ -7388,7 +7597,7 @@
         </p:blipFill>
         <p:spPr>
           <a:xfrm>
-            <a:off x="0" y="864889"/>
+            <a:off x="-30079" y="363573"/>
             <a:ext cx="12192000" cy="5990486"/>
           </a:xfrm>
           <a:prstGeom prst="rect">
@@ -7462,7 +7671,7 @@
         </p:blipFill>
         <p:spPr>
           <a:xfrm>
-            <a:off x="-205" y="-40105"/>
+            <a:off x="90195" y="170041"/>
             <a:ext cx="10909041" cy="6858000"/>
           </a:xfrm>
           <a:prstGeom prst="rect">
@@ -7536,7 +7745,7 @@
         </p:blipFill>
         <p:spPr>
           <a:xfrm>
-            <a:off x="0" y="1427382"/>
+            <a:off x="99854" y="546424"/>
             <a:ext cx="12192000" cy="4975789"/>
           </a:xfrm>
           <a:prstGeom prst="rect">
@@ -7751,7 +7960,7 @@
         </p:nvSpPr>
         <p:spPr>
           <a:xfrm>
-            <a:off x="578457" y="1322143"/>
+            <a:off x="818539" y="1499595"/>
             <a:ext cx="5518437" cy="1815882"/>
           </a:xfrm>
           <a:prstGeom prst="rect">
@@ -7766,75 +7975,11 @@
           <a:lstStyle/>
           <a:p>
             <a:r>
-              <a:rPr lang="es-CO" sz="1600" dirty="0">
+              <a:rPr lang="es-CO" sz="1600">
                 <a:latin typeface="Work Sans Light Roman"/>
               </a:rPr>
               <a:t>Nosotros tomaremos una técnica de recolección de información la cual nos brinda una respuesta más clara y concisa donde recibimos respuestas abiertas por medio del cliente,  será una entrevista personal, a partir de esta se realizarán preguntas relacionadas al proyecto , al dueño de la veterinaria y a la administradora de esta, realizando sus  respectivas grabaciones para soportar lo dicho.</a:t>
             </a:r>
-          </a:p>
-        </p:txBody>
-      </p:sp>
-      <p:sp>
-        <p:nvSpPr>
-          <p:cNvPr id="6" name="Título 1">
-            <a:extLst>
-              <a:ext uri="{FF2B5EF4-FFF2-40B4-BE49-F238E27FC236}">
-                <a16:creationId xmlns:a16="http://schemas.microsoft.com/office/drawing/2014/main" id="{9B108D99-B6E6-1F57-389A-1B888784F0C2}"/>
-              </a:ext>
-            </a:extLst>
-          </p:cNvPr>
-          <p:cNvSpPr txBox="1">
-            <a:spLocks/>
-          </p:cNvSpPr>
-          <p:nvPr/>
-        </p:nvSpPr>
-        <p:spPr>
-          <a:xfrm>
-            <a:off x="6489607" y="2295592"/>
-            <a:ext cx="4972412" cy="741563"/>
-          </a:xfrm>
-          <a:prstGeom prst="rect">
-            <a:avLst/>
-          </a:prstGeom>
-          <a:ln>
-            <a:noFill/>
-          </a:ln>
-        </p:spPr>
-        <p:txBody>
-          <a:bodyPr lIns="91440" tIns="45720" rIns="91440" bIns="45720" anchor="t"/>
-          <a:lstStyle>
-            <a:lvl1pPr algn="l" defTabSz="914400" rtl="0" eaLnBrk="1" latinLnBrk="0" hangingPunct="1">
-              <a:lnSpc>
-                <a:spcPct val="90000"/>
-              </a:lnSpc>
-              <a:spcBef>
-                <a:spcPct val="0"/>
-              </a:spcBef>
-              <a:buNone/>
-              <a:defRPr sz="4400" kern="1200">
-                <a:solidFill>
-                  <a:schemeClr val="tx1"/>
-                </a:solidFill>
-                <a:latin typeface="+mj-lt"/>
-                <a:ea typeface="+mj-ea"/>
-                <a:cs typeface="+mj-cs"/>
-              </a:defRPr>
-            </a:lvl1pPr>
-          </a:lstStyle>
-          <a:p>
-            <a:pPr>
-              <a:defRPr/>
-            </a:pPr>
-            <a:r>
-              <a:rPr lang="es-CO" sz="3600" b="1">
-                <a:solidFill>
-                  <a:srgbClr val="4D4D4C"/>
-                </a:solidFill>
-                <a:latin typeface="WORK SANS BOLD ROMAN"/>
-              </a:rPr>
-              <a:t>Preguntas para realizar en la entrevista</a:t>
-            </a:r>
-            <a:endParaRPr lang="es-ES"/>
           </a:p>
         </p:txBody>
       </p:sp>
@@ -7860,7 +8005,7 @@
         </p:blipFill>
         <p:spPr>
           <a:xfrm>
-            <a:off x="967433" y="3981912"/>
+            <a:off x="7272200" y="1842049"/>
             <a:ext cx="3908591" cy="1812536"/>
           </a:xfrm>
           <a:prstGeom prst="rect">
@@ -7868,34 +8013,6 @@
           </a:prstGeom>
         </p:spPr>
       </p:pic>
-      <p:graphicFrame>
-        <p:nvGraphicFramePr>
-          <p:cNvPr id="9" name="CuadroTexto 3">
-            <a:extLst>
-              <a:ext uri="{FF2B5EF4-FFF2-40B4-BE49-F238E27FC236}">
-                <a16:creationId xmlns:a16="http://schemas.microsoft.com/office/drawing/2014/main" id="{AEA16E03-FA86-AAE2-0094-732EC59108B2}"/>
-              </a:ext>
-            </a:extLst>
-          </p:cNvPr>
-          <p:cNvGraphicFramePr/>
-          <p:nvPr>
-            <p:extLst>
-              <p:ext uri="{D42A27DB-BD31-4B8C-83A1-F6EECF244321}">
-                <p14:modId xmlns:p14="http://schemas.microsoft.com/office/powerpoint/2010/main" val="2274396873"/>
-              </p:ext>
-            </p:extLst>
-          </p:nvPr>
-        </p:nvGraphicFramePr>
-        <p:xfrm>
-          <a:off x="6423935" y="3368061"/>
-          <a:ext cx="5518437" cy="3323987"/>
-        </p:xfrm>
-        <a:graphic>
-          <a:graphicData uri="http://schemas.openxmlformats.org/drawingml/2006/diagram">
-            <dgm:relIds xmlns:dgm="http://schemas.openxmlformats.org/drawingml/2006/diagram" xmlns:r="http://schemas.openxmlformats.org/officeDocument/2006/relationships" r:dm="rId4" r:lo="rId5" r:qs="rId6" r:cs="rId7"/>
-          </a:graphicData>
-        </a:graphic>
-      </p:graphicFrame>
     </p:spTree>
     <p:extLst>
       <p:ext uri="{BB962C8B-B14F-4D97-AF65-F5344CB8AC3E}">
@@ -7942,10 +8059,10 @@
       </p:grpSpPr>
       <p:sp>
         <p:nvSpPr>
-          <p:cNvPr id="2" name="Título 1">
-            <a:extLst>
-              <a:ext uri="{FF2B5EF4-FFF2-40B4-BE49-F238E27FC236}">
-                <a16:creationId xmlns:a16="http://schemas.microsoft.com/office/drawing/2014/main" id="{2ACE75F1-F343-8856-BC69-4BB6B82BF3E4}"/>
+          <p:cNvPr id="6" name="Título 1">
+            <a:extLst>
+              <a:ext uri="{FF2B5EF4-FFF2-40B4-BE49-F238E27FC236}">
+                <a16:creationId xmlns:a16="http://schemas.microsoft.com/office/drawing/2014/main" id="{9B108D99-B6E6-1F57-389A-1B888784F0C2}"/>
               </a:ext>
             </a:extLst>
           </p:cNvPr>
@@ -7956,8 +8073,8 @@
         </p:nvSpPr>
         <p:spPr>
           <a:xfrm>
-            <a:off x="456236" y="416689"/>
-            <a:ext cx="9815809" cy="741563"/>
+            <a:off x="237032" y="385373"/>
+            <a:ext cx="8949425" cy="741563"/>
           </a:xfrm>
           <a:prstGeom prst="rect">
             <a:avLst/>
@@ -7992,63 +8109,128 @@
               <a:defRPr/>
             </a:pPr>
             <a:r>
-              <a:rPr lang="es-CO" sz="3600" b="1" dirty="0">
+              <a:rPr lang="es-CO" sz="3600" b="1">
                 <a:solidFill>
                   <a:srgbClr val="4D4D4C"/>
                 </a:solidFill>
                 <a:latin typeface="WORK SANS BOLD ROMAN"/>
               </a:rPr>
-              <a:t>Historias de usuario</a:t>
-            </a:r>
-            <a:endParaRPr lang="es-CO" sz="3600" b="1" u="none" strike="noStrike" kern="1200" cap="none" spc="0" normalizeH="0" baseline="0" noProof="0" dirty="0">
-              <a:ln>
-                <a:noFill/>
-              </a:ln>
-              <a:solidFill>
-                <a:srgbClr val="4D4D4C"/>
-              </a:solidFill>
-              <a:effectLst/>
-              <a:uLnTx/>
-              <a:uFillTx/>
-              <a:latin typeface="WORK SANS BOLD ROMAN" pitchFamily="2" charset="77"/>
-            </a:endParaRPr>
+              <a:t>Preguntas para realizar en la entrevista</a:t>
+            </a:r>
+            <a:endParaRPr lang="es-ES"/>
           </a:p>
         </p:txBody>
       </p:sp>
-      <p:pic>
-        <p:nvPicPr>
-          <p:cNvPr id="14" name="Imagen 13" descr="Tabla&#10;&#10;Descripción generada automáticamente">
-            <a:extLst>
-              <a:ext uri="{FF2B5EF4-FFF2-40B4-BE49-F238E27FC236}">
-                <a16:creationId xmlns:a16="http://schemas.microsoft.com/office/drawing/2014/main" id="{71270B46-A1F6-9F44-FE5C-637CEC4D21BF}"/>
-              </a:ext>
-            </a:extLst>
-          </p:cNvPr>
-          <p:cNvPicPr>
-            <a:picLocks noChangeAspect="1"/>
-          </p:cNvPicPr>
+      <p:graphicFrame>
+        <p:nvGraphicFramePr>
+          <p:cNvPr id="9" name="CuadroTexto 3">
+            <a:extLst>
+              <a:ext uri="{FF2B5EF4-FFF2-40B4-BE49-F238E27FC236}">
+                <a16:creationId xmlns:a16="http://schemas.microsoft.com/office/drawing/2014/main" id="{AEA16E03-FA86-AAE2-0094-732EC59108B2}"/>
+              </a:ext>
+            </a:extLst>
+          </p:cNvPr>
+          <p:cNvGraphicFramePr/>
+          <p:nvPr>
+            <p:extLst>
+              <p:ext uri="{D42A27DB-BD31-4B8C-83A1-F6EECF244321}">
+                <p14:modId xmlns:p14="http://schemas.microsoft.com/office/powerpoint/2010/main" val="1699677662"/>
+              </p:ext>
+            </p:extLst>
+          </p:nvPr>
+        </p:nvGraphicFramePr>
+        <p:xfrm>
+          <a:off x="578456" y="1228198"/>
+          <a:ext cx="5518437" cy="3323987"/>
+        </p:xfrm>
+        <a:graphic>
+          <a:graphicData uri="http://schemas.openxmlformats.org/drawingml/2006/diagram">
+            <dgm:relIds xmlns:dgm="http://schemas.openxmlformats.org/drawingml/2006/diagram" xmlns:r="http://schemas.openxmlformats.org/officeDocument/2006/relationships" r:dm="rId3" r:lo="rId4" r:qs="rId5" r:cs="rId6"/>
+          </a:graphicData>
+        </a:graphic>
+      </p:graphicFrame>
+      <p:sp>
+        <p:nvSpPr>
+          <p:cNvPr id="21" name="CuadroTexto 20">
+            <a:extLst>
+              <a:ext uri="{FF2B5EF4-FFF2-40B4-BE49-F238E27FC236}">
+                <a16:creationId xmlns:a16="http://schemas.microsoft.com/office/drawing/2014/main" id="{10521D8E-D039-1F8F-D4AC-F4A392E2F3A9}"/>
+              </a:ext>
+            </a:extLst>
+          </p:cNvPr>
+          <p:cNvSpPr txBox="1"/>
           <p:nvPr/>
-        </p:nvPicPr>
-        <p:blipFill>
-          <a:blip r:embed="rId3"/>
-          <a:stretch>
-            <a:fillRect/>
-          </a:stretch>
-        </p:blipFill>
+        </p:nvSpPr>
         <p:spPr>
           <a:xfrm>
-            <a:off x="574240" y="1062690"/>
-            <a:ext cx="9582150" cy="5400675"/>
+            <a:off x="8336071" y="5392454"/>
+            <a:ext cx="2878899" cy="369332"/>
           </a:xfrm>
           <a:prstGeom prst="rect">
             <a:avLst/>
           </a:prstGeom>
+          <a:noFill/>
         </p:spPr>
-      </p:pic>
+        <p:txBody>
+          <a:bodyPr rot="0" spcFirstLastPara="0" vertOverflow="overflow" horzOverflow="overflow" vert="horz" wrap="square" lIns="91440" tIns="45720" rIns="91440" bIns="45720" numCol="1" spcCol="0" rtlCol="0" fromWordArt="0" anchor="t" anchorCtr="0" forceAA="0" compatLnSpc="1">
+            <a:prstTxWarp prst="textNoShape">
+              <a:avLst/>
+            </a:prstTxWarp>
+            <a:spAutoFit/>
+          </a:bodyPr>
+          <a:lstStyle/>
+          <a:p>
+            <a:r>
+              <a:rPr lang="en-US" dirty="0">
+                <a:hlinkClick r:id="rId8"/>
+              </a:rPr>
+              <a:t>Entrevista Dr. Miller Beltran</a:t>
+            </a:r>
+            <a:endParaRPr lang="en-US"/>
+          </a:p>
+        </p:txBody>
+      </p:sp>
+      <p:sp>
+        <p:nvSpPr>
+          <p:cNvPr id="30" name="CuadroTexto 29">
+            <a:extLst>
+              <a:ext uri="{FF2B5EF4-FFF2-40B4-BE49-F238E27FC236}">
+                <a16:creationId xmlns:a16="http://schemas.microsoft.com/office/drawing/2014/main" id="{4BE709E7-6235-F331-1967-5D7428E09BF3}"/>
+              </a:ext>
+            </a:extLst>
+          </p:cNvPr>
+          <p:cNvSpPr txBox="1"/>
+          <p:nvPr/>
+        </p:nvSpPr>
+        <p:spPr>
+          <a:xfrm>
+            <a:off x="7739169" y="4996445"/>
+            <a:ext cx="4057066" cy="400110"/>
+          </a:xfrm>
+          <a:prstGeom prst="rect">
+            <a:avLst/>
+          </a:prstGeom>
+          <a:noFill/>
+        </p:spPr>
+        <p:txBody>
+          <a:bodyPr wrap="square" lIns="91440" tIns="45720" rIns="91440" bIns="45720" rtlCol="0" anchor="t">
+            <a:spAutoFit/>
+          </a:bodyPr>
+          <a:lstStyle/>
+          <a:p>
+            <a:r>
+              <a:rPr lang="es-CO" sz="2000" dirty="0">
+                <a:latin typeface="Work Sans Light Roman"/>
+              </a:rPr>
+              <a:t>Adjunto link de la entrevista virtual</a:t>
+            </a:r>
+          </a:p>
+        </p:txBody>
+      </p:sp>
     </p:spTree>
     <p:extLst>
       <p:ext uri="{BB962C8B-B14F-4D97-AF65-F5344CB8AC3E}">
-        <p14:creationId xmlns:p14="http://schemas.microsoft.com/office/powerpoint/2010/main" val="1263615332"/>
+        <p14:creationId xmlns:p14="http://schemas.microsoft.com/office/powerpoint/2010/main" val="4036207567"/>
       </p:ext>
     </p:extLst>
   </p:cSld>
@@ -8091,85 +8273,83 @@
       </p:grpSpPr>
       <p:sp>
         <p:nvSpPr>
-          <p:cNvPr id="2" name="CuadroTexto 1">
-            <a:extLst>
-              <a:ext uri="{FF2B5EF4-FFF2-40B4-BE49-F238E27FC236}">
-                <a16:creationId xmlns:a16="http://schemas.microsoft.com/office/drawing/2014/main" id="{534A4208-7DDE-681C-B3CE-D7CE52BA4A83}"/>
-              </a:ext>
-            </a:extLst>
-          </p:cNvPr>
-          <p:cNvSpPr txBox="1"/>
+          <p:cNvPr id="2" name="Título 1">
+            <a:extLst>
+              <a:ext uri="{FF2B5EF4-FFF2-40B4-BE49-F238E27FC236}">
+                <a16:creationId xmlns:a16="http://schemas.microsoft.com/office/drawing/2014/main" id="{2ACE75F1-F343-8856-BC69-4BB6B82BF3E4}"/>
+              </a:ext>
+            </a:extLst>
+          </p:cNvPr>
+          <p:cNvSpPr txBox="1">
+            <a:spLocks/>
+          </p:cNvSpPr>
           <p:nvPr/>
         </p:nvSpPr>
         <p:spPr>
           <a:xfrm>
-            <a:off x="3214747" y="1256437"/>
-            <a:ext cx="5805978" cy="646331"/>
+            <a:off x="456236" y="416689"/>
+            <a:ext cx="9815809" cy="741563"/>
           </a:xfrm>
           <a:prstGeom prst="rect">
             <a:avLst/>
           </a:prstGeom>
-          <a:noFill/>
+          <a:ln>
+            <a:noFill/>
+          </a:ln>
         </p:spPr>
         <p:txBody>
-          <a:bodyPr wrap="square" lIns="91440" tIns="45720" rIns="91440" bIns="45720" rtlCol="0" anchor="t">
-            <a:spAutoFit/>
-          </a:bodyPr>
-          <a:lstStyle/>
+          <a:bodyPr lIns="91440" tIns="45720" rIns="91440" bIns="45720" anchor="t"/>
+          <a:lstStyle>
+            <a:lvl1pPr algn="l" defTabSz="914400" rtl="0" eaLnBrk="1" latinLnBrk="0" hangingPunct="1">
+              <a:lnSpc>
+                <a:spcPct val="90000"/>
+              </a:lnSpc>
+              <a:spcBef>
+                <a:spcPct val="0"/>
+              </a:spcBef>
+              <a:buNone/>
+              <a:defRPr sz="4400" kern="1200">
+                <a:solidFill>
+                  <a:schemeClr val="tx1"/>
+                </a:solidFill>
+                <a:latin typeface="+mj-lt"/>
+                <a:ea typeface="+mj-ea"/>
+                <a:cs typeface="+mj-cs"/>
+              </a:defRPr>
+            </a:lvl1pPr>
+          </a:lstStyle>
           <a:p>
             <a:pPr>
               <a:defRPr/>
             </a:pPr>
             <a:r>
-              <a:rPr lang="es-ES" sz="3600" b="1" dirty="0">
+              <a:rPr lang="es-CO" sz="3600" b="1">
                 <a:solidFill>
-                  <a:prstClr val="black">
-                    <a:lumMod val="75000"/>
-                    <a:lumOff val="25000"/>
-                  </a:prstClr>
+                  <a:srgbClr val="4D4D4C"/>
                 </a:solidFill>
-                <a:latin typeface="Work Sans Bold Roman"/>
+                <a:latin typeface="WORK SANS BOLD ROMAN"/>
               </a:rPr>
-              <a:t>RF - RNF</a:t>
-            </a:r>
-            <a:endParaRPr lang="es-ES" dirty="0"/>
+              <a:t>Historias de usuario</a:t>
+            </a:r>
+            <a:endParaRPr lang="es-CO" sz="3600" b="1" u="none" strike="noStrike" kern="1200" cap="none" spc="0" normalizeH="0" baseline="0" noProof="0">
+              <a:ln>
+                <a:noFill/>
+              </a:ln>
+              <a:solidFill>
+                <a:srgbClr val="4D4D4C"/>
+              </a:solidFill>
+              <a:effectLst/>
+              <a:uLnTx/>
+              <a:uFillTx/>
+              <a:latin typeface="WORK SANS BOLD ROMAN" pitchFamily="2" charset="77"/>
+            </a:endParaRPr>
           </a:p>
         </p:txBody>
       </p:sp>
-      <p:pic>
-        <p:nvPicPr>
-          <p:cNvPr id="4" name="Imagen 3" descr="Imagen que contiene Tabla&#10;&#10;Descripción generada automáticamente">
-            <a:extLst>
-              <a:ext uri="{FF2B5EF4-FFF2-40B4-BE49-F238E27FC236}">
-                <a16:creationId xmlns:a16="http://schemas.microsoft.com/office/drawing/2014/main" id="{1FB08B96-61D7-42D9-7F9F-BA8E2CD490B0}"/>
-              </a:ext>
-            </a:extLst>
-          </p:cNvPr>
-          <p:cNvPicPr>
-            <a:picLocks noChangeAspect="1"/>
-          </p:cNvPicPr>
-          <p:nvPr/>
-        </p:nvPicPr>
-        <p:blipFill>
-          <a:blip r:embed="rId3"/>
-          <a:stretch>
-            <a:fillRect/>
-          </a:stretch>
-        </p:blipFill>
-        <p:spPr>
-          <a:xfrm>
-            <a:off x="2071361" y="1905327"/>
-            <a:ext cx="7715250" cy="3381375"/>
-          </a:xfrm>
-          <a:prstGeom prst="rect">
-            <a:avLst/>
-          </a:prstGeom>
-        </p:spPr>
-      </p:pic>
     </p:spTree>
     <p:extLst>
       <p:ext uri="{BB962C8B-B14F-4D97-AF65-F5344CB8AC3E}">
-        <p14:creationId xmlns:p14="http://schemas.microsoft.com/office/powerpoint/2010/main" val="2023417485"/>
+        <p14:creationId xmlns:p14="http://schemas.microsoft.com/office/powerpoint/2010/main" val="1263615332"/>
       </p:ext>
     </p:extLst>
   </p:cSld>
@@ -8242,7 +8422,7 @@
               <a:defRPr/>
             </a:pPr>
             <a:r>
-              <a:rPr lang="es-ES" sz="3600" b="1" dirty="0">
+              <a:rPr lang="es-ES" sz="3600" b="1">
                 <a:solidFill>
                   <a:prstClr val="black">
                     <a:lumMod val="75000"/>
@@ -8253,16 +8433,16 @@
               </a:rPr>
               <a:t>RF - RNF</a:t>
             </a:r>
-            <a:endParaRPr lang="es-ES" dirty="0"/>
+            <a:endParaRPr lang="es-ES"/>
           </a:p>
         </p:txBody>
       </p:sp>
       <p:pic>
         <p:nvPicPr>
-          <p:cNvPr id="3" name="Imagen 2" descr="Tabla&#10;&#10;Descripción generada automáticamente">
-            <a:extLst>
-              <a:ext uri="{FF2B5EF4-FFF2-40B4-BE49-F238E27FC236}">
-                <a16:creationId xmlns:a16="http://schemas.microsoft.com/office/drawing/2014/main" id="{2B330A9E-CD27-70FD-D0D3-6276645D9BA4}"/>
+          <p:cNvPr id="3" name="Imagen 2" descr="Imagen que contiene Patrón de fondo&#10;&#10;Descripción generada automáticamente">
+            <a:extLst>
+              <a:ext uri="{FF2B5EF4-FFF2-40B4-BE49-F238E27FC236}">
+                <a16:creationId xmlns:a16="http://schemas.microsoft.com/office/drawing/2014/main" id="{F7E1A397-4046-7E00-5623-E6A907FC804A}"/>
               </a:ext>
             </a:extLst>
           </p:cNvPr>
@@ -8271,15 +8451,16 @@
           </p:cNvPicPr>
           <p:nvPr/>
         </p:nvPicPr>
-        <p:blipFill rotWithShape="1">
+        <p:blipFill>
           <a:blip r:embed="rId3"/>
-          <a:srcRect r="304" b="39474"/>
-          <a:stretch/>
+          <a:stretch>
+            <a:fillRect/>
+          </a:stretch>
         </p:blipFill>
         <p:spPr>
           <a:xfrm>
-            <a:off x="979639" y="2260100"/>
-            <a:ext cx="10278250" cy="2163245"/>
+            <a:off x="1990508" y="2051215"/>
+            <a:ext cx="6877050" cy="3267075"/>
           </a:xfrm>
           <a:prstGeom prst="rect">
             <a:avLst/>
@@ -8289,7 +8470,7 @@
     </p:spTree>
     <p:extLst>
       <p:ext uri="{BB962C8B-B14F-4D97-AF65-F5344CB8AC3E}">
-        <p14:creationId xmlns:p14="http://schemas.microsoft.com/office/powerpoint/2010/main" val="2039648488"/>
+        <p14:creationId xmlns:p14="http://schemas.microsoft.com/office/powerpoint/2010/main" val="2023417485"/>
       </p:ext>
     </p:extLst>
   </p:cSld>
@@ -8332,85 +8513,57 @@
       </p:grpSpPr>
       <p:sp>
         <p:nvSpPr>
-          <p:cNvPr id="2" name="Título 1">
-            <a:extLst>
-              <a:ext uri="{FF2B5EF4-FFF2-40B4-BE49-F238E27FC236}">
-                <a16:creationId xmlns:a16="http://schemas.microsoft.com/office/drawing/2014/main" id="{2ACE75F1-F343-8856-BC69-4BB6B82BF3E4}"/>
-              </a:ext>
-            </a:extLst>
-          </p:cNvPr>
-          <p:cNvSpPr txBox="1">
-            <a:spLocks/>
-          </p:cNvSpPr>
+          <p:cNvPr id="2" name="CuadroTexto 1">
+            <a:extLst>
+              <a:ext uri="{FF2B5EF4-FFF2-40B4-BE49-F238E27FC236}">
+                <a16:creationId xmlns:a16="http://schemas.microsoft.com/office/drawing/2014/main" id="{534A4208-7DDE-681C-B3CE-D7CE52BA4A83}"/>
+              </a:ext>
+            </a:extLst>
+          </p:cNvPr>
+          <p:cNvSpPr txBox="1"/>
           <p:nvPr/>
         </p:nvSpPr>
         <p:spPr>
           <a:xfrm>
-            <a:off x="4767277" y="239237"/>
-            <a:ext cx="2101864" cy="741563"/>
+            <a:off x="3214747" y="1256437"/>
+            <a:ext cx="5805978" cy="646331"/>
           </a:xfrm>
           <a:prstGeom prst="rect">
             <a:avLst/>
           </a:prstGeom>
-          <a:ln>
-            <a:noFill/>
-          </a:ln>
+          <a:noFill/>
         </p:spPr>
         <p:txBody>
-          <a:bodyPr lIns="91440" tIns="45720" rIns="91440" bIns="45720" anchor="t"/>
-          <a:lstStyle>
-            <a:lvl1pPr algn="l" defTabSz="914400" rtl="0" eaLnBrk="1" latinLnBrk="0" hangingPunct="1">
-              <a:lnSpc>
-                <a:spcPct val="90000"/>
-              </a:lnSpc>
-              <a:spcBef>
-                <a:spcPct val="0"/>
-              </a:spcBef>
-              <a:buNone/>
-              <a:defRPr sz="4400" kern="1200">
-                <a:solidFill>
-                  <a:schemeClr val="tx1"/>
-                </a:solidFill>
-                <a:latin typeface="+mj-lt"/>
-                <a:ea typeface="+mj-ea"/>
-                <a:cs typeface="+mj-cs"/>
-              </a:defRPr>
-            </a:lvl1pPr>
-          </a:lstStyle>
+          <a:bodyPr wrap="square" lIns="91440" tIns="45720" rIns="91440" bIns="45720" rtlCol="0" anchor="t">
+            <a:spAutoFit/>
+          </a:bodyPr>
+          <a:lstStyle/>
           <a:p>
             <a:pPr>
               <a:defRPr/>
             </a:pPr>
             <a:r>
-              <a:rPr lang="es-CO" sz="3600" b="1">
+              <a:rPr lang="es-ES" sz="3600" b="1">
                 <a:solidFill>
-                  <a:srgbClr val="4D4D4C"/>
+                  <a:prstClr val="black">
+                    <a:lumMod val="75000"/>
+                    <a:lumOff val="25000"/>
+                  </a:prstClr>
                 </a:solidFill>
-                <a:latin typeface="WORK SANS BOLD ROMAN"/>
+                <a:latin typeface="Work Sans Bold Roman"/>
               </a:rPr>
-              <a:t>Mockups</a:t>
-            </a:r>
-            <a:endParaRPr lang="es-CO" sz="3600" b="1" u="none" strike="noStrike" kern="1200" cap="none" spc="0" normalizeH="0" baseline="0" noProof="0">
-              <a:ln>
-                <a:noFill/>
-              </a:ln>
-              <a:solidFill>
-                <a:srgbClr val="4D4D4C"/>
-              </a:solidFill>
-              <a:effectLst/>
-              <a:uLnTx/>
-              <a:uFillTx/>
-              <a:latin typeface="WORK SANS BOLD ROMAN" pitchFamily="2" charset="77"/>
-            </a:endParaRPr>
+              <a:t>RF - RNF</a:t>
+            </a:r>
+            <a:endParaRPr lang="es-ES"/>
           </a:p>
         </p:txBody>
       </p:sp>
       <p:pic>
         <p:nvPicPr>
-          <p:cNvPr id="3" name="Imagen 2">
-            <a:extLst>
-              <a:ext uri="{FF2B5EF4-FFF2-40B4-BE49-F238E27FC236}">
-                <a16:creationId xmlns:a16="http://schemas.microsoft.com/office/drawing/2014/main" id="{D54544D6-2C1A-122C-782B-8D95D21BA110}"/>
+          <p:cNvPr id="4" name="Imagen 3" descr="Tabla&#10;&#10;Descripción generada automáticamente">
+            <a:extLst>
+              <a:ext uri="{FF2B5EF4-FFF2-40B4-BE49-F238E27FC236}">
+                <a16:creationId xmlns:a16="http://schemas.microsoft.com/office/drawing/2014/main" id="{7F1DF582-2316-BCCD-C99B-1F7BAFFFE254}"/>
               </a:ext>
             </a:extLst>
           </p:cNvPr>
@@ -8427,38 +8580,8 @@
         </p:blipFill>
         <p:spPr>
           <a:xfrm>
-            <a:off x="4175" y="1134585"/>
-            <a:ext cx="5607485" cy="4254803"/>
-          </a:xfrm>
-          <a:prstGeom prst="rect">
-            <a:avLst/>
-          </a:prstGeom>
-        </p:spPr>
-      </p:pic>
-      <p:pic>
-        <p:nvPicPr>
-          <p:cNvPr id="4" name="Imagen 3" descr="Interfaz de usuario gráfica, Aplicación&#10;&#10;Descripción generada automáticamente">
-            <a:extLst>
-              <a:ext uri="{FF2B5EF4-FFF2-40B4-BE49-F238E27FC236}">
-                <a16:creationId xmlns:a16="http://schemas.microsoft.com/office/drawing/2014/main" id="{D0633AF3-9F83-9005-CEB2-DCB308EA40E2}"/>
-              </a:ext>
-            </a:extLst>
-          </p:cNvPr>
-          <p:cNvPicPr>
-            <a:picLocks noChangeAspect="1"/>
-          </p:cNvPicPr>
-          <p:nvPr/>
-        </p:nvPicPr>
-        <p:blipFill>
-          <a:blip r:embed="rId4"/>
-          <a:stretch>
-            <a:fillRect/>
-          </a:stretch>
-        </p:blipFill>
-        <p:spPr>
-          <a:xfrm>
-            <a:off x="6033109" y="1196758"/>
-            <a:ext cx="5971262" cy="4140896"/>
+            <a:off x="1176142" y="2476630"/>
+            <a:ext cx="8420100" cy="2343150"/>
           </a:xfrm>
           <a:prstGeom prst="rect">
             <a:avLst/>
@@ -8468,7 +8591,7 @@
     </p:spTree>
     <p:extLst>
       <p:ext uri="{BB962C8B-B14F-4D97-AF65-F5344CB8AC3E}">
-        <p14:creationId xmlns:p14="http://schemas.microsoft.com/office/powerpoint/2010/main" val="103788051"/>
+        <p14:creationId xmlns:p14="http://schemas.microsoft.com/office/powerpoint/2010/main" val="2039648488"/>
       </p:ext>
     </p:extLst>
   </p:cSld>
@@ -8667,8 +8790,8 @@
         </p:nvSpPr>
         <p:spPr>
           <a:xfrm>
-            <a:off x="3504236" y="166169"/>
-            <a:ext cx="4701014" cy="741563"/>
+            <a:off x="4767277" y="239237"/>
+            <a:ext cx="2101864" cy="741563"/>
           </a:xfrm>
           <a:prstGeom prst="rect">
             <a:avLst/>
@@ -8703,24 +8826,35 @@
               <a:defRPr/>
             </a:pPr>
             <a:r>
-              <a:rPr lang="es-CO" sz="3600" b="1" dirty="0">
+              <a:rPr lang="es-CO" sz="3600" b="1">
                 <a:solidFill>
                   <a:srgbClr val="4D4D4C"/>
                 </a:solidFill>
                 <a:latin typeface="WORK SANS BOLD ROMAN"/>
               </a:rPr>
-              <a:t>Control de versiones </a:t>
-            </a:r>
-            <a:endParaRPr lang="es-ES" dirty="0"/>
+              <a:t>Mockups</a:t>
+            </a:r>
+            <a:endParaRPr lang="es-CO" sz="3600" b="1" u="none" strike="noStrike" kern="1200" cap="none" spc="0" normalizeH="0" baseline="0" noProof="0">
+              <a:ln>
+                <a:noFill/>
+              </a:ln>
+              <a:solidFill>
+                <a:srgbClr val="4D4D4C"/>
+              </a:solidFill>
+              <a:effectLst/>
+              <a:uLnTx/>
+              <a:uFillTx/>
+              <a:latin typeface="WORK SANS BOLD ROMAN" pitchFamily="2" charset="77"/>
+            </a:endParaRPr>
           </a:p>
         </p:txBody>
       </p:sp>
       <p:pic>
         <p:nvPicPr>
-          <p:cNvPr id="4" name="Imagen 3" descr="Captura de pantalla de un celular&#10;&#10;Descripción generada automáticamente">
-            <a:extLst>
-              <a:ext uri="{FF2B5EF4-FFF2-40B4-BE49-F238E27FC236}">
-                <a16:creationId xmlns:a16="http://schemas.microsoft.com/office/drawing/2014/main" id="{9AB7EBC9-3E2C-00E1-32C0-DB661D985854}"/>
+          <p:cNvPr id="3" name="Imagen 2">
+            <a:extLst>
+              <a:ext uri="{FF2B5EF4-FFF2-40B4-BE49-F238E27FC236}">
+                <a16:creationId xmlns:a16="http://schemas.microsoft.com/office/drawing/2014/main" id="{D54544D6-2C1A-122C-782B-8D95D21BA110}"/>
               </a:ext>
             </a:extLst>
           </p:cNvPr>
@@ -8737,8 +8871,38 @@
         </p:blipFill>
         <p:spPr>
           <a:xfrm>
-            <a:off x="323589" y="1245339"/>
-            <a:ext cx="11555261" cy="4930995"/>
+            <a:off x="4175" y="1134585"/>
+            <a:ext cx="5607485" cy="4254803"/>
+          </a:xfrm>
+          <a:prstGeom prst="rect">
+            <a:avLst/>
+          </a:prstGeom>
+        </p:spPr>
+      </p:pic>
+      <p:pic>
+        <p:nvPicPr>
+          <p:cNvPr id="4" name="Imagen 3" descr="Interfaz de usuario gráfica, Aplicación&#10;&#10;Descripción generada automáticamente">
+            <a:extLst>
+              <a:ext uri="{FF2B5EF4-FFF2-40B4-BE49-F238E27FC236}">
+                <a16:creationId xmlns:a16="http://schemas.microsoft.com/office/drawing/2014/main" id="{D0633AF3-9F83-9005-CEB2-DCB308EA40E2}"/>
+              </a:ext>
+            </a:extLst>
+          </p:cNvPr>
+          <p:cNvPicPr>
+            <a:picLocks noChangeAspect="1"/>
+          </p:cNvPicPr>
+          <p:nvPr/>
+        </p:nvPicPr>
+        <p:blipFill>
+          <a:blip r:embed="rId4"/>
+          <a:stretch>
+            <a:fillRect/>
+          </a:stretch>
+        </p:blipFill>
+        <p:spPr>
+          <a:xfrm>
+            <a:off x="6033109" y="1196758"/>
+            <a:ext cx="5971262" cy="4140896"/>
           </a:xfrm>
           <a:prstGeom prst="rect">
             <a:avLst/>
@@ -8748,7 +8912,7 @@
     </p:spTree>
     <p:extLst>
       <p:ext uri="{BB962C8B-B14F-4D97-AF65-F5344CB8AC3E}">
-        <p14:creationId xmlns:p14="http://schemas.microsoft.com/office/powerpoint/2010/main" val="2533307674"/>
+        <p14:creationId xmlns:p14="http://schemas.microsoft.com/office/powerpoint/2010/main" val="103788051"/>
       </p:ext>
     </p:extLst>
   </p:cSld>
@@ -8805,6 +8969,185 @@
         </p:nvSpPr>
         <p:spPr>
           <a:xfrm>
+            <a:off x="3504236" y="166169"/>
+            <a:ext cx="4701014" cy="741563"/>
+          </a:xfrm>
+          <a:prstGeom prst="rect">
+            <a:avLst/>
+          </a:prstGeom>
+          <a:ln>
+            <a:noFill/>
+          </a:ln>
+        </p:spPr>
+        <p:txBody>
+          <a:bodyPr lIns="91440" tIns="45720" rIns="91440" bIns="45720" anchor="t"/>
+          <a:lstStyle>
+            <a:lvl1pPr algn="l" defTabSz="914400" rtl="0" eaLnBrk="1" latinLnBrk="0" hangingPunct="1">
+              <a:lnSpc>
+                <a:spcPct val="90000"/>
+              </a:lnSpc>
+              <a:spcBef>
+                <a:spcPct val="0"/>
+              </a:spcBef>
+              <a:buNone/>
+              <a:defRPr sz="4400" kern="1200">
+                <a:solidFill>
+                  <a:schemeClr val="tx1"/>
+                </a:solidFill>
+                <a:latin typeface="+mj-lt"/>
+                <a:ea typeface="+mj-ea"/>
+                <a:cs typeface="+mj-cs"/>
+              </a:defRPr>
+            </a:lvl1pPr>
+          </a:lstStyle>
+          <a:p>
+            <a:pPr>
+              <a:defRPr/>
+            </a:pPr>
+            <a:r>
+              <a:rPr lang="es-CO" sz="3600" b="1">
+                <a:solidFill>
+                  <a:srgbClr val="4D4D4C"/>
+                </a:solidFill>
+                <a:latin typeface="WORK SANS BOLD ROMAN"/>
+              </a:rPr>
+              <a:t>Control de versiones </a:t>
+            </a:r>
+            <a:endParaRPr lang="es-ES"/>
+          </a:p>
+        </p:txBody>
+      </p:sp>
+      <p:sp>
+        <p:nvSpPr>
+          <p:cNvPr id="5" name="CuadroTexto 4">
+            <a:extLst>
+              <a:ext uri="{FF2B5EF4-FFF2-40B4-BE49-F238E27FC236}">
+                <a16:creationId xmlns:a16="http://schemas.microsoft.com/office/drawing/2014/main" id="{B885BC1D-7373-9563-105E-E089A21767A2}"/>
+              </a:ext>
+            </a:extLst>
+          </p:cNvPr>
+          <p:cNvSpPr txBox="1"/>
+          <p:nvPr/>
+        </p:nvSpPr>
+        <p:spPr>
+          <a:xfrm>
+            <a:off x="475989" y="5997879"/>
+            <a:ext cx="5070953" cy="369332"/>
+          </a:xfrm>
+          <a:prstGeom prst="rect">
+            <a:avLst/>
+          </a:prstGeom>
+          <a:noFill/>
+        </p:spPr>
+        <p:txBody>
+          <a:bodyPr rot="0" spcFirstLastPara="0" vertOverflow="overflow" horzOverflow="overflow" vert="horz" wrap="square" lIns="91440" tIns="45720" rIns="91440" bIns="45720" numCol="1" spcCol="0" rtlCol="0" fromWordArt="0" anchor="t" anchorCtr="0" forceAA="0" compatLnSpc="1">
+            <a:prstTxWarp prst="textNoShape">
+              <a:avLst/>
+            </a:prstTxWarp>
+            <a:spAutoFit/>
+          </a:bodyPr>
+          <a:lstStyle/>
+          <a:p>
+            <a:r>
+              <a:rPr lang="en-US" dirty="0">
+                <a:hlinkClick r:id="rId3"/>
+              </a:rPr>
+              <a:t>Repositorio GITHUB JAME</a:t>
+            </a:r>
+            <a:endParaRPr lang="en-US"/>
+          </a:p>
+        </p:txBody>
+      </p:sp>
+      <p:pic>
+        <p:nvPicPr>
+          <p:cNvPr id="3" name="Imagen 2" descr="Captura de pantalla de un celular&#10;&#10;Descripción generada automáticamente">
+            <a:extLst>
+              <a:ext uri="{FF2B5EF4-FFF2-40B4-BE49-F238E27FC236}">
+                <a16:creationId xmlns:a16="http://schemas.microsoft.com/office/drawing/2014/main" id="{5FB4CE6E-852D-0307-8FA3-038A0ABC3A0C}"/>
+              </a:ext>
+            </a:extLst>
+          </p:cNvPr>
+          <p:cNvPicPr>
+            <a:picLocks noChangeAspect="1"/>
+          </p:cNvPicPr>
+          <p:nvPr/>
+        </p:nvPicPr>
+        <p:blipFill>
+          <a:blip r:embed="rId4"/>
+          <a:stretch>
+            <a:fillRect/>
+          </a:stretch>
+        </p:blipFill>
+        <p:spPr>
+          <a:xfrm>
+            <a:off x="675736" y="903210"/>
+            <a:ext cx="9762227" cy="4792788"/>
+          </a:xfrm>
+          <a:prstGeom prst="rect">
+            <a:avLst/>
+          </a:prstGeom>
+        </p:spPr>
+      </p:pic>
+    </p:spTree>
+    <p:extLst>
+      <p:ext uri="{BB962C8B-B14F-4D97-AF65-F5344CB8AC3E}">
+        <p14:creationId xmlns:p14="http://schemas.microsoft.com/office/powerpoint/2010/main" val="2533307674"/>
+      </p:ext>
+    </p:extLst>
+  </p:cSld>
+  <p:clrMapOvr>
+    <a:masterClrMapping/>
+  </p:clrMapOvr>
+</p:sld>
+</file>
+
+<file path=ppt/slides/slide22.xml><?xml version="1.0" encoding="utf-8"?>
+<p:sld xmlns:a="http://schemas.openxmlformats.org/drawingml/2006/main" xmlns:r="http://schemas.openxmlformats.org/officeDocument/2006/relationships" xmlns:p="http://schemas.openxmlformats.org/presentationml/2006/main">
+  <p:cSld>
+    <p:bg>
+      <p:bgPr>
+        <a:blipFill dpi="0" rotWithShape="1">
+          <a:blip r:embed="rId2">
+            <a:lum/>
+          </a:blip>
+          <a:srcRect/>
+          <a:stretch>
+            <a:fillRect/>
+          </a:stretch>
+        </a:blipFill>
+        <a:effectLst/>
+      </p:bgPr>
+    </p:bg>
+    <p:spTree>
+      <p:nvGrpSpPr>
+        <p:cNvPr id="1" name=""/>
+        <p:cNvGrpSpPr/>
+        <p:nvPr/>
+      </p:nvGrpSpPr>
+      <p:grpSpPr>
+        <a:xfrm>
+          <a:off x="0" y="0"/>
+          <a:ext cx="0" cy="0"/>
+          <a:chOff x="0" y="0"/>
+          <a:chExt cx="0" cy="0"/>
+        </a:xfrm>
+      </p:grpSpPr>
+      <p:sp>
+        <p:nvSpPr>
+          <p:cNvPr id="2" name="Título 1">
+            <a:extLst>
+              <a:ext uri="{FF2B5EF4-FFF2-40B4-BE49-F238E27FC236}">
+                <a16:creationId xmlns:a16="http://schemas.microsoft.com/office/drawing/2014/main" id="{2ACE75F1-F343-8856-BC69-4BB6B82BF3E4}"/>
+              </a:ext>
+            </a:extLst>
+          </p:cNvPr>
+          <p:cNvSpPr txBox="1">
+            <a:spLocks/>
+          </p:cNvSpPr>
+          <p:nvPr/>
+        </p:nvSpPr>
+        <p:spPr>
+          <a:xfrm>
             <a:off x="456236" y="416689"/>
             <a:ext cx="9815809" cy="741563"/>
           </a:xfrm>
@@ -8864,6 +9207,290 @@
           </a:p>
         </p:txBody>
       </p:sp>
+      <p:sp>
+        <p:nvSpPr>
+          <p:cNvPr id="4" name="CuadroTexto 3">
+            <a:extLst>
+              <a:ext uri="{FF2B5EF4-FFF2-40B4-BE49-F238E27FC236}">
+                <a16:creationId xmlns:a16="http://schemas.microsoft.com/office/drawing/2014/main" id="{555AE810-3EB2-584A-E79A-5EEFE5285E37}"/>
+              </a:ext>
+            </a:extLst>
+          </p:cNvPr>
+          <p:cNvSpPr txBox="1"/>
+          <p:nvPr/>
+        </p:nvSpPr>
+        <p:spPr>
+          <a:xfrm>
+            <a:off x="456235" y="1296906"/>
+            <a:ext cx="9752842" cy="4462760"/>
+          </a:xfrm>
+          <a:prstGeom prst="rect">
+            <a:avLst/>
+          </a:prstGeom>
+          <a:noFill/>
+        </p:spPr>
+        <p:txBody>
+          <a:bodyPr wrap="square" lIns="91440" tIns="45720" rIns="91440" bIns="45720" rtlCol="0" anchor="t">
+            <a:spAutoFit/>
+          </a:bodyPr>
+          <a:lstStyle/>
+          <a:p>
+            <a:pPr marL="285750" indent="-285750" algn="just">
+              <a:buFont typeface="Calibri"/>
+              <a:buChar char="-"/>
+            </a:pPr>
+            <a:r>
+              <a:rPr lang="es-CO" sz="1600" dirty="0" err="1">
+                <a:latin typeface="Georgia"/>
+              </a:rPr>
+              <a:t>Rehkopf</a:t>
+            </a:r>
+            <a:r>
+              <a:rPr lang="es-CO" sz="1600" dirty="0">
+                <a:latin typeface="Georgia"/>
+              </a:rPr>
+              <a:t>, D. M. (s. f.). </a:t>
+            </a:r>
+            <a:r>
+              <a:rPr lang="es-CO" sz="1600" i="1" dirty="0">
+                <a:latin typeface="Georgia"/>
+              </a:rPr>
+              <a:t>Historias de usuario</a:t>
+            </a:r>
+            <a:r>
+              <a:rPr lang="es-CO" sz="1600" dirty="0">
+                <a:latin typeface="Georgia"/>
+              </a:rPr>
+              <a:t>. </a:t>
+            </a:r>
+            <a:r>
+              <a:rPr lang="es-CO" sz="1600" dirty="0" err="1">
+                <a:latin typeface="Georgia"/>
+              </a:rPr>
+              <a:t>Atlassian</a:t>
+            </a:r>
+            <a:r>
+              <a:rPr lang="es-CO" sz="1600" dirty="0">
+                <a:latin typeface="Georgia"/>
+              </a:rPr>
+              <a:t>. Recuperado 3 de abril de 2024, de </a:t>
+            </a:r>
+            <a:r>
+              <a:rPr lang="es-CO" sz="1600" dirty="0">
+                <a:latin typeface="Georgia"/>
+                <a:hlinkClick r:id="rId3"/>
+              </a:rPr>
+              <a:t>https://www.atlassian.com/es/agile/project-management/user-stories</a:t>
+            </a:r>
+            <a:endParaRPr lang="es-CO" sz="1600">
+              <a:latin typeface="Work Sans Light Roman" pitchFamily="2" charset="77"/>
+            </a:endParaRPr>
+          </a:p>
+          <a:p>
+            <a:pPr marL="285750" indent="-285750" algn="just">
+              <a:buFont typeface="Calibri"/>
+              <a:buChar char="-"/>
+            </a:pPr>
+            <a:endParaRPr lang="es-CO" sz="1600" dirty="0">
+              <a:latin typeface="Georgia"/>
+            </a:endParaRPr>
+          </a:p>
+          <a:p>
+            <a:pPr marL="285750" indent="-285750" algn="just">
+              <a:buFont typeface="Calibri"/>
+              <a:buChar char="-"/>
+            </a:pPr>
+            <a:r>
+              <a:rPr lang="es-CO" sz="1600" dirty="0">
+                <a:latin typeface="Georgia"/>
+              </a:rPr>
+              <a:t>(S. f.). Hhs.gov. Recuperado 3 de abril de 2024, de </a:t>
+            </a:r>
+            <a:r>
+              <a:rPr lang="es-CO" sz="1600" dirty="0">
+                <a:latin typeface="Georgia"/>
+                <a:hlinkClick r:id="rId4"/>
+              </a:rPr>
+              <a:t>https://ori.hhs.gov/módulo-4-métodos-de-recaudación-de-información-sección-1#:~:text=Algunos%20métodos%20de%20recolección%20de,registros%20existentes%20y%20muestras%20biológicas</a:t>
+            </a:r>
+            <a:r>
+              <a:rPr lang="es-CO" sz="1600" dirty="0">
+                <a:latin typeface="Georgia"/>
+              </a:rPr>
+              <a:t>.</a:t>
+            </a:r>
+          </a:p>
+          <a:p>
+            <a:pPr marL="285750" indent="-285750" algn="just">
+              <a:buFont typeface="Calibri"/>
+              <a:buChar char="-"/>
+            </a:pPr>
+            <a:r>
+              <a:rPr lang="en-US" dirty="0" err="1">
+                <a:latin typeface="Georgia"/>
+                <a:ea typeface="+mn-lt"/>
+                <a:cs typeface="+mn-lt"/>
+              </a:rPr>
+              <a:t>Northware</a:t>
+            </a:r>
+            <a:r>
+              <a:rPr lang="en-US" dirty="0">
+                <a:latin typeface="Georgia"/>
+                <a:ea typeface="+mn-lt"/>
+                <a:cs typeface="+mn-lt"/>
+              </a:rPr>
+              <a:t>. (2022, mayo 26). </a:t>
+            </a:r>
+            <a:r>
+              <a:rPr lang="en-US" i="1" dirty="0" err="1">
+                <a:latin typeface="Georgia"/>
+                <a:ea typeface="+mn-lt"/>
+                <a:cs typeface="+mn-lt"/>
+              </a:rPr>
+              <a:t>Requerimientos</a:t>
+            </a:r>
+            <a:r>
+              <a:rPr lang="en-US" i="1" dirty="0">
+                <a:latin typeface="Georgia"/>
+                <a:ea typeface="+mn-lt"/>
+                <a:cs typeface="+mn-lt"/>
+              </a:rPr>
+              <a:t> </a:t>
+            </a:r>
+            <a:r>
+              <a:rPr lang="en-US" i="1" dirty="0" err="1">
+                <a:latin typeface="Georgia"/>
+                <a:ea typeface="+mn-lt"/>
+                <a:cs typeface="+mn-lt"/>
+              </a:rPr>
+              <a:t>en</a:t>
+            </a:r>
+            <a:r>
+              <a:rPr lang="en-US" i="1" dirty="0">
+                <a:latin typeface="Georgia"/>
+                <a:ea typeface="+mn-lt"/>
+                <a:cs typeface="+mn-lt"/>
+              </a:rPr>
+              <a:t> </a:t>
+            </a:r>
+            <a:r>
+              <a:rPr lang="en-US" i="1" dirty="0" err="1">
+                <a:latin typeface="Georgia"/>
+                <a:ea typeface="+mn-lt"/>
+                <a:cs typeface="+mn-lt"/>
+              </a:rPr>
+              <a:t>el</a:t>
+            </a:r>
+            <a:r>
+              <a:rPr lang="en-US" i="1" dirty="0">
+                <a:latin typeface="Georgia"/>
+                <a:ea typeface="+mn-lt"/>
+                <a:cs typeface="+mn-lt"/>
+              </a:rPr>
+              <a:t> </a:t>
+            </a:r>
+            <a:r>
+              <a:rPr lang="en-US" i="1" dirty="0" err="1">
+                <a:latin typeface="Georgia"/>
+                <a:ea typeface="+mn-lt"/>
+                <a:cs typeface="+mn-lt"/>
+              </a:rPr>
+              <a:t>desarrollo</a:t>
+            </a:r>
+            <a:r>
+              <a:rPr lang="en-US" i="1" dirty="0">
+                <a:latin typeface="Georgia"/>
+                <a:ea typeface="+mn-lt"/>
+                <a:cs typeface="+mn-lt"/>
+              </a:rPr>
+              <a:t> de software y </a:t>
+            </a:r>
+            <a:r>
+              <a:rPr lang="en-US" i="1" dirty="0" err="1">
+                <a:latin typeface="Georgia"/>
+                <a:ea typeface="+mn-lt"/>
+                <a:cs typeface="+mn-lt"/>
+              </a:rPr>
+              <a:t>aplicaciones</a:t>
+            </a:r>
+            <a:r>
+              <a:rPr lang="en-US" dirty="0">
+                <a:latin typeface="Georgia"/>
+                <a:ea typeface="+mn-lt"/>
+                <a:cs typeface="+mn-lt"/>
+              </a:rPr>
+              <a:t>. </a:t>
+            </a:r>
+            <a:r>
+              <a:rPr lang="en-US" dirty="0" err="1">
+                <a:latin typeface="Georgia"/>
+                <a:ea typeface="+mn-lt"/>
+                <a:cs typeface="+mn-lt"/>
+              </a:rPr>
+              <a:t>Northware</a:t>
+            </a:r>
+            <a:r>
+              <a:rPr lang="en-US" dirty="0">
+                <a:latin typeface="Georgia"/>
+                <a:ea typeface="+mn-lt"/>
+                <a:cs typeface="+mn-lt"/>
+              </a:rPr>
+              <a:t>. </a:t>
+            </a:r>
+            <a:r>
+              <a:rPr lang="en-US" dirty="0">
+                <a:latin typeface="Georgia"/>
+                <a:ea typeface="+mn-lt"/>
+                <a:cs typeface="+mn-lt"/>
+                <a:hlinkClick r:id="rId5"/>
+              </a:rPr>
+              <a:t>https://www.northware.mx/blog/requerimientos-en-el-desarrollo-de-software-y-aplicaciones/</a:t>
+            </a:r>
+            <a:br>
+              <a:rPr lang="en-US" dirty="0"/>
+            </a:br>
+            <a:endParaRPr lang="en-US">
+              <a:cs typeface="Calibri" panose="020F0502020204030204"/>
+            </a:endParaRPr>
+          </a:p>
+          <a:p>
+            <a:pPr marL="285750" indent="-285750" algn="just">
+              <a:buFont typeface="Calibri"/>
+              <a:buChar char="-"/>
+            </a:pPr>
+            <a:endParaRPr lang="es-CO" sz="1600" dirty="0">
+              <a:latin typeface="Georgia"/>
+            </a:endParaRPr>
+          </a:p>
+          <a:p>
+            <a:pPr algn="just"/>
+            <a:br>
+              <a:rPr lang="en-US" dirty="0"/>
+            </a:br>
+            <a:endParaRPr lang="en-US" dirty="0"/>
+          </a:p>
+          <a:p>
+            <a:pPr algn="just"/>
+            <a:endParaRPr lang="es-CO" sz="1600" dirty="0">
+              <a:latin typeface="Work Sans Light Roman" pitchFamily="2" charset="77"/>
+            </a:endParaRPr>
+          </a:p>
+          <a:p>
+            <a:pPr marL="285750" indent="-285750">
+              <a:buFont typeface="Calibri"/>
+              <a:buChar char="-"/>
+            </a:pPr>
+            <a:endParaRPr lang="es-CO" sz="1600">
+              <a:latin typeface="Work Sans Light Roman" pitchFamily="2" charset="77"/>
+            </a:endParaRPr>
+          </a:p>
+          <a:p>
+            <a:endParaRPr lang="es-CO" sz="1600">
+              <a:latin typeface="Work Sans Light Roman" pitchFamily="2" charset="77"/>
+            </a:endParaRPr>
+          </a:p>
+        </p:txBody>
+      </p:sp>
     </p:spTree>
     <p:extLst>
       <p:ext uri="{BB962C8B-B14F-4D97-AF65-F5344CB8AC3E}">
@@ -8877,7 +9504,7 @@
 </p:sld>
 </file>
 
-<file path=ppt/slides/slide22.xml><?xml version="1.0" encoding="utf-8"?>
+<file path=ppt/slides/slide23.xml><?xml version="1.0" encoding="utf-8"?>
 <p:sld xmlns:a="http://schemas.openxmlformats.org/drawingml/2006/main" xmlns:r="http://schemas.openxmlformats.org/officeDocument/2006/relationships" xmlns:p="http://schemas.openxmlformats.org/presentationml/2006/main">
   <p:cSld>
     <p:bg>
@@ -9207,8 +9834,8 @@
         </p:nvSpPr>
         <p:spPr>
           <a:xfrm>
-            <a:off x="347075" y="1683415"/>
-            <a:ext cx="4491107" cy="3539430"/>
+            <a:off x="589921" y="1712735"/>
+            <a:ext cx="4726429" cy="4801314"/>
           </a:xfrm>
           <a:prstGeom prst="rect">
             <a:avLst/>
@@ -9223,27 +9850,30 @@
           <a:p>
             <a:pPr algn="just"/>
             <a:r>
-              <a:rPr lang="es-CO" sz="1600">
+              <a:rPr lang="es-CO" dirty="0">
                 <a:latin typeface="Work Sans Light Roman"/>
               </a:rPr>
-              <a:t>La empresa Clínica Veterinaria Ciudad Canina es una organización donde brindan diferentes servicios a mascotas, como lo son, grooming, consultas, shopping, productos de alimentación y cuidado para las mascotas como también productos para su entretenimiento y diversión.</a:t>
-            </a:r>
-          </a:p>
-          <a:p>
-            <a:pPr algn="just"/>
-            <a:endParaRPr lang="es-CO" sz="1600">
+              <a:t>La empresa Clínica Veterinaria Ciudad Canina es una organización que brinda los servicios de  grooming, consultas, shopping, productos de alimentación y cuidado para las mascotas.</a:t>
+            </a:r>
+            <a:endParaRPr lang="es-CO" dirty="0">
               <a:latin typeface="Work Sans Light Roman" pitchFamily="2" charset="77"/>
             </a:endParaRPr>
           </a:p>
           <a:p>
             <a:pPr algn="just"/>
-            <a:r>
-              <a:rPr lang="es-CO" sz="1600">
+            <a:endParaRPr lang="es-CO" dirty="0">
+              <a:latin typeface="Work Sans Light Roman" pitchFamily="2" charset="77"/>
+            </a:endParaRPr>
+          </a:p>
+          <a:p>
+            <a:pPr algn="just"/>
+            <a:r>
+              <a:rPr lang="es-CO" dirty="0">
                 <a:latin typeface="Work Sans Light Roman"/>
               </a:rPr>
-              <a:t>En la veterinaria se identificaron problemas sobre la gestión de inventario, citas médicas y groming, se han evidenciado gastos en sistemas de desarrollos web incompletos,  ya que hasta el momento se ha maneja manualmente, todo lo mencionado anteriormente, esto afecta la perdida de información tanto de la mascota con del cliente.</a:t>
-            </a:r>
-            <a:endParaRPr lang="es-CO" sz="1600">
+              <a:t>En la veterinaria se identificaron problemas sobre la gestión de inventario, agendamiento de citas médicas y grooming, ya que por lo general se suele perder la información de los pacientes o el día en que se agendaba la cita no asistían y no daban reporte alguno de la falla , por otro lado, al momento de generar un inventario no se tiene orden y suele haber confusiones con esto , se maneja la venta de alimentos y medicamentos , que normalmente se vencen a corto plazo y no tienen  un sistema que haga un seguimiento a esto.</a:t>
+            </a:r>
+            <a:endParaRPr lang="es-CO" dirty="0">
               <a:latin typeface="Work Sans Light Roman" pitchFamily="2" charset="77"/>
             </a:endParaRPr>
           </a:p>
@@ -9306,8 +9936,8 @@
         </p:nvSpPr>
         <p:spPr>
           <a:xfrm>
-            <a:off x="6200108" y="1979534"/>
-            <a:ext cx="4491107" cy="1077218"/>
+            <a:off x="6244931" y="1979534"/>
+            <a:ext cx="4704019" cy="1077218"/>
           </a:xfrm>
           <a:prstGeom prst="rect">
             <a:avLst/>
@@ -9498,58 +10128,34 @@
           <a:p>
             <a:pPr algn="just"/>
             <a:r>
-              <a:rPr lang="es-CO" sz="1600" dirty="0">
-                <a:latin typeface="Work Sans Light Roman"/>
-              </a:rPr>
-              <a:t>El sistema de información manejara procesos </a:t>
-            </a:r>
-            <a:r>
               <a:rPr lang="es-CO" sz="1600">
                 <a:latin typeface="Work Sans Light Roman"/>
               </a:rPr>
-              <a:t>de</a:t>
-            </a:r>
-            <a:r>
-              <a:rPr lang="es-CO" sz="1600" dirty="0">
-                <a:latin typeface="Work Sans Light Roman"/>
-              </a:rPr>
-              <a:t> agendamiento de citas y consultas, </a:t>
-            </a:r>
-            <a:r>
-              <a:rPr lang="es-CO" sz="1600" dirty="0" err="1">
+              <a:t>El sistema de información manejara procesos de agendamiento de citas y consultas, </a:t>
+            </a:r>
+            <a:r>
+              <a:rPr lang="es-CO" sz="1600" err="1">
                 <a:latin typeface="Work Sans Light Roman"/>
               </a:rPr>
               <a:t>groming</a:t>
             </a:r>
             <a:r>
-              <a:rPr lang="es-CO" sz="1600" dirty="0">
-                <a:latin typeface="Work Sans Light Roman"/>
-              </a:rPr>
-              <a:t> o de tratamiento médico de la mascota, manejara procesos de  inventario, como  el ingreso y egreso de la empresa, también la compra y venta de productos. </a:t>
-            </a:r>
-            <a:r>
               <a:rPr lang="es-CO" sz="1600">
                 <a:latin typeface="Work Sans Light Roman"/>
               </a:rPr>
-              <a:t> </a:t>
-            </a:r>
-            <a:r>
-              <a:rPr lang="es-CO" sz="1600" dirty="0">
-                <a:latin typeface="Work Sans Light Roman"/>
-              </a:rPr>
-              <a:t>se realizará un apartado para tratamiento o recomendaciones por parte del profesional médico. No se recibirán ni se realizarán pagos por internet, tendrá un apartado para la solicitud de pedidos por medio de carrito de compras.  Los pagos se realizan en la tienda física, y también el pedido realizado.</a:t>
-            </a:r>
-            <a:endParaRPr lang="es-CO" dirty="0"/>
+              <a:t> o de tratamiento médico de la mascota, manejara procesos de  inventario, como  el ingreso y egreso de la empresa, también la compra y venta de productos.  se realizará un apartado para tratamiento o recomendaciones por parte del profesional médico. No se recibirán ni se realizarán pagos por internet, tendrá un apartado para la solicitud de pedidos por medio de carrito de compras.  Los pagos se realizan en la tienda física, y también el pedido realizado.</a:t>
+            </a:r>
+            <a:endParaRPr lang="es-CO"/>
           </a:p>
           <a:p>
             <a:pPr algn="just"/>
             <a:r>
-              <a:rPr lang="es-CO" sz="1600" dirty="0">
+              <a:rPr lang="es-CO" sz="1600">
                 <a:latin typeface="Work Sans Light Roman"/>
               </a:rPr>
               <a:t>Todo el tema de compra de productos se realizará por parte de La Clínica Veterinaria, no se realizarán pedidos de servicios a domicilio. Este proyecto durara 6 trimestres lo que durara aproximadamente el tecnólogo en Análisis y Desarrollo de software</a:t>
             </a:r>
-            <a:endParaRPr lang="es-CO" sz="1600" dirty="0">
+            <a:endParaRPr lang="es-CO" sz="1600">
               <a:latin typeface="Work Sans Light Roman" pitchFamily="2" charset="77"/>
             </a:endParaRPr>
           </a:p>
@@ -9645,9 +10251,15 @@
   <p:cSld>
     <p:bg>
       <p:bgPr>
-        <a:solidFill>
-          <a:schemeClr val="bg1"/>
-        </a:solidFill>
+        <a:blipFill dpi="0" rotWithShape="1">
+          <a:blip r:embed="rId2">
+            <a:lum/>
+          </a:blip>
+          <a:srcRect/>
+          <a:stretch>
+            <a:fillRect/>
+          </a:stretch>
+        </a:blipFill>
         <a:effectLst/>
       </p:bgPr>
     </p:bg>
@@ -9665,634 +10277,119 @@
           <a:chExt cx="0" cy="0"/>
         </a:xfrm>
       </p:grpSpPr>
-      <p:sp useBgFill="1">
+      <p:sp>
         <p:nvSpPr>
-          <p:cNvPr id="33" name="Rectangle 32">
-            <a:extLst>
-              <a:ext uri="{FF2B5EF4-FFF2-40B4-BE49-F238E27FC236}">
-                <a16:creationId xmlns:a16="http://schemas.microsoft.com/office/drawing/2014/main" id="{09588DA8-065E-4F6F-8EFD-43104AB2E0CF}"/>
-              </a:ext>
-              <a:ext uri="{C183D7F6-B498-43B3-948B-1728B52AA6E4}">
-                <adec:decorative xmlns:adec="http://schemas.microsoft.com/office/drawing/2017/decorative" val="1"/>
-              </a:ext>
-            </a:extLst>
-          </p:cNvPr>
-          <p:cNvSpPr>
-            <a:spLocks noGrp="1" noRot="1" noChangeAspect="1" noMove="1" noResize="1" noEditPoints="1" noAdjustHandles="1" noChangeArrowheads="1" noChangeShapeType="1" noTextEdit="1"/>
+          <p:cNvPr id="2" name="Título 1">
+            <a:extLst>
+              <a:ext uri="{FF2B5EF4-FFF2-40B4-BE49-F238E27FC236}">
+                <a16:creationId xmlns:a16="http://schemas.microsoft.com/office/drawing/2014/main" id="{2B951D1C-ACAB-30A9-933A-FC96DF28A2F0}"/>
+              </a:ext>
+            </a:extLst>
+          </p:cNvPr>
+          <p:cNvSpPr txBox="1">
+            <a:spLocks/>
           </p:cNvSpPr>
-          <p:nvPr>
-            <p:extLst>
-              <p:ext uri="{386F3935-93C4-4BCD-93E2-E3B085C9AB24}">
-                <p16:designElem xmlns:p16="http://schemas.microsoft.com/office/powerpoint/2015/main" val="1"/>
-              </p:ext>
-            </p:extLst>
-          </p:nvPr>
+          <p:nvPr/>
         </p:nvSpPr>
         <p:spPr>
           <a:xfrm>
-            <a:off x="0" y="0"/>
-            <a:ext cx="12192000" cy="6858000"/>
+            <a:off x="1827363" y="200786"/>
+            <a:ext cx="7176682" cy="1135885"/>
           </a:xfrm>
           <a:prstGeom prst="rect">
             <a:avLst/>
           </a:prstGeom>
-          <a:ln w="12700" cap="flat" cmpd="sng" algn="ctr">
-            <a:noFill/>
-            <a:prstDash val="solid"/>
-            <a:miter lim="800000"/>
+        </p:spPr>
+        <p:txBody>
+          <a:bodyPr lIns="91440" tIns="45720" rIns="91440" bIns="45720" anchor="t"/>
+          <a:lstStyle>
+            <a:lvl1pPr algn="l" defTabSz="914400" rtl="0" eaLnBrk="1" latinLnBrk="0" hangingPunct="1">
+              <a:lnSpc>
+                <a:spcPct val="90000"/>
+              </a:lnSpc>
+              <a:spcBef>
+                <a:spcPct val="0"/>
+              </a:spcBef>
+              <a:buNone/>
+              <a:defRPr sz="4400" kern="1200">
+                <a:solidFill>
+                  <a:schemeClr val="tx1"/>
+                </a:solidFill>
+                <a:latin typeface="+mj-lt"/>
+                <a:ea typeface="+mj-ea"/>
+                <a:cs typeface="+mj-cs"/>
+              </a:defRPr>
+            </a:lvl1pPr>
+          </a:lstStyle>
+          <a:p>
+            <a:pPr algn="ctr"/>
+            <a:r>
+              <a:rPr lang="es-CO" sz="3600" b="1" dirty="0">
+                <a:solidFill>
+                  <a:srgbClr val="38AA00"/>
+                </a:solidFill>
+                <a:latin typeface="WORK SANS BOLD ROMAN"/>
+              </a:rPr>
+              <a:t>Justificación </a:t>
+            </a:r>
+            <a:endParaRPr lang="es-CO" sz="3600" b="1" dirty="0">
+              <a:solidFill>
+                <a:srgbClr val="38AA00"/>
+              </a:solidFill>
+              <a:latin typeface="WORK SANS BOLD ROMAN" pitchFamily="2" charset="77"/>
+            </a:endParaRPr>
+          </a:p>
+        </p:txBody>
+      </p:sp>
+      <p:cxnSp>
+        <p:nvCxnSpPr>
+          <p:cNvPr id="4" name="Conector recto 3">
+            <a:extLst>
+              <a:ext uri="{FF2B5EF4-FFF2-40B4-BE49-F238E27FC236}">
+                <a16:creationId xmlns:a16="http://schemas.microsoft.com/office/drawing/2014/main" id="{669DD18A-AB54-34AC-A662-0BDC60B050FF}"/>
+              </a:ext>
+            </a:extLst>
+          </p:cNvPr>
+          <p:cNvCxnSpPr>
+            <a:cxnSpLocks/>
+          </p:cNvCxnSpPr>
+          <p:nvPr/>
+        </p:nvCxnSpPr>
+        <p:spPr>
+          <a:xfrm>
+            <a:off x="3850563" y="772999"/>
+            <a:ext cx="3127386" cy="0"/>
+          </a:xfrm>
+          <a:prstGeom prst="line">
+            <a:avLst/>
+          </a:prstGeom>
+          <a:ln w="12700">
+            <a:solidFill>
+              <a:srgbClr val="4D4D4C"/>
+            </a:solidFill>
           </a:ln>
-          <a:effectLst/>
-          <a:extLst>
-            <a:ext uri="{91240B29-F687-4F45-9708-019B960494DF}">
-              <a14:hiddenLine xmlns:a14="http://schemas.microsoft.com/office/drawing/2010/main" w="12700" cap="flat" cmpd="sng" algn="ctr">
-                <a:solidFill>
-                  <a:schemeClr val="accent1">
-                    <a:shade val="50000"/>
-                  </a:schemeClr>
-                </a:solidFill>
-                <a:prstDash val="solid"/>
-                <a:miter lim="800000"/>
-              </a14:hiddenLine>
-            </a:ext>
-          </a:extLst>
         </p:spPr>
         <p:style>
-          <a:lnRef idx="2">
-            <a:schemeClr val="accent1">
-              <a:shade val="50000"/>
-            </a:schemeClr>
+          <a:lnRef idx="1">
+            <a:schemeClr val="accent1"/>
           </a:lnRef>
-          <a:fillRef idx="1">
+          <a:fillRef idx="0">
             <a:schemeClr val="accent1"/>
           </a:fillRef>
           <a:effectRef idx="0">
             <a:schemeClr val="accent1"/>
           </a:effectRef>
           <a:fontRef idx="minor">
-            <a:schemeClr val="lt1"/>
+            <a:schemeClr val="tx1"/>
           </a:fontRef>
         </p:style>
-        <p:txBody>
-          <a:bodyPr rtlCol="0" anchor="ctr"/>
-          <a:lstStyle/>
-          <a:p>
-            <a:pPr algn="ctr"/>
-            <a:endParaRPr lang="en-US"/>
-          </a:p>
-        </p:txBody>
-      </p:sp>
-      <p:sp useBgFill="1">
-        <p:nvSpPr>
-          <p:cNvPr id="35" name="Rectangle 34">
-            <a:extLst>
-              <a:ext uri="{FF2B5EF4-FFF2-40B4-BE49-F238E27FC236}">
-                <a16:creationId xmlns:a16="http://schemas.microsoft.com/office/drawing/2014/main" id="{C4285719-470E-454C-AF62-8323075F1F5B}"/>
-              </a:ext>
-              <a:ext uri="{C183D7F6-B498-43B3-948B-1728B52AA6E4}">
-                <adec:decorative xmlns:adec="http://schemas.microsoft.com/office/drawing/2017/decorative" val="1"/>
-              </a:ext>
-            </a:extLst>
-          </p:cNvPr>
-          <p:cNvSpPr>
-            <a:spLocks noGrp="1" noRot="1" noChangeAspect="1" noMove="1" noResize="1" noEditPoints="1" noAdjustHandles="1" noChangeArrowheads="1" noChangeShapeType="1" noTextEdit="1"/>
-          </p:cNvSpPr>
-          <p:nvPr>
-            <p:extLst>
-              <p:ext uri="{386F3935-93C4-4BCD-93E2-E3B085C9AB24}">
-                <p16:designElem xmlns:p16="http://schemas.microsoft.com/office/powerpoint/2015/main" val="1"/>
-              </p:ext>
-            </p:extLst>
-          </p:nvPr>
-        </p:nvSpPr>
-        <p:spPr>
-          <a:xfrm>
-            <a:off x="0" y="0"/>
-            <a:ext cx="12188952" cy="6858000"/>
-          </a:xfrm>
-          <a:prstGeom prst="rect">
-            <a:avLst/>
-          </a:prstGeom>
-          <a:ln w="12700" cap="flat" cmpd="sng" algn="ctr">
-            <a:noFill/>
-            <a:prstDash val="solid"/>
-            <a:miter lim="800000"/>
-          </a:ln>
-          <a:effectLst/>
-          <a:extLst>
-            <a:ext uri="{91240B29-F687-4F45-9708-019B960494DF}">
-              <a14:hiddenLine xmlns:a14="http://schemas.microsoft.com/office/drawing/2010/main" w="12700" cap="flat" cmpd="sng" algn="ctr">
-                <a:solidFill>
-                  <a:schemeClr val="accent1">
-                    <a:shade val="50000"/>
-                  </a:schemeClr>
-                </a:solidFill>
-                <a:prstDash val="solid"/>
-                <a:miter lim="800000"/>
-              </a14:hiddenLine>
-            </a:ext>
-          </a:extLst>
-        </p:spPr>
-        <p:style>
-          <a:lnRef idx="2">
-            <a:schemeClr val="accent1">
-              <a:shade val="50000"/>
-            </a:schemeClr>
-          </a:lnRef>
-          <a:fillRef idx="1">
-            <a:schemeClr val="accent1"/>
-          </a:fillRef>
-          <a:effectRef idx="0">
-            <a:schemeClr val="accent1"/>
-          </a:effectRef>
-          <a:fontRef idx="minor">
-            <a:schemeClr val="lt1"/>
-          </a:fontRef>
-        </p:style>
-        <p:txBody>
-          <a:bodyPr rtlCol="0" anchor="ctr"/>
-          <a:lstStyle/>
-          <a:p>
-            <a:pPr algn="ctr"/>
-            <a:endParaRPr lang="en-US"/>
-          </a:p>
-        </p:txBody>
-      </p:sp>
+      </p:cxnSp>
       <p:sp>
         <p:nvSpPr>
-          <p:cNvPr id="37" name="Rectangle 36">
-            <a:extLst>
-              <a:ext uri="{FF2B5EF4-FFF2-40B4-BE49-F238E27FC236}">
-                <a16:creationId xmlns:a16="http://schemas.microsoft.com/office/drawing/2014/main" id="{CD9FE4EF-C4D8-49A0-B2FF-81D8DB7D8A24}"/>
-              </a:ext>
-              <a:ext uri="{C183D7F6-B498-43B3-948B-1728B52AA6E4}">
-                <adec:decorative xmlns:adec="http://schemas.microsoft.com/office/drawing/2017/decorative" val="1"/>
-              </a:ext>
-            </a:extLst>
-          </p:cNvPr>
-          <p:cNvSpPr>
-            <a:spLocks noGrp="1" noRot="1" noChangeAspect="1" noMove="1" noResize="1" noEditPoints="1" noAdjustHandles="1" noChangeArrowheads="1" noChangeShapeType="1" noTextEdit="1"/>
-          </p:cNvSpPr>
-          <p:nvPr>
-            <p:extLst>
-              <p:ext uri="{386F3935-93C4-4BCD-93E2-E3B085C9AB24}">
-                <p16:designElem xmlns:p16="http://schemas.microsoft.com/office/powerpoint/2015/main" val="1"/>
-              </p:ext>
-            </p:extLst>
-          </p:nvPr>
-        </p:nvSpPr>
-        <p:spPr>
-          <a:xfrm rot="5400000" flipH="1">
-            <a:off x="-1410084" y="1410082"/>
-            <a:ext cx="6858000" cy="4037836"/>
-          </a:xfrm>
-          <a:prstGeom prst="rect">
-            <a:avLst/>
-          </a:prstGeom>
-          <a:gradFill>
-            <a:gsLst>
-              <a:gs pos="8000">
-                <a:srgbClr val="000000"/>
-              </a:gs>
-              <a:gs pos="100000">
-                <a:schemeClr val="accent1">
-                  <a:lumMod val="75000"/>
-                </a:schemeClr>
-              </a:gs>
-            </a:gsLst>
-            <a:lin ang="3000000" scaled="0"/>
-          </a:gradFill>
-          <a:ln>
-            <a:noFill/>
-          </a:ln>
-        </p:spPr>
-        <p:style>
-          <a:lnRef idx="2">
-            <a:schemeClr val="accent1">
-              <a:shade val="50000"/>
-            </a:schemeClr>
-          </a:lnRef>
-          <a:fillRef idx="1">
-            <a:schemeClr val="accent1"/>
-          </a:fillRef>
-          <a:effectRef idx="0">
-            <a:schemeClr val="accent1"/>
-          </a:effectRef>
-          <a:fontRef idx="minor">
-            <a:schemeClr val="lt1"/>
-          </a:fontRef>
-        </p:style>
-        <p:txBody>
-          <a:bodyPr rtlCol="0" anchor="ctr"/>
-          <a:lstStyle/>
-          <a:p>
-            <a:pPr algn="ctr"/>
-            <a:endParaRPr lang="en-US"/>
-          </a:p>
-        </p:txBody>
-      </p:sp>
-      <p:sp>
-        <p:nvSpPr>
-          <p:cNvPr id="39" name="Rectangle 38">
-            <a:extLst>
-              <a:ext uri="{FF2B5EF4-FFF2-40B4-BE49-F238E27FC236}">
-                <a16:creationId xmlns:a16="http://schemas.microsoft.com/office/drawing/2014/main" id="{4300840D-0A0B-4512-BACA-B439D5B9C57C}"/>
-              </a:ext>
-              <a:ext uri="{C183D7F6-B498-43B3-948B-1728B52AA6E4}">
-                <adec:decorative xmlns:adec="http://schemas.microsoft.com/office/drawing/2017/decorative" val="1"/>
-              </a:ext>
-            </a:extLst>
-          </p:cNvPr>
-          <p:cNvSpPr>
-            <a:spLocks noGrp="1" noRot="1" noChangeAspect="1" noMove="1" noResize="1" noEditPoints="1" noAdjustHandles="1" noChangeArrowheads="1" noChangeShapeType="1" noTextEdit="1"/>
-          </p:cNvSpPr>
-          <p:nvPr>
-            <p:extLst>
-              <p:ext uri="{386F3935-93C4-4BCD-93E2-E3B085C9AB24}">
-                <p16:designElem xmlns:p16="http://schemas.microsoft.com/office/powerpoint/2015/main" val="1"/>
-              </p:ext>
-            </p:extLst>
-          </p:nvPr>
-        </p:nvSpPr>
-        <p:spPr>
-          <a:xfrm rot="5400000" flipH="1">
-            <a:off x="-1410085" y="1420219"/>
-            <a:ext cx="6857999" cy="4037839"/>
-          </a:xfrm>
-          <a:prstGeom prst="rect">
-            <a:avLst/>
-          </a:prstGeom>
-          <a:gradFill>
-            <a:gsLst>
-              <a:gs pos="0">
-                <a:srgbClr val="000000">
-                  <a:alpha val="0"/>
-                </a:srgbClr>
-              </a:gs>
-              <a:gs pos="99000">
-                <a:schemeClr val="accent1">
-                  <a:alpha val="46000"/>
-                </a:schemeClr>
-              </a:gs>
-            </a:gsLst>
-            <a:lin ang="1800000" scaled="0"/>
-          </a:gradFill>
-          <a:ln>
-            <a:noFill/>
-          </a:ln>
-        </p:spPr>
-        <p:style>
-          <a:lnRef idx="2">
-            <a:schemeClr val="accent1">
-              <a:shade val="50000"/>
-            </a:schemeClr>
-          </a:lnRef>
-          <a:fillRef idx="1">
-            <a:schemeClr val="accent1"/>
-          </a:fillRef>
-          <a:effectRef idx="0">
-            <a:schemeClr val="accent1"/>
-          </a:effectRef>
-          <a:fontRef idx="minor">
-            <a:schemeClr val="lt1"/>
-          </a:fontRef>
-        </p:style>
-        <p:txBody>
-          <a:bodyPr rtlCol="0" anchor="ctr"/>
-          <a:lstStyle/>
-          <a:p>
-            <a:pPr algn="ctr"/>
-            <a:endParaRPr lang="en-US"/>
-          </a:p>
-        </p:txBody>
-      </p:sp>
-      <p:sp>
-        <p:nvSpPr>
-          <p:cNvPr id="41" name="Rectangle 40">
-            <a:extLst>
-              <a:ext uri="{FF2B5EF4-FFF2-40B4-BE49-F238E27FC236}">
-                <a16:creationId xmlns:a16="http://schemas.microsoft.com/office/drawing/2014/main" id="{D2B78728-A580-49A7-84F9-6EF6F583ADE0}"/>
-              </a:ext>
-              <a:ext uri="{C183D7F6-B498-43B3-948B-1728B52AA6E4}">
-                <adec:decorative xmlns:adec="http://schemas.microsoft.com/office/drawing/2017/decorative" val="1"/>
-              </a:ext>
-            </a:extLst>
-          </p:cNvPr>
-          <p:cNvSpPr>
-            <a:spLocks noGrp="1" noRot="1" noChangeAspect="1" noMove="1" noResize="1" noEditPoints="1" noAdjustHandles="1" noChangeArrowheads="1" noChangeShapeType="1" noTextEdit="1"/>
-          </p:cNvSpPr>
-          <p:nvPr>
-            <p:extLst>
-              <p:ext uri="{386F3935-93C4-4BCD-93E2-E3B085C9AB24}">
-                <p16:designElem xmlns:p16="http://schemas.microsoft.com/office/powerpoint/2015/main" val="1"/>
-              </p:ext>
-            </p:extLst>
-          </p:nvPr>
-        </p:nvSpPr>
-        <p:spPr>
-          <a:xfrm rot="5400000" flipH="1">
-            <a:off x="767923" y="3588085"/>
-            <a:ext cx="2501979" cy="4037841"/>
-          </a:xfrm>
-          <a:prstGeom prst="rect">
-            <a:avLst/>
-          </a:prstGeom>
-          <a:gradFill>
-            <a:gsLst>
-              <a:gs pos="2000">
-                <a:schemeClr val="accent1">
-                  <a:alpha val="29000"/>
-                </a:schemeClr>
-              </a:gs>
-              <a:gs pos="100000">
-                <a:srgbClr val="000000">
-                  <a:alpha val="30000"/>
-                </a:srgbClr>
-              </a:gs>
-            </a:gsLst>
-            <a:lin ang="7800000" scaled="0"/>
-          </a:gradFill>
-          <a:ln>
-            <a:noFill/>
-          </a:ln>
-        </p:spPr>
-        <p:style>
-          <a:lnRef idx="2">
-            <a:schemeClr val="accent1">
-              <a:shade val="50000"/>
-            </a:schemeClr>
-          </a:lnRef>
-          <a:fillRef idx="1">
-            <a:schemeClr val="accent1"/>
-          </a:fillRef>
-          <a:effectRef idx="0">
-            <a:schemeClr val="accent1"/>
-          </a:effectRef>
-          <a:fontRef idx="minor">
-            <a:schemeClr val="lt1"/>
-          </a:fontRef>
-        </p:style>
-        <p:txBody>
-          <a:bodyPr rtlCol="0" anchor="ctr"/>
-          <a:lstStyle/>
-          <a:p>
-            <a:pPr algn="ctr"/>
-            <a:endParaRPr lang="en-US"/>
-          </a:p>
-        </p:txBody>
-      </p:sp>
-      <p:sp>
-        <p:nvSpPr>
-          <p:cNvPr id="43" name="Freeform: Shape 42">
-            <a:extLst>
-              <a:ext uri="{FF2B5EF4-FFF2-40B4-BE49-F238E27FC236}">
-                <a16:creationId xmlns:a16="http://schemas.microsoft.com/office/drawing/2014/main" id="{38FAA1A1-D861-433F-88FA-1E9D6FD31D11}"/>
-              </a:ext>
-              <a:ext uri="{C183D7F6-B498-43B3-948B-1728B52AA6E4}">
-                <adec:decorative xmlns:adec="http://schemas.microsoft.com/office/drawing/2017/decorative" val="1"/>
-              </a:ext>
-            </a:extLst>
-          </p:cNvPr>
-          <p:cNvSpPr>
-            <a:spLocks noGrp="1" noRot="1" noChangeAspect="1" noMove="1" noResize="1" noEditPoints="1" noAdjustHandles="1" noChangeArrowheads="1" noChangeShapeType="1" noTextEdit="1"/>
-          </p:cNvSpPr>
-          <p:nvPr>
-            <p:extLst>
-              <p:ext uri="{386F3935-93C4-4BCD-93E2-E3B085C9AB24}">
-                <p16:designElem xmlns:p16="http://schemas.microsoft.com/office/powerpoint/2015/main" val="1"/>
-              </p:ext>
-            </p:extLst>
-          </p:nvPr>
-        </p:nvSpPr>
-        <p:spPr>
-          <a:xfrm rot="20635413">
-            <a:off x="-501737" y="969718"/>
-            <a:ext cx="3900357" cy="4178958"/>
-          </a:xfrm>
-          <a:custGeom>
-            <a:avLst/>
-            <a:gdLst>
-              <a:gd name="connsiteX0" fmla="*/ 2432225 w 3900357"/>
-              <a:gd name="connsiteY0" fmla="*/ 93939 h 4178958"/>
-              <a:gd name="connsiteX1" fmla="*/ 3900357 w 3900357"/>
-              <a:gd name="connsiteY1" fmla="*/ 2089479 h 4178958"/>
-              <a:gd name="connsiteX2" fmla="*/ 1810878 w 3900357"/>
-              <a:gd name="connsiteY2" fmla="*/ 4178958 h 4178958"/>
-              <a:gd name="connsiteX3" fmla="*/ 78249 w 3900357"/>
-              <a:gd name="connsiteY3" fmla="*/ 3257727 h 4178958"/>
-              <a:gd name="connsiteX4" fmla="*/ 0 w 3900357"/>
-              <a:gd name="connsiteY4" fmla="*/ 3128923 h 4178958"/>
-              <a:gd name="connsiteX5" fmla="*/ 831324 w 3900357"/>
-              <a:gd name="connsiteY5" fmla="*/ 244281 h 4178958"/>
-              <a:gd name="connsiteX6" fmla="*/ 997559 w 3900357"/>
-              <a:gd name="connsiteY6" fmla="*/ 164202 h 4178958"/>
-              <a:gd name="connsiteX7" fmla="*/ 1810878 w 3900357"/>
-              <a:gd name="connsiteY7" fmla="*/ 0 h 4178958"/>
-              <a:gd name="connsiteX8" fmla="*/ 2432225 w 3900357"/>
-              <a:gd name="connsiteY8" fmla="*/ 93939 h 4178958"/>
-            </a:gdLst>
-            <a:ahLst/>
-            <a:cxnLst>
-              <a:cxn ang="0">
-                <a:pos x="connsiteX0" y="connsiteY0"/>
-              </a:cxn>
-              <a:cxn ang="0">
-                <a:pos x="connsiteX1" y="connsiteY1"/>
-              </a:cxn>
-              <a:cxn ang="0">
-                <a:pos x="connsiteX2" y="connsiteY2"/>
-              </a:cxn>
-              <a:cxn ang="0">
-                <a:pos x="connsiteX3" y="connsiteY3"/>
-              </a:cxn>
-              <a:cxn ang="0">
-                <a:pos x="connsiteX4" y="connsiteY4"/>
-              </a:cxn>
-              <a:cxn ang="0">
-                <a:pos x="connsiteX5" y="connsiteY5"/>
-              </a:cxn>
-              <a:cxn ang="0">
-                <a:pos x="connsiteX6" y="connsiteY6"/>
-              </a:cxn>
-              <a:cxn ang="0">
-                <a:pos x="connsiteX7" y="connsiteY7"/>
-              </a:cxn>
-              <a:cxn ang="0">
-                <a:pos x="connsiteX8" y="connsiteY8"/>
-              </a:cxn>
-            </a:cxnLst>
-            <a:rect l="l" t="t" r="r" b="b"/>
-            <a:pathLst>
-              <a:path w="3900357" h="4178958">
-                <a:moveTo>
-                  <a:pt x="2432225" y="93939"/>
-                </a:moveTo>
-                <a:cubicBezTo>
-                  <a:pt x="3282786" y="358491"/>
-                  <a:pt x="3900357" y="1151865"/>
-                  <a:pt x="3900357" y="2089479"/>
-                </a:cubicBezTo>
-                <a:cubicBezTo>
-                  <a:pt x="3900357" y="3243466"/>
-                  <a:pt x="2964865" y="4178958"/>
-                  <a:pt x="1810878" y="4178958"/>
-                </a:cubicBezTo>
-                <a:cubicBezTo>
-                  <a:pt x="1089636" y="4178958"/>
-                  <a:pt x="453744" y="3813531"/>
-                  <a:pt x="78249" y="3257727"/>
-                </a:cubicBezTo>
-                <a:lnTo>
-                  <a:pt x="0" y="3128923"/>
-                </a:lnTo>
-                <a:lnTo>
-                  <a:pt x="831324" y="244281"/>
-                </a:lnTo>
-                <a:lnTo>
-                  <a:pt x="997559" y="164202"/>
-                </a:lnTo>
-                <a:cubicBezTo>
-                  <a:pt x="1247540" y="58468"/>
-                  <a:pt x="1522381" y="0"/>
-                  <a:pt x="1810878" y="0"/>
-                </a:cubicBezTo>
-                <a:cubicBezTo>
-                  <a:pt x="2027251" y="0"/>
-                  <a:pt x="2235942" y="32888"/>
-                  <a:pt x="2432225" y="93939"/>
-                </a:cubicBezTo>
-                <a:close/>
-              </a:path>
-            </a:pathLst>
-          </a:custGeom>
-          <a:gradFill>
-            <a:gsLst>
-              <a:gs pos="29000">
-                <a:srgbClr val="000000">
-                  <a:alpha val="0"/>
-                </a:srgbClr>
-              </a:gs>
-              <a:gs pos="100000">
-                <a:schemeClr val="accent1">
-                  <a:alpha val="43000"/>
-                </a:schemeClr>
-              </a:gs>
-            </a:gsLst>
-            <a:lin ang="1800000" scaled="0"/>
-          </a:gradFill>
-          <a:ln>
-            <a:noFill/>
-          </a:ln>
-        </p:spPr>
-        <p:style>
-          <a:lnRef idx="2">
-            <a:schemeClr val="accent1">
-              <a:shade val="50000"/>
-            </a:schemeClr>
-          </a:lnRef>
-          <a:fillRef idx="1">
-            <a:schemeClr val="accent1"/>
-          </a:fillRef>
-          <a:effectRef idx="0">
-            <a:schemeClr val="accent1"/>
-          </a:effectRef>
-          <a:fontRef idx="minor">
-            <a:schemeClr val="lt1"/>
-          </a:fontRef>
-        </p:style>
-        <p:txBody>
-          <a:bodyPr wrap="square" rtlCol="0" anchor="ctr">
-            <a:noAutofit/>
-          </a:bodyPr>
-          <a:lstStyle/>
-          <a:p>
-            <a:pPr algn="ctr"/>
-            <a:endParaRPr lang="en-US"/>
-          </a:p>
-        </p:txBody>
-      </p:sp>
-      <p:sp>
-        <p:nvSpPr>
-          <p:cNvPr id="45" name="Rectangle 44">
-            <a:extLst>
-              <a:ext uri="{FF2B5EF4-FFF2-40B4-BE49-F238E27FC236}">
-                <a16:creationId xmlns:a16="http://schemas.microsoft.com/office/drawing/2014/main" id="{8D71EDA1-87BF-4D5D-AB79-F346FD19278A}"/>
-              </a:ext>
-              <a:ext uri="{C183D7F6-B498-43B3-948B-1728B52AA6E4}">
-                <adec:decorative xmlns:adec="http://schemas.microsoft.com/office/drawing/2017/decorative" val="1"/>
-              </a:ext>
-            </a:extLst>
-          </p:cNvPr>
-          <p:cNvSpPr>
-            <a:spLocks noGrp="1" noRot="1" noChangeAspect="1" noMove="1" noResize="1" noEditPoints="1" noAdjustHandles="1" noChangeArrowheads="1" noChangeShapeType="1" noTextEdit="1"/>
-          </p:cNvSpPr>
-          <p:nvPr>
-            <p:extLst>
-              <p:ext uri="{386F3935-93C4-4BCD-93E2-E3B085C9AB24}">
-                <p16:designElem xmlns:p16="http://schemas.microsoft.com/office/powerpoint/2015/main" val="1"/>
-              </p:ext>
-            </p:extLst>
-          </p:nvPr>
-        </p:nvSpPr>
-        <p:spPr>
-          <a:xfrm rot="5400000" flipH="1">
-            <a:off x="-1410093" y="1399943"/>
-            <a:ext cx="6858003" cy="4037835"/>
-          </a:xfrm>
-          <a:prstGeom prst="rect">
-            <a:avLst/>
-          </a:prstGeom>
-          <a:gradFill>
-            <a:gsLst>
-              <a:gs pos="0">
-                <a:srgbClr val="000000">
-                  <a:alpha val="0"/>
-                </a:srgbClr>
-              </a:gs>
-              <a:gs pos="99000">
-                <a:schemeClr val="accent1">
-                  <a:lumMod val="60000"/>
-                  <a:lumOff val="40000"/>
-                  <a:alpha val="11000"/>
-                </a:schemeClr>
-              </a:gs>
-            </a:gsLst>
-            <a:lin ang="7200000" scaled="0"/>
-          </a:gradFill>
-          <a:ln>
-            <a:noFill/>
-          </a:ln>
-        </p:spPr>
-        <p:style>
-          <a:lnRef idx="2">
-            <a:schemeClr val="accent1">
-              <a:shade val="50000"/>
-            </a:schemeClr>
-          </a:lnRef>
-          <a:fillRef idx="1">
-            <a:schemeClr val="accent1"/>
-          </a:fillRef>
-          <a:effectRef idx="0">
-            <a:schemeClr val="accent1"/>
-          </a:effectRef>
-          <a:fontRef idx="minor">
-            <a:schemeClr val="lt1"/>
-          </a:fontRef>
-        </p:style>
-        <p:txBody>
-          <a:bodyPr rtlCol="0" anchor="ctr"/>
-          <a:lstStyle/>
-          <a:p>
-            <a:pPr algn="ctr"/>
-            <a:endParaRPr lang="en-US"/>
-          </a:p>
-        </p:txBody>
-      </p:sp>
-      <p:sp>
-        <p:nvSpPr>
-          <p:cNvPr id="2" name="CuadroTexto 1">
-            <a:extLst>
-              <a:ext uri="{FF2B5EF4-FFF2-40B4-BE49-F238E27FC236}">
-                <a16:creationId xmlns:a16="http://schemas.microsoft.com/office/drawing/2014/main" id="{534A4208-7DDE-681C-B3CE-D7CE52BA4A83}"/>
+          <p:cNvPr id="6" name="CuadroTexto 5">
+            <a:extLst>
+              <a:ext uri="{FF2B5EF4-FFF2-40B4-BE49-F238E27FC236}">
+                <a16:creationId xmlns:a16="http://schemas.microsoft.com/office/drawing/2014/main" id="{1C720165-3448-A688-053D-48079D60EE56}"/>
               </a:ext>
             </a:extLst>
           </p:cNvPr>
@@ -10301,820 +10398,78 @@
         </p:nvSpPr>
         <p:spPr>
           <a:xfrm>
-            <a:off x="466722" y="586855"/>
-            <a:ext cx="3201366" cy="3387497"/>
+            <a:off x="900024" y="1532626"/>
+            <a:ext cx="6438180" cy="3293209"/>
           </a:xfrm>
           <a:prstGeom prst="rect">
             <a:avLst/>
           </a:prstGeom>
+          <a:noFill/>
         </p:spPr>
         <p:txBody>
-          <a:bodyPr vert="horz" lIns="91440" tIns="45720" rIns="91440" bIns="45720" rtlCol="0" anchor="b">
-            <a:normAutofit/>
+          <a:bodyPr rot="0" spcFirstLastPara="0" vertOverflow="overflow" horzOverflow="overflow" vert="horz" wrap="square" lIns="91440" tIns="45720" rIns="91440" bIns="45720" numCol="1" spcCol="0" rtlCol="0" fromWordArt="0" anchor="t" anchorCtr="0" forceAA="0" compatLnSpc="1">
+            <a:prstTxWarp prst="textNoShape">
+              <a:avLst/>
+            </a:prstTxWarp>
+            <a:spAutoFit/>
           </a:bodyPr>
           <a:lstStyle/>
           <a:p>
-            <a:pPr algn="r">
-              <a:lnSpc>
-                <a:spcPct val="90000"/>
-              </a:lnSpc>
-              <a:spcBef>
-                <a:spcPct val="0"/>
-              </a:spcBef>
-              <a:spcAft>
-                <a:spcPts val="600"/>
-              </a:spcAft>
-              <a:defRPr/>
+            <a:pPr marL="285750" indent="-285750" algn="just">
+              <a:buFont typeface="Calibri"/>
+              <a:buChar char="-"/>
             </a:pPr>
             <a:r>
-              <a:rPr lang="en-US" sz="4000" b="1" kern="1200">
-                <a:solidFill>
-                  <a:srgbClr val="FFFFFF"/>
-                </a:solidFill>
-                <a:latin typeface="+mj-lt"/>
-                <a:ea typeface="+mj-ea"/>
-                <a:cs typeface="+mj-cs"/>
+              <a:rPr lang="es-CO" sz="1600" dirty="0">
+                <a:latin typeface="Work Sans Light Roman"/>
+                <a:cs typeface="Segoe UI"/>
               </a:rPr>
-              <a:t>Justificación</a:t>
-            </a:r>
-            <a:endParaRPr lang="en-US" sz="4000" kern="1200">
-              <a:solidFill>
-                <a:srgbClr val="FFFFFF"/>
-              </a:solidFill>
-              <a:latin typeface="+mj-lt"/>
-              <a:ea typeface="+mj-ea"/>
-              <a:cs typeface="+mj-cs"/>
+              <a:t>A raíz de la problemática en la clínica veterinaria con relación a los procesos sobre los agendamientos de citas, consultas y grooming, el inventario, la compra y venta de productos para mascotas con este sistema se pretende garantizar que la empresa tenga un beneficio en cuanto a su organización y administración de procesos  </a:t>
+            </a:r>
+          </a:p>
+          <a:p>
+            <a:pPr marL="285750" indent="-285750" algn="just">
+              <a:buFont typeface="Calibri"/>
+              <a:buChar char="-"/>
+            </a:pPr>
+            <a:endParaRPr lang="es-CO" sz="1600" dirty="0">
+              <a:latin typeface="Work Sans Light Roman"/>
+              <a:cs typeface="Segoe UI"/>
             </a:endParaRPr>
+          </a:p>
+          <a:p>
+            <a:pPr marL="285750" indent="-285750" algn="just">
+              <a:buFont typeface="Calibri"/>
+              <a:buChar char="-"/>
+            </a:pPr>
+            <a:r>
+              <a:rPr lang="es-CO" sz="1600" dirty="0">
+                <a:latin typeface="Work Sans Light Roman"/>
+                <a:cs typeface="Segoe UI"/>
+              </a:rPr>
+              <a:t>Para  lograr que los procesos y los objetivos esperados se realicen, se pretenden reducir los problemas presentados como mejorar la calidad de los servicios a presentar por parte de la veterinaria, es necesario construir un sistema de información que permita apoyar los procesos de una manera más </a:t>
+            </a:r>
+            <a:r>
+              <a:rPr lang="es-CO" sz="1600" dirty="0" err="1">
+                <a:latin typeface="Work Sans Light Roman"/>
+                <a:cs typeface="Segoe UI"/>
+              </a:rPr>
+              <a:t>agil</a:t>
+            </a:r>
+            <a:r>
+              <a:rPr lang="es-CO" sz="1600" dirty="0">
+                <a:latin typeface="Work Sans Light Roman"/>
+                <a:cs typeface="Segoe UI"/>
+              </a:rPr>
+              <a:t> y eficaz, donde la empresa, los clientes y los trabajadores de esta, tengan un mejor manejo sobre los procesos y poder minimizar las problemáticas que se presentan en la clínica.</a:t>
+            </a:r>
           </a:p>
         </p:txBody>
       </p:sp>
-      <p:sp>
-        <p:nvSpPr>
-          <p:cNvPr id="5" name="CuadroTexto 4">
-            <a:extLst>
-              <a:ext uri="{FF2B5EF4-FFF2-40B4-BE49-F238E27FC236}">
-                <a16:creationId xmlns:a16="http://schemas.microsoft.com/office/drawing/2014/main" id="{C2DCDEA0-6381-334B-F17B-D90118E0CD22}"/>
-              </a:ext>
-            </a:extLst>
-          </p:cNvPr>
-          <p:cNvSpPr txBox="1"/>
-          <p:nvPr/>
-        </p:nvSpPr>
-        <p:spPr>
-          <a:xfrm>
-            <a:off x="4810259" y="649480"/>
-            <a:ext cx="6555347" cy="5546047"/>
-          </a:xfrm>
-          <a:prstGeom prst="rect">
-            <a:avLst/>
-          </a:prstGeom>
-        </p:spPr>
-        <p:txBody>
-          <a:bodyPr vert="horz" lIns="91440" tIns="45720" rIns="91440" bIns="45720" rtlCol="0" anchor="ctr">
-            <a:normAutofit/>
-          </a:bodyPr>
-          <a:lstStyle/>
-          <a:p>
-            <a:pPr indent="-228600">
-              <a:lnSpc>
-                <a:spcPct val="90000"/>
-              </a:lnSpc>
-              <a:spcAft>
-                <a:spcPts val="600"/>
-              </a:spcAft>
-              <a:buFont typeface="Arial" panose="020B0604020202020204" pitchFamily="34" charset="0"/>
-              <a:buChar char="•"/>
-            </a:pPr>
-            <a:r>
-              <a:rPr lang="en-US" sz="2000" dirty="0"/>
-              <a:t>A </a:t>
-            </a:r>
-            <a:r>
-              <a:rPr lang="en-US" sz="2000" dirty="0" err="1"/>
-              <a:t>raíz</a:t>
-            </a:r>
-            <a:r>
-              <a:rPr lang="en-US" sz="2000" dirty="0"/>
-              <a:t> de la </a:t>
-            </a:r>
-            <a:r>
-              <a:rPr lang="en-US" sz="2000" dirty="0" err="1"/>
-              <a:t>problemática</a:t>
-            </a:r>
-            <a:r>
-              <a:rPr lang="en-US" sz="2000" dirty="0"/>
-              <a:t>  </a:t>
-            </a:r>
-            <a:r>
-              <a:rPr lang="en-US" sz="2000" dirty="0" err="1"/>
-              <a:t>en</a:t>
-            </a:r>
-            <a:r>
-              <a:rPr lang="en-US" sz="2000" dirty="0"/>
-              <a:t> la </a:t>
-            </a:r>
-            <a:r>
-              <a:rPr lang="en-US" sz="2000" dirty="0" err="1"/>
-              <a:t>clínica</a:t>
-            </a:r>
-            <a:r>
-              <a:rPr lang="en-US" sz="2000" dirty="0"/>
-              <a:t> </a:t>
-            </a:r>
-            <a:r>
-              <a:rPr lang="en-US" sz="2000" dirty="0" err="1"/>
-              <a:t>veterinaria</a:t>
-            </a:r>
-            <a:r>
-              <a:rPr lang="en-US" sz="2000" dirty="0"/>
-              <a:t>  con </a:t>
-            </a:r>
-            <a:r>
-              <a:rPr lang="en-US" sz="2000" dirty="0" err="1"/>
-              <a:t>relación</a:t>
-            </a:r>
-            <a:r>
-              <a:rPr lang="en-US" sz="2000" dirty="0"/>
-              <a:t> a </a:t>
-            </a:r>
-            <a:r>
-              <a:rPr lang="en-US" sz="2000" dirty="0" err="1"/>
-              <a:t>los</a:t>
-            </a:r>
-            <a:r>
-              <a:rPr lang="en-US" sz="2000" dirty="0"/>
-              <a:t> </a:t>
-            </a:r>
-            <a:r>
-              <a:rPr lang="en-US" sz="2000" dirty="0" err="1"/>
-              <a:t>procesos</a:t>
-            </a:r>
-            <a:r>
-              <a:rPr lang="en-US" sz="2000" dirty="0"/>
-              <a:t> </a:t>
-            </a:r>
-            <a:r>
-              <a:rPr lang="en-US" sz="2000" dirty="0" err="1"/>
-              <a:t>sobre</a:t>
-            </a:r>
-            <a:r>
-              <a:rPr lang="en-US" sz="2000" dirty="0"/>
-              <a:t> </a:t>
-            </a:r>
-            <a:r>
-              <a:rPr lang="en-US" sz="2000" dirty="0" err="1"/>
-              <a:t>agendamiento</a:t>
-            </a:r>
-            <a:r>
-              <a:rPr lang="en-US" sz="2000" dirty="0"/>
-              <a:t> de </a:t>
-            </a:r>
-            <a:r>
-              <a:rPr lang="en-US" sz="2000" dirty="0" err="1"/>
-              <a:t>citas</a:t>
-            </a:r>
-            <a:r>
-              <a:rPr lang="en-US" sz="2000" dirty="0"/>
-              <a:t>, </a:t>
-            </a:r>
-            <a:r>
-              <a:rPr lang="en-US" sz="2000" dirty="0" err="1"/>
-              <a:t>consultas</a:t>
-            </a:r>
-            <a:r>
-              <a:rPr lang="en-US" sz="2000" dirty="0"/>
-              <a:t> y grooming, </a:t>
-            </a:r>
-            <a:r>
-              <a:rPr lang="en-US" sz="2000" dirty="0" err="1"/>
-              <a:t>el</a:t>
-            </a:r>
-            <a:r>
-              <a:rPr lang="en-US" sz="2000" dirty="0"/>
-              <a:t> </a:t>
-            </a:r>
-            <a:r>
-              <a:rPr lang="en-US" sz="2000" dirty="0" err="1"/>
-              <a:t>inventario</a:t>
-            </a:r>
-            <a:r>
-              <a:rPr lang="en-US" sz="2000" dirty="0"/>
-              <a:t>, la </a:t>
-            </a:r>
-            <a:r>
-              <a:rPr lang="en-US" sz="2000" dirty="0" err="1"/>
-              <a:t>compra</a:t>
-            </a:r>
-            <a:r>
-              <a:rPr lang="en-US" sz="2000" dirty="0"/>
-              <a:t> y </a:t>
-            </a:r>
-            <a:r>
-              <a:rPr lang="en-US" sz="2000" dirty="0" err="1"/>
-              <a:t>venta</a:t>
-            </a:r>
-            <a:r>
-              <a:rPr lang="en-US" sz="2000" dirty="0"/>
-              <a:t> de </a:t>
-            </a:r>
-            <a:r>
-              <a:rPr lang="en-US" sz="2000" dirty="0" err="1"/>
-              <a:t>productos</a:t>
-            </a:r>
-            <a:r>
-              <a:rPr lang="en-US" sz="2000" dirty="0"/>
-              <a:t> para </a:t>
-            </a:r>
-            <a:r>
-              <a:rPr lang="en-US" sz="2000" dirty="0" err="1"/>
-              <a:t>mascotas</a:t>
-            </a:r>
-            <a:r>
-              <a:rPr lang="en-US" sz="2000" dirty="0"/>
-              <a:t>, Con </a:t>
-            </a:r>
-            <a:r>
-              <a:rPr lang="en-US" sz="2000" dirty="0" err="1"/>
-              <a:t>este</a:t>
-            </a:r>
-            <a:r>
-              <a:rPr lang="en-US" sz="2000" dirty="0"/>
-              <a:t> </a:t>
-            </a:r>
-            <a:r>
-              <a:rPr lang="en-US" sz="2000" dirty="0" err="1"/>
-              <a:t>sistema</a:t>
-            </a:r>
-            <a:r>
-              <a:rPr lang="en-US" sz="2000" dirty="0"/>
-              <a:t> se </a:t>
-            </a:r>
-            <a:r>
-              <a:rPr lang="en-US" sz="2000" dirty="0" err="1"/>
-              <a:t>pretende</a:t>
-            </a:r>
-            <a:r>
-              <a:rPr lang="en-US" sz="2000" dirty="0"/>
-              <a:t> </a:t>
-            </a:r>
-            <a:r>
-              <a:rPr lang="en-US" sz="2000" dirty="0" err="1"/>
-              <a:t>garantizar</a:t>
-            </a:r>
-            <a:r>
-              <a:rPr lang="en-US" sz="2000" dirty="0"/>
-              <a:t> que la </a:t>
-            </a:r>
-            <a:r>
-              <a:rPr lang="en-US" sz="2000" dirty="0" err="1"/>
-              <a:t>empresa</a:t>
-            </a:r>
-            <a:r>
-              <a:rPr lang="en-US" sz="2000" dirty="0"/>
-              <a:t> </a:t>
-            </a:r>
-            <a:r>
-              <a:rPr lang="en-US" sz="2000" dirty="0" err="1"/>
-              <a:t>tenga</a:t>
-            </a:r>
-            <a:r>
-              <a:rPr lang="en-US" sz="2000" dirty="0"/>
-              <a:t> un </a:t>
-            </a:r>
-            <a:r>
-              <a:rPr lang="en-US" sz="2000" dirty="0" err="1"/>
-              <a:t>beneficio</a:t>
-            </a:r>
-            <a:r>
-              <a:rPr lang="en-US" sz="2000" dirty="0"/>
-              <a:t> </a:t>
-            </a:r>
-            <a:r>
-              <a:rPr lang="en-US" sz="2000" dirty="0" err="1"/>
-              <a:t>en</a:t>
-            </a:r>
-            <a:r>
-              <a:rPr lang="en-US" sz="2000" dirty="0"/>
-              <a:t> </a:t>
-            </a:r>
-            <a:r>
-              <a:rPr lang="en-US" sz="2000" dirty="0" err="1"/>
-              <a:t>cuanto</a:t>
-            </a:r>
-            <a:r>
-              <a:rPr lang="en-US" sz="2000" dirty="0"/>
-              <a:t> a </a:t>
-            </a:r>
-            <a:r>
-              <a:rPr lang="en-US" sz="2000" dirty="0" err="1"/>
-              <a:t>su</a:t>
-            </a:r>
-            <a:r>
-              <a:rPr lang="en-US" sz="2000" dirty="0"/>
-              <a:t> </a:t>
-            </a:r>
-            <a:r>
-              <a:rPr lang="en-US" sz="2000" dirty="0" err="1"/>
-              <a:t>organización</a:t>
-            </a:r>
-            <a:r>
-              <a:rPr lang="en-US" sz="2000" dirty="0"/>
-              <a:t> y </a:t>
-            </a:r>
-            <a:r>
-              <a:rPr lang="en-US" sz="2000" dirty="0" err="1"/>
-              <a:t>administracion</a:t>
-            </a:r>
-            <a:r>
-              <a:rPr lang="en-US" sz="2000" dirty="0"/>
-              <a:t> de </a:t>
-            </a:r>
-            <a:r>
-              <a:rPr lang="en-US" sz="2000" dirty="0" err="1"/>
-              <a:t>procesos</a:t>
-            </a:r>
-            <a:r>
-              <a:rPr lang="en-US" sz="2000" dirty="0"/>
-              <a:t>.</a:t>
-            </a:r>
-            <a:endParaRPr lang="en-US" sz="2000" dirty="0">
-              <a:cs typeface="Calibri"/>
-            </a:endParaRPr>
-          </a:p>
-          <a:p>
-            <a:pPr indent="-228600">
-              <a:lnSpc>
-                <a:spcPct val="90000"/>
-              </a:lnSpc>
-              <a:spcAft>
-                <a:spcPts val="600"/>
-              </a:spcAft>
-              <a:buFont typeface="Arial" panose="020B0604020202020204" pitchFamily="34" charset="0"/>
-              <a:buChar char="•"/>
-            </a:pPr>
-            <a:endParaRPr lang="en-US" sz="2000"/>
-          </a:p>
-          <a:p>
-            <a:pPr indent="-228600">
-              <a:lnSpc>
-                <a:spcPct val="90000"/>
-              </a:lnSpc>
-              <a:spcAft>
-                <a:spcPts val="600"/>
-              </a:spcAft>
-              <a:buFont typeface="Arial" panose="020B0604020202020204" pitchFamily="34" charset="0"/>
-              <a:buChar char="•"/>
-            </a:pPr>
-            <a:r>
-              <a:rPr lang="en-US" sz="2000" dirty="0"/>
-              <a:t>Para </a:t>
-            </a:r>
-            <a:r>
-              <a:rPr lang="en-US" sz="2000" dirty="0" err="1"/>
-              <a:t>lograr</a:t>
-            </a:r>
-            <a:r>
-              <a:rPr lang="en-US" sz="2000" dirty="0"/>
-              <a:t> que </a:t>
-            </a:r>
-            <a:r>
-              <a:rPr lang="en-US" sz="2000" dirty="0" err="1"/>
-              <a:t>los</a:t>
-            </a:r>
-            <a:r>
-              <a:rPr lang="en-US" sz="2000" dirty="0"/>
-              <a:t> </a:t>
-            </a:r>
-            <a:r>
-              <a:rPr lang="en-US" sz="2000" dirty="0" err="1"/>
-              <a:t>procesos</a:t>
-            </a:r>
-            <a:r>
-              <a:rPr lang="en-US" sz="2000" dirty="0"/>
-              <a:t> y </a:t>
-            </a:r>
-            <a:r>
-              <a:rPr lang="en-US" sz="2000" dirty="0" err="1"/>
-              <a:t>los</a:t>
-            </a:r>
-            <a:r>
-              <a:rPr lang="en-US" sz="2000" dirty="0"/>
-              <a:t> </a:t>
-            </a:r>
-            <a:r>
-              <a:rPr lang="en-US" sz="2000" dirty="0" err="1"/>
-              <a:t>objetivos</a:t>
-            </a:r>
-            <a:r>
-              <a:rPr lang="en-US" sz="2000" dirty="0"/>
-              <a:t> </a:t>
-            </a:r>
-            <a:r>
-              <a:rPr lang="en-US" sz="2000" dirty="0" err="1"/>
-              <a:t>esperados</a:t>
-            </a:r>
-            <a:r>
-              <a:rPr lang="en-US" sz="2000" dirty="0"/>
-              <a:t> se </a:t>
-            </a:r>
-            <a:r>
-              <a:rPr lang="en-US" sz="2000" dirty="0" err="1"/>
-              <a:t>realizen</a:t>
-            </a:r>
-            <a:r>
-              <a:rPr lang="en-US" sz="2000" dirty="0"/>
-              <a:t> , se </a:t>
-            </a:r>
-            <a:r>
-              <a:rPr lang="en-US" sz="2000" dirty="0" err="1"/>
-              <a:t>puedan</a:t>
-            </a:r>
-            <a:r>
-              <a:rPr lang="en-US" sz="2000" dirty="0"/>
-              <a:t> </a:t>
-            </a:r>
-            <a:r>
-              <a:rPr lang="en-US" sz="2000" dirty="0" err="1"/>
-              <a:t>reducir</a:t>
-            </a:r>
-            <a:r>
-              <a:rPr lang="en-US" sz="2000" dirty="0"/>
-              <a:t> </a:t>
-            </a:r>
-            <a:r>
-              <a:rPr lang="en-US" sz="2000" dirty="0" err="1"/>
-              <a:t>los</a:t>
-            </a:r>
-            <a:r>
-              <a:rPr lang="en-US" sz="2000" dirty="0"/>
-              <a:t> </a:t>
-            </a:r>
-            <a:r>
-              <a:rPr lang="en-US" sz="2000" dirty="0" err="1"/>
-              <a:t>problemas</a:t>
-            </a:r>
-            <a:r>
-              <a:rPr lang="en-US" sz="2000" dirty="0"/>
-              <a:t> </a:t>
-            </a:r>
-            <a:r>
-              <a:rPr lang="en-US" sz="2000" dirty="0" err="1"/>
-              <a:t>presentados</a:t>
-            </a:r>
-            <a:r>
-              <a:rPr lang="en-US" sz="2000" dirty="0"/>
-              <a:t>, </a:t>
-            </a:r>
-            <a:r>
-              <a:rPr lang="en-US" sz="2000" dirty="0" err="1"/>
-              <a:t>como</a:t>
-            </a:r>
-            <a:r>
-              <a:rPr lang="en-US" sz="2000" dirty="0"/>
-              <a:t> la </a:t>
-            </a:r>
-            <a:r>
-              <a:rPr lang="en-US" sz="2000" dirty="0" err="1"/>
-              <a:t>calidad</a:t>
-            </a:r>
-            <a:r>
-              <a:rPr lang="en-US" sz="2000" dirty="0"/>
-              <a:t> de </a:t>
-            </a:r>
-            <a:r>
-              <a:rPr lang="en-US" sz="2000" dirty="0" err="1"/>
-              <a:t>los</a:t>
-            </a:r>
-            <a:r>
-              <a:rPr lang="en-US" sz="2000" dirty="0"/>
-              <a:t> </a:t>
-            </a:r>
-            <a:r>
-              <a:rPr lang="en-US" sz="2000" dirty="0" err="1"/>
-              <a:t>servicios</a:t>
-            </a:r>
-            <a:r>
-              <a:rPr lang="en-US" sz="2000" dirty="0"/>
-              <a:t> a </a:t>
-            </a:r>
-            <a:r>
-              <a:rPr lang="en-US" sz="2000" dirty="0" err="1"/>
-              <a:t>prestar</a:t>
-            </a:r>
-            <a:r>
-              <a:rPr lang="en-US" sz="2000" dirty="0"/>
-              <a:t> </a:t>
-            </a:r>
-            <a:r>
-              <a:rPr lang="en-US" sz="2000" dirty="0" err="1"/>
-              <a:t>por</a:t>
-            </a:r>
-            <a:r>
-              <a:rPr lang="en-US" sz="2000" dirty="0"/>
-              <a:t> </a:t>
-            </a:r>
-            <a:r>
-              <a:rPr lang="en-US" sz="2000" dirty="0" err="1"/>
-              <a:t>parte</a:t>
-            </a:r>
-            <a:r>
-              <a:rPr lang="en-US" sz="2000" dirty="0"/>
-              <a:t> de la </a:t>
-            </a:r>
-            <a:r>
-              <a:rPr lang="en-US" sz="2000" dirty="0" err="1"/>
-              <a:t>veterinaria</a:t>
-            </a:r>
-            <a:r>
-              <a:rPr lang="en-US" sz="2000" dirty="0"/>
-              <a:t> </a:t>
-            </a:r>
-            <a:r>
-              <a:rPr lang="en-US" sz="2000" dirty="0" err="1"/>
-              <a:t>mejoren</a:t>
-            </a:r>
-            <a:r>
-              <a:rPr lang="en-US" sz="2000" dirty="0"/>
-              <a:t>, es </a:t>
-            </a:r>
-            <a:r>
-              <a:rPr lang="en-US" sz="2000" dirty="0" err="1"/>
-              <a:t>necesario</a:t>
-            </a:r>
-            <a:r>
-              <a:rPr lang="en-US" sz="2000" dirty="0"/>
-              <a:t> </a:t>
-            </a:r>
-            <a:r>
-              <a:rPr lang="en-US" sz="2000" dirty="0" err="1"/>
-              <a:t>construir</a:t>
-            </a:r>
-            <a:r>
-              <a:rPr lang="en-US" sz="2000" dirty="0"/>
-              <a:t>  un </a:t>
-            </a:r>
-            <a:r>
-              <a:rPr lang="en-US" sz="2000" dirty="0" err="1"/>
-              <a:t>sistema</a:t>
-            </a:r>
-            <a:r>
-              <a:rPr lang="en-US" sz="2000" dirty="0"/>
-              <a:t> de </a:t>
-            </a:r>
-            <a:r>
-              <a:rPr lang="en-US" sz="2000" dirty="0" err="1"/>
-              <a:t>información</a:t>
-            </a:r>
-            <a:r>
-              <a:rPr lang="en-US" sz="2000" dirty="0"/>
-              <a:t>  que </a:t>
-            </a:r>
-            <a:r>
-              <a:rPr lang="en-US" sz="2000" dirty="0" err="1"/>
-              <a:t>permita</a:t>
-            </a:r>
-            <a:r>
-              <a:rPr lang="en-US" sz="2000" dirty="0"/>
-              <a:t> </a:t>
-            </a:r>
-            <a:r>
-              <a:rPr lang="en-US" sz="2000" dirty="0" err="1"/>
-              <a:t>apoyar</a:t>
-            </a:r>
-            <a:r>
-              <a:rPr lang="en-US" sz="2000" dirty="0"/>
-              <a:t> </a:t>
-            </a:r>
-            <a:r>
-              <a:rPr lang="en-US" sz="2000" dirty="0" err="1"/>
-              <a:t>los</a:t>
-            </a:r>
-            <a:r>
-              <a:rPr lang="en-US" sz="2000" dirty="0"/>
-              <a:t> </a:t>
-            </a:r>
-            <a:r>
-              <a:rPr lang="en-US" sz="2000" dirty="0" err="1"/>
-              <a:t>procesos</a:t>
-            </a:r>
-            <a:r>
-              <a:rPr lang="en-US" sz="2000" dirty="0"/>
-              <a:t> de </a:t>
-            </a:r>
-            <a:r>
-              <a:rPr lang="en-US" sz="2000" dirty="0" err="1"/>
-              <a:t>una</a:t>
-            </a:r>
-            <a:r>
-              <a:rPr lang="en-US" sz="2000" dirty="0"/>
-              <a:t> </a:t>
-            </a:r>
-            <a:r>
-              <a:rPr lang="en-US" sz="2000" dirty="0" err="1"/>
-              <a:t>manera</a:t>
-            </a:r>
-            <a:r>
-              <a:rPr lang="en-US" sz="2000" dirty="0"/>
-              <a:t> </a:t>
-            </a:r>
-            <a:r>
-              <a:rPr lang="en-US" sz="2000" dirty="0" err="1"/>
-              <a:t>más</a:t>
-            </a:r>
-            <a:r>
-              <a:rPr lang="en-US" sz="2000" dirty="0"/>
-              <a:t> </a:t>
-            </a:r>
-            <a:r>
-              <a:rPr lang="en-US" sz="2000" dirty="0" err="1"/>
-              <a:t>ágil</a:t>
-            </a:r>
-            <a:r>
-              <a:rPr lang="en-US" sz="2000" dirty="0"/>
-              <a:t> y </a:t>
-            </a:r>
-            <a:r>
-              <a:rPr lang="en-US" sz="2000" dirty="0" err="1"/>
-              <a:t>eficaz</a:t>
-            </a:r>
-            <a:r>
-              <a:rPr lang="en-US" sz="2000" dirty="0"/>
-              <a:t>, </a:t>
-            </a:r>
-            <a:r>
-              <a:rPr lang="en-US" sz="2000" dirty="0" err="1"/>
-              <a:t>donde</a:t>
-            </a:r>
-            <a:r>
-              <a:rPr lang="en-US" sz="2000" dirty="0"/>
-              <a:t> la </a:t>
-            </a:r>
-            <a:r>
-              <a:rPr lang="en-US" sz="2000" dirty="0" err="1"/>
-              <a:t>empresa</a:t>
-            </a:r>
-            <a:r>
-              <a:rPr lang="en-US" sz="2000" dirty="0"/>
-              <a:t>, </a:t>
-            </a:r>
-            <a:r>
-              <a:rPr lang="en-US" sz="2000" dirty="0" err="1"/>
-              <a:t>los</a:t>
-            </a:r>
-            <a:r>
-              <a:rPr lang="en-US" sz="2000" dirty="0"/>
-              <a:t> </a:t>
-            </a:r>
-            <a:r>
-              <a:rPr lang="en-US" sz="2000" dirty="0" err="1"/>
-              <a:t>clientes</a:t>
-            </a:r>
-            <a:r>
-              <a:rPr lang="en-US" sz="2000" dirty="0"/>
-              <a:t> y </a:t>
-            </a:r>
-            <a:r>
-              <a:rPr lang="en-US" sz="2000" dirty="0" err="1"/>
-              <a:t>los</a:t>
-            </a:r>
-            <a:r>
-              <a:rPr lang="en-US" sz="2000" dirty="0"/>
-              <a:t> </a:t>
-            </a:r>
-            <a:r>
-              <a:rPr lang="en-US" sz="2000" dirty="0" err="1"/>
-              <a:t>trabajadores</a:t>
-            </a:r>
-            <a:r>
-              <a:rPr lang="en-US" sz="2000" dirty="0"/>
-              <a:t> de </a:t>
-            </a:r>
-            <a:r>
-              <a:rPr lang="en-US" sz="2000" dirty="0" err="1"/>
-              <a:t>esta</a:t>
-            </a:r>
-            <a:r>
-              <a:rPr lang="en-US" sz="2000" dirty="0"/>
-              <a:t> </a:t>
-            </a:r>
-            <a:r>
-              <a:rPr lang="en-US" sz="2000" dirty="0" err="1"/>
-              <a:t>tendrán</a:t>
-            </a:r>
-            <a:r>
-              <a:rPr lang="en-US" sz="2000" dirty="0"/>
-              <a:t> un </a:t>
-            </a:r>
-            <a:r>
-              <a:rPr lang="en-US" sz="2000" dirty="0" err="1"/>
-              <a:t>mejor</a:t>
-            </a:r>
-            <a:r>
-              <a:rPr lang="en-US" sz="2000" dirty="0"/>
-              <a:t> </a:t>
-            </a:r>
-            <a:r>
-              <a:rPr lang="en-US" sz="2000" dirty="0" err="1"/>
-              <a:t>manejo</a:t>
-            </a:r>
-            <a:r>
-              <a:rPr lang="en-US" sz="2000" dirty="0"/>
-              <a:t> </a:t>
-            </a:r>
-            <a:r>
-              <a:rPr lang="en-US" sz="2000" dirty="0" err="1"/>
-              <a:t>sobre</a:t>
-            </a:r>
-            <a:r>
-              <a:rPr lang="en-US" sz="2000" dirty="0"/>
-              <a:t> </a:t>
-            </a:r>
-            <a:r>
-              <a:rPr lang="en-US" sz="2000" dirty="0" err="1"/>
-              <a:t>los</a:t>
-            </a:r>
-            <a:r>
-              <a:rPr lang="en-US" sz="2000" dirty="0"/>
-              <a:t> </a:t>
-            </a:r>
-            <a:r>
-              <a:rPr lang="en-US" sz="2000" dirty="0" err="1"/>
-              <a:t>procesos</a:t>
-            </a:r>
-            <a:r>
-              <a:rPr lang="en-US" sz="2000" dirty="0"/>
-              <a:t>.</a:t>
-            </a:r>
-            <a:endParaRPr lang="en-US" sz="2000" dirty="0">
-              <a:ea typeface="Calibri"/>
-              <a:cs typeface="Calibri"/>
-            </a:endParaRPr>
-          </a:p>
-        </p:txBody>
-      </p:sp>
-      <p:pic>
-        <p:nvPicPr>
-          <p:cNvPr id="6" name="Imagen 5">
-            <a:extLst>
-              <a:ext uri="{FF2B5EF4-FFF2-40B4-BE49-F238E27FC236}">
-                <a16:creationId xmlns:a16="http://schemas.microsoft.com/office/drawing/2014/main" id="{E8FDED3E-BCCE-BBAA-A109-C2E829C1CB09}"/>
-              </a:ext>
-            </a:extLst>
-          </p:cNvPr>
-          <p:cNvPicPr>
-            <a:picLocks noChangeAspect="1"/>
-          </p:cNvPicPr>
-          <p:nvPr/>
-        </p:nvPicPr>
-        <p:blipFill rotWithShape="1">
-          <a:blip r:embed="rId2"/>
-          <a:srcRect l="16822" t="9677" r="13578" b="1075"/>
-          <a:stretch/>
-        </p:blipFill>
-        <p:spPr>
-          <a:xfrm>
-            <a:off x="11178356" y="5775070"/>
-            <a:ext cx="914850" cy="1011598"/>
-          </a:xfrm>
-          <a:prstGeom prst="rect">
-            <a:avLst/>
-          </a:prstGeom>
-        </p:spPr>
-      </p:pic>
-      <p:pic>
-        <p:nvPicPr>
-          <p:cNvPr id="7" name="Imagen 6" descr="Imagen que contiene nombre de la empresa&#10;&#10;Descripción generada automáticamente">
-            <a:extLst>
-              <a:ext uri="{FF2B5EF4-FFF2-40B4-BE49-F238E27FC236}">
-                <a16:creationId xmlns:a16="http://schemas.microsoft.com/office/drawing/2014/main" id="{C51541FF-E02D-B48F-9BB1-F94BBA352196}"/>
-              </a:ext>
-            </a:extLst>
-          </p:cNvPr>
-          <p:cNvPicPr>
-            <a:picLocks noChangeAspect="1"/>
-          </p:cNvPicPr>
-          <p:nvPr/>
-        </p:nvPicPr>
-        <p:blipFill>
-          <a:blip r:embed="rId3"/>
-          <a:stretch>
-            <a:fillRect/>
-          </a:stretch>
-        </p:blipFill>
-        <p:spPr>
-          <a:xfrm>
-            <a:off x="10468129" y="72206"/>
-            <a:ext cx="1628775" cy="666750"/>
-          </a:xfrm>
-          <a:prstGeom prst="rect">
-            <a:avLst/>
-          </a:prstGeom>
-        </p:spPr>
-      </p:pic>
     </p:spTree>
     <p:extLst>
       <p:ext uri="{BB962C8B-B14F-4D97-AF65-F5344CB8AC3E}">
-        <p14:creationId xmlns:p14="http://schemas.microsoft.com/office/powerpoint/2010/main" val="1908972534"/>
+        <p14:creationId xmlns:p14="http://schemas.microsoft.com/office/powerpoint/2010/main" val="1314539257"/>
       </p:ext>
     </p:extLst>
   </p:cSld>
@@ -11394,12 +10749,12 @@
           <a:p>
             <a:pPr algn="just"/>
             <a:r>
-              <a:rPr lang="es-CO" sz="1600" dirty="0">
+              <a:rPr lang="es-CO" sz="1600">
                 <a:latin typeface="Work Sans Light Roman"/>
               </a:rPr>
               <a:t>Desarrollar un sistema de información orientado a la gestión de procesos sobre las citas virtuales, inventarios a los ingresos y egresos del negocio, las compras y ventas de este, perfil de la mascota, para una mejor administración de la CLINICA VETERINARIA CIUDAD CANINA, ubicada en el norte de la ciudad de Bogotá</a:t>
             </a:r>
-            <a:endParaRPr lang="es-CO" sz="1600" dirty="0">
+            <a:endParaRPr lang="es-CO" sz="1600">
               <a:latin typeface="Work Sans Light Roman" pitchFamily="2" charset="77"/>
             </a:endParaRPr>
           </a:p>
@@ -11612,7 +10967,7 @@
         <p:spPr>
           <a:xfrm>
             <a:off x="456235" y="1296906"/>
-            <a:ext cx="9752842" cy="4031873"/>
+            <a:ext cx="9752842" cy="4278094"/>
           </a:xfrm>
           <a:prstGeom prst="rect">
             <a:avLst/>
@@ -11677,6 +11032,12 @@
               <a:buChar char="•"/>
             </a:pPr>
             <a:endParaRPr lang="es-CO" sz="1600">
+              <a:latin typeface="Work Sans Light Roman"/>
+            </a:endParaRPr>
+          </a:p>
+          <a:p>
+            <a:pPr algn="just"/>
+            <a:endParaRPr lang="es-CO" sz="1600" dirty="0">
               <a:latin typeface="Work Sans Light Roman"/>
             </a:endParaRPr>
           </a:p>
@@ -12688,14 +12049,6 @@
 </file>
 
 <file path=customXml/item2.xml><?xml version="1.0" encoding="utf-8"?>
-<p:properties xmlns:p="http://schemas.microsoft.com/office/2006/metadata/properties" xmlns:xsi="http://www.w3.org/2001/XMLSchema-instance" xmlns:pc="http://schemas.microsoft.com/office/infopath/2007/PartnerControls">
-  <documentManagement>
-    <_activity xmlns="6b22f0e4-977a-4efd-8dfc-938bd706fba8" xsi:nil="true"/>
-  </documentManagement>
-</p:properties>
-</file>
-
-<file path=customXml/item3.xml><?xml version="1.0" encoding="utf-8"?>
 <ct:contentTypeSchema xmlns:ct="http://schemas.microsoft.com/office/2006/metadata/contentType" xmlns:ma="http://schemas.microsoft.com/office/2006/metadata/properties/metaAttributes" ct:_="" ma:_="" ma:contentTypeName="Documento" ma:contentTypeID="0x010100DF3DAC38E174F646B6AAFEF7586E99C4" ma:contentTypeVersion="5" ma:contentTypeDescription="Crear nuevo documento." ma:contentTypeScope="" ma:versionID="f164c56d1dd2edf8238dae7d34ab1d0b">
   <xsd:schema xmlns:xsd="http://www.w3.org/2001/XMLSchema" xmlns:xs="http://www.w3.org/2001/XMLSchema" xmlns:p="http://schemas.microsoft.com/office/2006/metadata/properties" xmlns:ns3="6b22f0e4-977a-4efd-8dfc-938bd706fba8" targetNamespace="http://schemas.microsoft.com/office/2006/metadata/properties" ma:root="true" ma:fieldsID="a39800cc7f770a15c44da7413418829a" ns3:_="">
     <xsd:import namespace="6b22f0e4-977a-4efd-8dfc-938bd706fba8"/>
@@ -12845,6 +12198,14 @@
 </ct:contentTypeSchema>
 </file>
 
+<file path=customXml/item3.xml><?xml version="1.0" encoding="utf-8"?>
+<p:properties xmlns:p="http://schemas.microsoft.com/office/2006/metadata/properties" xmlns:xsi="http://www.w3.org/2001/XMLSchema-instance" xmlns:pc="http://schemas.microsoft.com/office/infopath/2007/PartnerControls">
+  <documentManagement>
+    <_activity xmlns="6b22f0e4-977a-4efd-8dfc-938bd706fba8" xsi:nil="true"/>
+  </documentManagement>
+</p:properties>
+</file>
+
 <file path=customXml/itemProps1.xml><?xml version="1.0" encoding="utf-8"?>
 <ds:datastoreItem xmlns:ds="http://schemas.openxmlformats.org/officeDocument/2006/customXml" ds:itemID="{984B8E10-505B-4203-8A08-B9742F318845}">
   <ds:schemaRefs>
@@ -12854,22 +12215,6 @@
 </file>
 
 <file path=customXml/itemProps2.xml><?xml version="1.0" encoding="utf-8"?>
-<ds:datastoreItem xmlns:ds="http://schemas.openxmlformats.org/officeDocument/2006/customXml" ds:itemID="{315DA727-E7CF-41C7-A73E-EF1FE8E2A3D8}">
-  <ds:schemaRefs>
-    <ds:schemaRef ds:uri="6b22f0e4-977a-4efd-8dfc-938bd706fba8"/>
-    <ds:schemaRef ds:uri="http://purl.org/dc/dcmitype/"/>
-    <ds:schemaRef ds:uri="http://purl.org/dc/elements/1.1/"/>
-    <ds:schemaRef ds:uri="http://purl.org/dc/terms/"/>
-    <ds:schemaRef ds:uri="http://schemas.microsoft.com/office/2006/documentManagement/types"/>
-    <ds:schemaRef ds:uri="http://schemas.microsoft.com/office/2006/metadata/properties"/>
-    <ds:schemaRef ds:uri="http://schemas.microsoft.com/office/infopath/2007/PartnerControls"/>
-    <ds:schemaRef ds:uri="http://schemas.openxmlformats.org/package/2006/metadata/core-properties"/>
-    <ds:schemaRef ds:uri="http://www.w3.org/XML/1998/namespace"/>
-  </ds:schemaRefs>
-</ds:datastoreItem>
-</file>
-
-<file path=customXml/itemProps3.xml><?xml version="1.0" encoding="utf-8"?>
 <ds:datastoreItem xmlns:ds="http://schemas.openxmlformats.org/officeDocument/2006/customXml" ds:itemID="{3868E901-1AFF-4E0D-A801-12304C6FF3D5}">
   <ds:schemaRefs>
     <ds:schemaRef ds:uri="6b22f0e4-977a-4efd-8dfc-938bd706fba8"/>
@@ -12885,4 +12230,20 @@
     <ds:schemaRef ds:uri="http://www.w3.org/2001/XMLSchema"/>
   </ds:schemaRefs>
 </ds:datastoreItem>
+</file>
+
+<file path=customXml/itemProps3.xml><?xml version="1.0" encoding="utf-8"?>
+<ds:datastoreItem xmlns:ds="http://schemas.openxmlformats.org/officeDocument/2006/customXml" ds:itemID="{315DA727-E7CF-41C7-A73E-EF1FE8E2A3D8}">
+  <ds:schemaRefs>
+    <ds:schemaRef ds:uri="6b22f0e4-977a-4efd-8dfc-938bd706fba8"/>
+    <ds:schemaRef ds:uri="http://purl.org/dc/dcmitype/"/>
+    <ds:schemaRef ds:uri="http://purl.org/dc/elements/1.1/"/>
+    <ds:schemaRef ds:uri="http://purl.org/dc/terms/"/>
+    <ds:schemaRef ds:uri="http://schemas.microsoft.com/office/2006/documentManagement/types"/>
+    <ds:schemaRef ds:uri="http://schemas.microsoft.com/office/2006/metadata/properties"/>
+    <ds:schemaRef ds:uri="http://schemas.microsoft.com/office/infopath/2007/PartnerControls"/>
+    <ds:schemaRef ds:uri="http://schemas.openxmlformats.org/package/2006/metadata/core-properties"/>
+    <ds:schemaRef ds:uri="http://www.w3.org/XML/1998/namespace"/>
+  </ds:schemaRefs>
+</ds:datastoreItem>
 </file>
</xml_diff>